<commit_message>
added diagrams, epic 1 done
</commit_message>
<xml_diff>
--- a/Vorlage_Praesentation_2022_Subgroup_2_4_OOA.pptx
+++ b/Vorlage_Praesentation_2022_Subgroup_2_4_OOA.pptx
@@ -5,10 +5,10 @@
     <p:sldMasterId id="2147483696" r:id="rId1"/>
   </p:sldMasterIdLst>
   <p:notesMasterIdLst>
-    <p:notesMasterId r:id="rId14"/>
+    <p:notesMasterId r:id="rId16"/>
   </p:notesMasterIdLst>
   <p:handoutMasterIdLst>
-    <p:handoutMasterId r:id="rId15"/>
+    <p:handoutMasterId r:id="rId17"/>
   </p:handoutMasterIdLst>
   <p:sldIdLst>
     <p:sldId id="256" r:id="rId2"/>
@@ -23,6 +23,8 @@
     <p:sldId id="273" r:id="rId11"/>
     <p:sldId id="274" r:id="rId12"/>
     <p:sldId id="283" r:id="rId13"/>
+    <p:sldId id="284" r:id="rId14"/>
+    <p:sldId id="285" r:id="rId15"/>
   </p:sldIdLst>
   <p:sldSz cx="10160000" cy="5715000"/>
   <p:notesSz cx="6858000" cy="9144000"/>
@@ -383,7 +385,7 @@
                 <a:latin typeface="Arial" panose="020B0604020202020204" pitchFamily="34" charset="0"/>
                 <a:cs typeface="Arial" panose="020B0604020202020204" pitchFamily="34" charset="0"/>
               </a:rPr>
-              <a:t>06.12.2022</a:t>
+              <a:t>07.12.2022</a:t>
             </a:fld>
             <a:endParaRPr lang="de-DE">
               <a:latin typeface="Arial" panose="020B0604020202020204" pitchFamily="34" charset="0"/>
@@ -567,7 +569,7 @@
             <a:fld id="{5801EACB-8D12-49F2-9088-5A635C50DDBD}" type="datetimeFigureOut">
               <a:rPr lang="de-DE" smtClean="0"/>
               <a:pPr/>
-              <a:t>06.12.2022</a:t>
+              <a:t>07.12.2022</a:t>
             </a:fld>
             <a:endParaRPr lang="de-DE"/>
           </a:p>
@@ -988,7 +990,7 @@
             <a:fld id="{911D8C60-1F2D-4436-BF53-22882F494404}" type="datetimeFigureOut">
               <a:rPr lang="de-DE" smtClean="0"/>
               <a:pPr/>
-              <a:t>06.12.2022</a:t>
+              <a:t>07.12.2022</a:t>
             </a:fld>
             <a:endParaRPr lang="de-DE" dirty="0"/>
           </a:p>
@@ -1671,17 +1673,11 @@
             <a:r>
               <a:rPr lang="de-DE" altLang="de-DE" sz="1111" dirty="0">
                 <a:solidFill>
-                  <a:srgbClr val="FF0000"/>
-                </a:solidFill>
-                <a:latin typeface="Arial Unicode MS" pitchFamily="34" charset="-128"/>
-              </a:rPr>
-              <a:t>Referent1</a:t>
-            </a:r>
-            <a:endParaRPr lang="de-DE" altLang="de-DE" sz="1111" dirty="0">
-              <a:solidFill>
-                <a:srgbClr val="FF0000"/>
-              </a:solidFill>
-            </a:endParaRPr>
+                  <a:schemeClr val="tx1"/>
+                </a:solidFill>
+              </a:rPr>
+              <a:t>Silvia Wen &amp; Muhammad Daryl Rashad</a:t>
+            </a:r>
           </a:p>
         </p:txBody>
       </p:sp>
@@ -2057,12 +2053,14 @@
           </a:p>
           <a:p>
             <a:r>
-              <a:rPr lang="de-DE" sz="2400" dirty="0">
-                <a:solidFill>
-                  <a:srgbClr val="FF0000"/>
-                </a:solidFill>
-              </a:rPr>
-              <a:t>Referent1</a:t>
+              <a:rPr lang="de-DE" sz="2400" dirty="0"/>
+              <a:t>Silvia Wen ()</a:t>
+            </a:r>
+          </a:p>
+          <a:p>
+            <a:r>
+              <a:rPr lang="de-DE" sz="2400" dirty="0"/>
+              <a:t>Muhammad Daryl Rashad (538066)</a:t>
             </a:r>
             <a:endParaRPr lang="de-DE" sz="2667" dirty="0"/>
           </a:p>
@@ -2071,12 +2069,8 @@
           </a:p>
           <a:p>
             <a:r>
-              <a:rPr lang="de-DE" dirty="0">
-                <a:solidFill>
-                  <a:srgbClr val="FF0000"/>
-                </a:solidFill>
-              </a:rPr>
-              <a:t>Datum</a:t>
+              <a:rPr lang="de-DE" dirty="0"/>
+              <a:t>12.02.2022</a:t>
             </a:r>
           </a:p>
         </p:txBody>
@@ -2182,6 +2176,42 @@
           </a:p>
         </p:txBody>
       </p:sp>
+      <p:pic>
+        <p:nvPicPr>
+          <p:cNvPr id="3" name="Picture 2">
+            <a:extLst>
+              <a:ext uri="{FF2B5EF4-FFF2-40B4-BE49-F238E27FC236}">
+                <a16:creationId xmlns:a16="http://schemas.microsoft.com/office/drawing/2014/main" id="{C7C179A8-7397-BBA2-3D2F-D0C7086CB5DD}"/>
+              </a:ext>
+            </a:extLst>
+          </p:cNvPr>
+          <p:cNvPicPr>
+            <a:picLocks noChangeAspect="1"/>
+          </p:cNvPicPr>
+          <p:nvPr/>
+        </p:nvPicPr>
+        <p:blipFill>
+          <a:blip r:embed="rId2">
+            <a:extLst>
+              <a:ext uri="{28A0092B-C50C-407E-A947-70E740481C1C}">
+                <a14:useLocalDpi xmlns:a14="http://schemas.microsoft.com/office/drawing/2010/main" val="0"/>
+              </a:ext>
+            </a:extLst>
+          </a:blip>
+          <a:stretch>
+            <a:fillRect/>
+          </a:stretch>
+        </p:blipFill>
+        <p:spPr>
+          <a:xfrm>
+            <a:off x="2144295" y="1296412"/>
+            <a:ext cx="5871409" cy="3851019"/>
+          </a:xfrm>
+          <a:prstGeom prst="rect">
+            <a:avLst/>
+          </a:prstGeom>
+        </p:spPr>
+      </p:pic>
     </p:spTree>
     <p:extLst>
       <p:ext uri="{BB962C8B-B14F-4D97-AF65-F5344CB8AC3E}">
@@ -2439,18 +2469,37 @@
           <a:bodyPr anchor="t"/>
           <a:lstStyle/>
           <a:p>
-            <a:pPr marL="0" indent="0">
+            <a:pPr marL="457200" indent="-457200">
+              <a:buFont typeface="+mj-lt"/>
+              <a:buAutoNum type="arabicPeriod"/>
+            </a:pPr>
+            <a:r>
+              <a:rPr lang="de-DE" b="1" dirty="0"/>
+              <a:t>Als Kunde möchte ich einen Girokonto eröffnen können, um mein Geld in der Bank aufzubewahren.</a:t>
+            </a:r>
+          </a:p>
+          <a:p>
+            <a:pPr marL="596164" lvl="2" indent="0">
               <a:buNone/>
             </a:pPr>
             <a:r>
-              <a:rPr lang="de-DE" b="1" dirty="0"/>
-              <a:t>Als Kunde möchte ich einen Girokonten eröffnen können, </a:t>
-            </a:r>
-            <a:r>
-              <a:rPr lang="de-DE" b="1"/>
-              <a:t>um mein Geld in der Bank </a:t>
-            </a:r>
-            <a:endParaRPr lang="de-DE" b="1" dirty="0"/>
+              <a:rPr lang="de-DE" u="sng" dirty="0"/>
+              <a:t>Akzeptanzkriterien:</a:t>
+            </a:r>
+          </a:p>
+          <a:p>
+            <a:pPr lvl="2"/>
+            <a:r>
+              <a:rPr lang="de-DE" dirty="0"/>
+              <a:t>Wenn die Kunde ihre persönliche Daten eingibt, läuft der Girokontoeröffnung weiter.</a:t>
+            </a:r>
+          </a:p>
+          <a:p>
+            <a:pPr lvl="2"/>
+            <a:r>
+              <a:rPr lang="de-DE" dirty="0"/>
+              <a:t>Wenn die Girokontoeröffnung erfolgreich ist, werden die IBAN, der Saldo und die Berechtigung dem Kunden angezeigt. </a:t>
+            </a:r>
           </a:p>
         </p:txBody>
       </p:sp>
@@ -2485,6 +2534,218 @@
     <p:extLst>
       <p:ext uri="{BB962C8B-B14F-4D97-AF65-F5344CB8AC3E}">
         <p14:creationId xmlns:p14="http://schemas.microsoft.com/office/powerpoint/2010/main" val="2434018515"/>
+      </p:ext>
+    </p:extLst>
+  </p:cSld>
+  <p:clrMapOvr>
+    <a:masterClrMapping/>
+  </p:clrMapOvr>
+</p:sld>
+</file>
+
+<file path=ppt/slides/slide13.xml><?xml version="1.0" encoding="utf-8"?>
+<p:sld xmlns:a="http://schemas.openxmlformats.org/drawingml/2006/main" xmlns:r="http://schemas.openxmlformats.org/officeDocument/2006/relationships" xmlns:p="http://schemas.openxmlformats.org/presentationml/2006/main">
+  <p:cSld>
+    <p:spTree>
+      <p:nvGrpSpPr>
+        <p:cNvPr id="1" name=""/>
+        <p:cNvGrpSpPr/>
+        <p:nvPr/>
+      </p:nvGrpSpPr>
+      <p:grpSpPr>
+        <a:xfrm>
+          <a:off x="0" y="0"/>
+          <a:ext cx="0" cy="0"/>
+          <a:chOff x="0" y="0"/>
+          <a:chExt cx="0" cy="0"/>
+        </a:xfrm>
+      </p:grpSpPr>
+      <p:sp>
+        <p:nvSpPr>
+          <p:cNvPr id="5" name="Inhaltsplatzhalter 4"/>
+          <p:cNvSpPr>
+            <a:spLocks noGrp="1"/>
+          </p:cNvSpPr>
+          <p:nvPr>
+            <p:ph idx="1"/>
+          </p:nvPr>
+        </p:nvSpPr>
+        <p:spPr/>
+        <p:txBody>
+          <a:bodyPr anchor="t"/>
+          <a:lstStyle/>
+          <a:p>
+            <a:pPr marL="457200" indent="-457200">
+              <a:buFont typeface="+mj-lt"/>
+              <a:buAutoNum type="arabicPeriod" startAt="2"/>
+            </a:pPr>
+            <a:r>
+              <a:rPr lang="de-DE" b="1" dirty="0"/>
+              <a:t>Als Kunde möchte ich einen Depotkonto eröffnen können, um mein Aktien hinterlegen zu können.</a:t>
+            </a:r>
+          </a:p>
+          <a:p>
+            <a:pPr marL="596164" lvl="2" indent="0">
+              <a:buNone/>
+            </a:pPr>
+            <a:r>
+              <a:rPr lang="de-DE" u="sng" dirty="0"/>
+              <a:t>Akzeptanzkriterien:</a:t>
+            </a:r>
+          </a:p>
+          <a:p>
+            <a:pPr lvl="2"/>
+            <a:r>
+              <a:rPr lang="de-DE" dirty="0"/>
+              <a:t>Wenn die Kunde ihre persönliche Daten und Referenzkonto eingibt, läuft der Depotkontoeröffnung weiter.</a:t>
+            </a:r>
+          </a:p>
+          <a:p>
+            <a:pPr lvl="2"/>
+            <a:r>
+              <a:rPr lang="de-DE" dirty="0"/>
+              <a:t>Wenn die Depotkontoeröffnung erfolgreich ist, werden die Kontonummer, der Saldo und die Berechtigung dem Kunden gegeben.</a:t>
+            </a:r>
+          </a:p>
+        </p:txBody>
+      </p:sp>
+      <p:sp>
+        <p:nvSpPr>
+          <p:cNvPr id="4" name="Titel 3"/>
+          <p:cNvSpPr>
+            <a:spLocks noGrp="1"/>
+          </p:cNvSpPr>
+          <p:nvPr>
+            <p:ph type="title"/>
+          </p:nvPr>
+        </p:nvSpPr>
+        <p:spPr/>
+        <p:txBody>
+          <a:bodyPr/>
+          <a:lstStyle/>
+          <a:p>
+            <a:r>
+              <a:rPr lang="de-DE" dirty="0"/>
+              <a:t>Epic 1: Konto eröffnen</a:t>
+            </a:r>
+            <a:endParaRPr lang="de-DE" sz="1400" dirty="0">
+              <a:solidFill>
+                <a:srgbClr val="00B050"/>
+              </a:solidFill>
+            </a:endParaRPr>
+          </a:p>
+        </p:txBody>
+      </p:sp>
+    </p:spTree>
+    <p:extLst>
+      <p:ext uri="{BB962C8B-B14F-4D97-AF65-F5344CB8AC3E}">
+        <p14:creationId xmlns:p14="http://schemas.microsoft.com/office/powerpoint/2010/main" val="4199853890"/>
+      </p:ext>
+    </p:extLst>
+  </p:cSld>
+  <p:clrMapOvr>
+    <a:masterClrMapping/>
+  </p:clrMapOvr>
+</p:sld>
+</file>
+
+<file path=ppt/slides/slide14.xml><?xml version="1.0" encoding="utf-8"?>
+<p:sld xmlns:a="http://schemas.openxmlformats.org/drawingml/2006/main" xmlns:r="http://schemas.openxmlformats.org/officeDocument/2006/relationships" xmlns:p="http://schemas.openxmlformats.org/presentationml/2006/main">
+  <p:cSld>
+    <p:spTree>
+      <p:nvGrpSpPr>
+        <p:cNvPr id="1" name=""/>
+        <p:cNvGrpSpPr/>
+        <p:nvPr/>
+      </p:nvGrpSpPr>
+      <p:grpSpPr>
+        <a:xfrm>
+          <a:off x="0" y="0"/>
+          <a:ext cx="0" cy="0"/>
+          <a:chOff x="0" y="0"/>
+          <a:chExt cx="0" cy="0"/>
+        </a:xfrm>
+      </p:grpSpPr>
+      <p:sp>
+        <p:nvSpPr>
+          <p:cNvPr id="5" name="Inhaltsplatzhalter 4"/>
+          <p:cNvSpPr>
+            <a:spLocks noGrp="1"/>
+          </p:cNvSpPr>
+          <p:nvPr>
+            <p:ph idx="1"/>
+          </p:nvPr>
+        </p:nvSpPr>
+        <p:spPr/>
+        <p:txBody>
+          <a:bodyPr anchor="t"/>
+          <a:lstStyle/>
+          <a:p>
+            <a:pPr marL="457200" indent="-457200">
+              <a:buFont typeface="+mj-lt"/>
+              <a:buAutoNum type="arabicPeriod" startAt="2"/>
+            </a:pPr>
+            <a:r>
+              <a:rPr lang="de-DE" b="1" dirty="0"/>
+              <a:t>Als Kunde möchte ich einen Depotkonto eröffnen können, um mein Aktien hinterlegen zu können.</a:t>
+            </a:r>
+          </a:p>
+          <a:p>
+            <a:pPr marL="596164" lvl="2" indent="0">
+              <a:buNone/>
+            </a:pPr>
+            <a:r>
+              <a:rPr lang="de-DE" u="sng" dirty="0"/>
+              <a:t>Akzeptanzkriterien:</a:t>
+            </a:r>
+          </a:p>
+          <a:p>
+            <a:pPr lvl="2"/>
+            <a:r>
+              <a:rPr lang="de-DE" dirty="0"/>
+              <a:t>Wenn die Kunde ihre persönliche Daten und Referenzkonto eingibt, läuft der Depotkontoeröffnung weiter.</a:t>
+            </a:r>
+          </a:p>
+          <a:p>
+            <a:pPr lvl="2"/>
+            <a:r>
+              <a:rPr lang="de-DE" dirty="0"/>
+              <a:t>Wenn die Depotkontoeröffnung erfolgreich ist, werden die Kontonummer und Berechtigung dem Kunden gegeben.</a:t>
+            </a:r>
+          </a:p>
+        </p:txBody>
+      </p:sp>
+      <p:sp>
+        <p:nvSpPr>
+          <p:cNvPr id="4" name="Titel 3"/>
+          <p:cNvSpPr>
+            <a:spLocks noGrp="1"/>
+          </p:cNvSpPr>
+          <p:nvPr>
+            <p:ph type="title"/>
+          </p:nvPr>
+        </p:nvSpPr>
+        <p:spPr/>
+        <p:txBody>
+          <a:bodyPr/>
+          <a:lstStyle/>
+          <a:p>
+            <a:r>
+              <a:rPr lang="de-DE" dirty="0"/>
+              <a:t>Epic 2: A</a:t>
+            </a:r>
+            <a:endParaRPr lang="de-DE" sz="1400" dirty="0">
+              <a:solidFill>
+                <a:srgbClr val="00B050"/>
+              </a:solidFill>
+            </a:endParaRPr>
+          </a:p>
+        </p:txBody>
+      </p:sp>
+    </p:spTree>
+    <p:extLst>
+      <p:ext uri="{BB962C8B-B14F-4D97-AF65-F5344CB8AC3E}">
+        <p14:creationId xmlns:p14="http://schemas.microsoft.com/office/powerpoint/2010/main" val="231201351"/>
       </p:ext>
     </p:extLst>
   </p:cSld>
@@ -2536,7 +2797,7 @@
               <a:t>In einer Bank können </a:t>
             </a:r>
             <a:r>
-              <a:rPr lang="de-DE" sz="1800" b="1" i="0" u="none" baseline="0" dirty="0">
+              <a:rPr lang="de-DE" sz="1800" i="0" u="none" baseline="0" dirty="0">
                 <a:latin typeface="Calibri" panose="020F0502020204030204" pitchFamily="34" charset="0"/>
               </a:rPr>
               <a:t>Kunden</a:t>
@@ -2548,7 +2809,7 @@
               <a:t> eine Reihe von </a:t>
             </a:r>
             <a:r>
-              <a:rPr lang="de-DE" sz="1800" b="1" i="0" u="none" baseline="0" dirty="0">
+              <a:rPr lang="de-DE" sz="1800" i="0" u="none" baseline="0" dirty="0">
                 <a:latin typeface="Calibri" panose="020F0502020204030204" pitchFamily="34" charset="0"/>
               </a:rPr>
               <a:t>Konten</a:t>
@@ -3173,6 +3434,23 @@
               </a:rPr>
               <a:t>Bank (G2)</a:t>
             </a:r>
+            <a:br>
+              <a:rPr lang="de-DE" sz="2400" b="0" i="0" u="none" strike="noStrike" baseline="0" dirty="0">
+                <a:solidFill>
+                  <a:srgbClr val="4471C4"/>
+                </a:solidFill>
+                <a:latin typeface="Calibri" panose="020F0502020204030204" pitchFamily="34" charset="0"/>
+              </a:rPr>
+            </a:br>
+            <a:r>
+              <a:rPr lang="de-DE" sz="2400" b="0" dirty="0">
+                <a:solidFill>
+                  <a:srgbClr val="4471C4"/>
+                </a:solidFill>
+                <a:latin typeface="Calibri" panose="020F0502020204030204" pitchFamily="34" charset="0"/>
+              </a:rPr>
+              <a:t>Markierung der Substantive</a:t>
+            </a:r>
             <a:endParaRPr lang="de-DE" dirty="0"/>
           </a:p>
         </p:txBody>
@@ -3743,6 +4021,23 @@
               </a:rPr>
               <a:t>Bank (G2)</a:t>
             </a:r>
+            <a:br>
+              <a:rPr lang="de-DE" sz="2400" b="0" i="0" u="none" strike="noStrike" baseline="0" dirty="0">
+                <a:solidFill>
+                  <a:srgbClr val="4471C4"/>
+                </a:solidFill>
+                <a:latin typeface="Calibri" panose="020F0502020204030204" pitchFamily="34" charset="0"/>
+              </a:rPr>
+            </a:br>
+            <a:r>
+              <a:rPr lang="de-DE" sz="2400" b="0" dirty="0">
+                <a:solidFill>
+                  <a:srgbClr val="4471C4"/>
+                </a:solidFill>
+                <a:latin typeface="Calibri" panose="020F0502020204030204" pitchFamily="34" charset="0"/>
+              </a:rPr>
+              <a:t>Entfernen der Substantive</a:t>
+            </a:r>
             <a:endParaRPr lang="de-DE" dirty="0"/>
           </a:p>
         </p:txBody>
@@ -4081,7 +4376,10 @@
               <a:t> in seinen </a:t>
             </a:r>
             <a:r>
-              <a:rPr lang="de-DE" sz="1800" b="0" i="0" u="none" baseline="0" dirty="0">
+              <a:rPr lang="de-DE" sz="1800" b="0" i="0" u="none" strike="sngStrike" baseline="0" dirty="0">
+                <a:solidFill>
+                  <a:srgbClr val="00B0F0"/>
+                </a:solidFill>
                 <a:highlight>
                   <a:srgbClr val="FFFF00"/>
                 </a:highlight>
@@ -4114,7 +4412,10 @@
               <a:t> von </a:t>
             </a:r>
             <a:r>
-              <a:rPr lang="de-DE" sz="1800" b="0" i="0" u="none" baseline="0" dirty="0">
+              <a:rPr lang="de-DE" sz="1800" b="0" i="0" u="none" strike="sngStrike" baseline="0" dirty="0">
+                <a:solidFill>
+                  <a:srgbClr val="00B0F0"/>
+                </a:solidFill>
                 <a:highlight>
                   <a:srgbClr val="FFFF00"/>
                 </a:highlight>
@@ -4147,7 +4448,10 @@
               <a:t> bei </a:t>
             </a:r>
             <a:r>
-              <a:rPr lang="de-DE" sz="1800" b="0" i="0" u="none" baseline="0" dirty="0">
+              <a:rPr lang="de-DE" sz="1800" b="0" i="0" u="none" strike="sngStrike" baseline="0" dirty="0">
+                <a:solidFill>
+                  <a:srgbClr val="00B0F0"/>
+                </a:solidFill>
                 <a:highlight>
                   <a:srgbClr val="FFFF00"/>
                 </a:highlight>
@@ -4162,7 +4466,10 @@
               <a:t> oder </a:t>
             </a:r>
             <a:r>
-              <a:rPr lang="de-DE" sz="1800" b="0" i="0" baseline="0" dirty="0">
+              <a:rPr lang="de-DE" sz="1800" b="0" i="0" strike="sngStrike" baseline="0" dirty="0">
+                <a:solidFill>
+                  <a:srgbClr val="00B0F0"/>
+                </a:solidFill>
                 <a:highlight>
                   <a:srgbClr val="FFFF00"/>
                 </a:highlight>
@@ -4330,6 +4637,23 @@
                 <a:latin typeface="Calibri" panose="020F0502020204030204" pitchFamily="34" charset="0"/>
               </a:rPr>
               <a:t>Bank (G2)</a:t>
+            </a:r>
+            <a:br>
+              <a:rPr lang="de-DE" sz="2400" b="0" i="0" u="none" strike="noStrike" baseline="0" dirty="0">
+                <a:solidFill>
+                  <a:srgbClr val="4471C4"/>
+                </a:solidFill>
+                <a:latin typeface="Calibri" panose="020F0502020204030204" pitchFamily="34" charset="0"/>
+              </a:rPr>
+            </a:br>
+            <a:r>
+              <a:rPr lang="de-DE" sz="2400" b="0" dirty="0">
+                <a:solidFill>
+                  <a:srgbClr val="4471C4"/>
+                </a:solidFill>
+                <a:latin typeface="Calibri" panose="020F0502020204030204" pitchFamily="34" charset="0"/>
+              </a:rPr>
+              <a:t>Entfernen der Substantive</a:t>
             </a:r>
             <a:endParaRPr lang="de-DE" dirty="0"/>
           </a:p>
@@ -4669,7 +4993,10 @@
               <a:t> in seinen </a:t>
             </a:r>
             <a:r>
-              <a:rPr lang="de-DE" sz="1800" b="1" i="0" u="none" baseline="0" dirty="0">
+              <a:rPr lang="de-DE" sz="1800" i="0" u="none" strike="sngStrike" baseline="0" dirty="0">
+                <a:solidFill>
+                  <a:srgbClr val="00B0F0"/>
+                </a:solidFill>
                 <a:highlight>
                   <a:srgbClr val="FFFF00"/>
                 </a:highlight>
@@ -4702,7 +5029,10 @@
               <a:t> von </a:t>
             </a:r>
             <a:r>
-              <a:rPr lang="de-DE" sz="1800" b="1" i="0" u="none" baseline="0" dirty="0">
+              <a:rPr lang="de-DE" sz="1800" i="0" u="none" strike="sngStrike" baseline="0" dirty="0">
+                <a:solidFill>
+                  <a:srgbClr val="00B0F0"/>
+                </a:solidFill>
                 <a:highlight>
                   <a:srgbClr val="FFFF00"/>
                 </a:highlight>
@@ -4735,7 +5065,10 @@
               <a:t> bei </a:t>
             </a:r>
             <a:r>
-              <a:rPr lang="de-DE" sz="1800" b="1" i="0" u="none" baseline="0" dirty="0">
+              <a:rPr lang="de-DE" sz="1800" i="0" u="none" strike="sngStrike" baseline="0" dirty="0">
+                <a:solidFill>
+                  <a:srgbClr val="00B0F0"/>
+                </a:solidFill>
                 <a:highlight>
                   <a:srgbClr val="FFFF00"/>
                 </a:highlight>
@@ -4750,7 +5083,10 @@
               <a:t> oder </a:t>
             </a:r>
             <a:r>
-              <a:rPr lang="de-DE" sz="1800" b="1" i="0" baseline="0" dirty="0">
+              <a:rPr lang="de-DE" sz="1800" i="0" strike="sngStrike" baseline="0" dirty="0">
+                <a:solidFill>
+                  <a:srgbClr val="00B0F0"/>
+                </a:solidFill>
                 <a:highlight>
                   <a:srgbClr val="FFFF00"/>
                 </a:highlight>
@@ -5004,6 +5340,42 @@
           </a:p>
         </p:txBody>
       </p:sp>
+      <p:pic>
+        <p:nvPicPr>
+          <p:cNvPr id="3" name="Picture 2">
+            <a:extLst>
+              <a:ext uri="{FF2B5EF4-FFF2-40B4-BE49-F238E27FC236}">
+                <a16:creationId xmlns:a16="http://schemas.microsoft.com/office/drawing/2014/main" id="{46ABA154-3415-E55B-9279-A591E3A1A454}"/>
+              </a:ext>
+            </a:extLst>
+          </p:cNvPr>
+          <p:cNvPicPr>
+            <a:picLocks noChangeAspect="1"/>
+          </p:cNvPicPr>
+          <p:nvPr/>
+        </p:nvPicPr>
+        <p:blipFill>
+          <a:blip r:embed="rId2">
+            <a:extLst>
+              <a:ext uri="{28A0092B-C50C-407E-A947-70E740481C1C}">
+                <a14:useLocalDpi xmlns:a14="http://schemas.microsoft.com/office/drawing/2010/main" val="0"/>
+              </a:ext>
+            </a:extLst>
+          </a:blip>
+          <a:stretch>
+            <a:fillRect/>
+          </a:stretch>
+        </p:blipFill>
+        <p:spPr>
+          <a:xfrm>
+            <a:off x="910672" y="1169541"/>
+            <a:ext cx="8047619" cy="4104762"/>
+          </a:xfrm>
+          <a:prstGeom prst="rect">
+            <a:avLst/>
+          </a:prstGeom>
+        </p:spPr>
+      </p:pic>
     </p:spTree>
     <p:extLst>
       <p:ext uri="{BB962C8B-B14F-4D97-AF65-F5344CB8AC3E}">
@@ -5269,49 +5641,7 @@
                 </a:solidFill>
                 <a:latin typeface="Calibri" panose="020F0502020204030204" pitchFamily="34" charset="0"/>
               </a:rPr>
-              <a:t>lassen. Wichtig ist, dass zur Deckung von </a:t>
-            </a:r>
-            <a:r>
-              <a:rPr lang="de-DE" sz="1800" b="0" i="0" u="none" baseline="0" dirty="0">
-                <a:solidFill>
-                  <a:srgbClr val="000000"/>
-                </a:solidFill>
-                <a:highlight>
-                  <a:srgbClr val="00FFFF"/>
-                </a:highlight>
-                <a:latin typeface="Calibri" panose="020F0502020204030204" pitchFamily="34" charset="0"/>
-              </a:rPr>
-              <a:t>Käufen</a:t>
-            </a:r>
-            <a:r>
-              <a:rPr lang="de-DE" sz="1800" b="0" i="0" u="none" baseline="0" dirty="0">
-                <a:solidFill>
-                  <a:srgbClr val="000000"/>
-                </a:solidFill>
-                <a:latin typeface="Calibri" panose="020F0502020204030204" pitchFamily="34" charset="0"/>
-              </a:rPr>
-              <a:t> und zur Ausschüttung bei </a:t>
-            </a:r>
-            <a:r>
-              <a:rPr lang="de-DE" sz="1800" b="0" i="0" u="none" baseline="0" dirty="0">
-                <a:solidFill>
-                  <a:srgbClr val="000000"/>
-                </a:solidFill>
-                <a:highlight>
-                  <a:srgbClr val="00FFFF"/>
-                </a:highlight>
-                <a:latin typeface="Calibri" panose="020F0502020204030204" pitchFamily="34" charset="0"/>
-              </a:rPr>
-              <a:t>Verkäufen</a:t>
-            </a:r>
-            <a:r>
-              <a:rPr lang="de-DE" sz="1800" b="0" i="0" u="none" baseline="0" dirty="0">
-                <a:solidFill>
-                  <a:srgbClr val="000000"/>
-                </a:solidFill>
-                <a:latin typeface="Calibri" panose="020F0502020204030204" pitchFamily="34" charset="0"/>
-              </a:rPr>
-              <a:t> oder Dividendenzahlungen immer ein Referenzkonto </a:t>
+              <a:t>lassen. Wichtig ist, dass zur Deckung von Käufen und zur Ausschüttung bei Verkäufen oder Dividendenzahlungen immer ein Referenzkonto </a:t>
             </a:r>
             <a:r>
               <a:rPr lang="de-DE" sz="1800" b="0" i="0" u="none" baseline="0" dirty="0">
@@ -5411,6 +5741,23 @@
                 <a:latin typeface="Calibri" panose="020F0502020204030204" pitchFamily="34" charset="0"/>
               </a:rPr>
               <a:t>Bank (G2)</a:t>
+            </a:r>
+            <a:br>
+              <a:rPr lang="de-DE" sz="2400" b="0" i="0" u="none" strike="noStrike" baseline="0" dirty="0">
+                <a:solidFill>
+                  <a:srgbClr val="4471C4"/>
+                </a:solidFill>
+                <a:latin typeface="Calibri" panose="020F0502020204030204" pitchFamily="34" charset="0"/>
+              </a:rPr>
+            </a:br>
+            <a:r>
+              <a:rPr lang="de-DE" sz="2400" b="0" i="0" u="none" strike="noStrike" baseline="0" dirty="0">
+                <a:solidFill>
+                  <a:srgbClr val="4471C4"/>
+                </a:solidFill>
+                <a:latin typeface="Calibri" panose="020F0502020204030204" pitchFamily="34" charset="0"/>
+              </a:rPr>
+              <a:t>Markierung der Verben</a:t>
             </a:r>
             <a:endParaRPr lang="de-DE" dirty="0"/>
           </a:p>
@@ -5474,16 +5821,37 @@
               <a:t>In einer Bank können Kunden eine Reihe von Konten </a:t>
             </a:r>
             <a:r>
+              <a:rPr lang="de-DE" sz="1800" b="1" i="0" u="none" strike="noStrike" baseline="0" dirty="0">
+                <a:solidFill>
+                  <a:srgbClr val="000000"/>
+                </a:solidFill>
+                <a:highlight>
+                  <a:srgbClr val="00FFFF"/>
+                </a:highlight>
+                <a:latin typeface="Calibri" panose="020F0502020204030204" pitchFamily="34" charset="0"/>
+              </a:rPr>
+              <a:t>eröffnen</a:t>
+            </a:r>
+            <a:r>
               <a:rPr lang="de-DE" sz="1800" b="0" i="0" u="none" strike="noStrike" baseline="0" dirty="0">
                 <a:solidFill>
                   <a:srgbClr val="000000"/>
                 </a:solidFill>
+                <a:latin typeface="Calibri" panose="020F0502020204030204" pitchFamily="34" charset="0"/>
+              </a:rPr>
+              <a:t>. Hierzu müssen der Name und die Adresse </a:t>
+            </a:r>
+            <a:r>
+              <a:rPr lang="de-DE" sz="1800" b="0" i="0" u="none" strike="sngStrike" baseline="0" dirty="0">
+                <a:solidFill>
+                  <a:srgbClr val="000000"/>
+                </a:solidFill>
                 <a:highlight>
                   <a:srgbClr val="00FFFF"/>
                 </a:highlight>
                 <a:latin typeface="Calibri" panose="020F0502020204030204" pitchFamily="34" charset="0"/>
               </a:rPr>
-              <a:t>eröffnen</a:t>
+              <a:t>hinterlegt</a:t>
             </a:r>
             <a:r>
               <a:rPr lang="de-DE" sz="1800" b="0" i="0" u="none" strike="noStrike" baseline="0" dirty="0">
@@ -5492,7 +5860,7 @@
                 </a:solidFill>
                 <a:latin typeface="Calibri" panose="020F0502020204030204" pitchFamily="34" charset="0"/>
               </a:rPr>
-              <a:t>. Hierzu müssen der Name und die Adresse </a:t>
+              <a:t> werden. Alle Konten </a:t>
             </a:r>
             <a:r>
               <a:rPr lang="de-DE" sz="1800" b="0" i="0" u="none" strike="sngStrike" baseline="0" dirty="0">
@@ -5504,7 +5872,7 @@
                 </a:highlight>
                 <a:latin typeface="Calibri" panose="020F0502020204030204" pitchFamily="34" charset="0"/>
               </a:rPr>
-              <a:t>hinterlegt</a:t>
+              <a:t>haben</a:t>
             </a:r>
             <a:r>
               <a:rPr lang="de-DE" sz="1800" b="0" i="0" u="none" strike="noStrike" baseline="0" dirty="0">
@@ -5513,7 +5881,7 @@
                 </a:solidFill>
                 <a:latin typeface="Calibri" panose="020F0502020204030204" pitchFamily="34" charset="0"/>
               </a:rPr>
-              <a:t> werden. Alle Konten </a:t>
+              <a:t> einen Saldo, welcher </a:t>
             </a:r>
             <a:r>
               <a:rPr lang="de-DE" sz="1800" b="0" i="0" u="none" strike="sngStrike" baseline="0" dirty="0">
@@ -5525,7 +5893,7 @@
                 </a:highlight>
                 <a:latin typeface="Calibri" panose="020F0502020204030204" pitchFamily="34" charset="0"/>
               </a:rPr>
-              <a:t>haben</a:t>
+              <a:t>angibt</a:t>
             </a:r>
             <a:r>
               <a:rPr lang="de-DE" sz="1800" b="0" i="0" u="none" strike="noStrike" baseline="0" dirty="0">
@@ -5534,7 +5902,7 @@
                 </a:solidFill>
                 <a:latin typeface="Calibri" panose="020F0502020204030204" pitchFamily="34" charset="0"/>
               </a:rPr>
-              <a:t> einen Saldo, welcher </a:t>
+              <a:t>, was für ein Wert sich aktuell auf dem Konto </a:t>
             </a:r>
             <a:r>
               <a:rPr lang="de-DE" sz="1800" b="0" i="0" u="none" strike="sngStrike" baseline="0" dirty="0">
@@ -5546,7 +5914,7 @@
                 </a:highlight>
                 <a:latin typeface="Calibri" panose="020F0502020204030204" pitchFamily="34" charset="0"/>
               </a:rPr>
-              <a:t>angibt</a:t>
+              <a:t>befindet</a:t>
             </a:r>
             <a:r>
               <a:rPr lang="de-DE" sz="1800" b="0" i="0" u="none" strike="noStrike" baseline="0" dirty="0">
@@ -5555,7 +5923,7 @@
                 </a:solidFill>
                 <a:latin typeface="Calibri" panose="020F0502020204030204" pitchFamily="34" charset="0"/>
               </a:rPr>
-              <a:t>, was für ein Wert sich aktuell auf dem Konto </a:t>
+              <a:t>. Girokonten </a:t>
             </a:r>
             <a:r>
               <a:rPr lang="de-DE" sz="1800" b="0" i="0" u="none" strike="sngStrike" baseline="0" dirty="0">
@@ -5567,7 +5935,7 @@
                 </a:highlight>
                 <a:latin typeface="Calibri" panose="020F0502020204030204" pitchFamily="34" charset="0"/>
               </a:rPr>
-              <a:t>befindet</a:t>
+              <a:t>sind</a:t>
             </a:r>
             <a:r>
               <a:rPr lang="de-DE" sz="1800" b="0" i="0" u="none" strike="noStrike" baseline="0" dirty="0">
@@ -5576,7 +5944,7 @@
                 </a:solidFill>
                 <a:latin typeface="Calibri" panose="020F0502020204030204" pitchFamily="34" charset="0"/>
               </a:rPr>
-              <a:t>. Girokonten </a:t>
+              <a:t> die ganz normalen Konten, sie werden durch eine eindeutige IBAN </a:t>
             </a:r>
             <a:r>
               <a:rPr lang="de-DE" sz="1800" b="0" i="0" u="none" strike="sngStrike" baseline="0" dirty="0">
@@ -5588,7 +5956,7 @@
                 </a:highlight>
                 <a:latin typeface="Calibri" panose="020F0502020204030204" pitchFamily="34" charset="0"/>
               </a:rPr>
-              <a:t>sind</a:t>
+              <a:t>identifiziert</a:t>
             </a:r>
             <a:r>
               <a:rPr lang="de-DE" sz="1800" b="0" i="0" u="none" strike="noStrike" baseline="0" dirty="0">
@@ -5597,7 +5965,7 @@
                 </a:solidFill>
                 <a:latin typeface="Calibri" panose="020F0502020204030204" pitchFamily="34" charset="0"/>
               </a:rPr>
-              <a:t> die ganz normalen Konten, sie werden durch eine eindeutige IBAN </a:t>
+              <a:t>. Zudem </a:t>
             </a:r>
             <a:r>
               <a:rPr lang="de-DE" sz="1800" b="0" i="0" u="none" strike="sngStrike" baseline="0" dirty="0">
@@ -5609,16 +5977,28 @@
                 </a:highlight>
                 <a:latin typeface="Calibri" panose="020F0502020204030204" pitchFamily="34" charset="0"/>
               </a:rPr>
-              <a:t>identifiziert</a:t>
+              <a:t>gibt</a:t>
             </a:r>
             <a:r>
               <a:rPr lang="de-DE" sz="1800" b="0" i="0" u="none" strike="noStrike" baseline="0" dirty="0">
                 <a:solidFill>
                   <a:srgbClr val="000000"/>
                 </a:solidFill>
-                <a:latin typeface="Calibri" panose="020F0502020204030204" pitchFamily="34" charset="0"/>
-              </a:rPr>
-              <a:t>. Zudem </a:t>
+                <a:highlight>
+                  <a:srgbClr val="00FFFF"/>
+                </a:highlight>
+                <a:latin typeface="Calibri" panose="020F0502020204030204" pitchFamily="34" charset="0"/>
+              </a:rPr>
+              <a:t> </a:t>
+            </a:r>
+            <a:r>
+              <a:rPr lang="de-DE" sz="1800" b="0" i="0" u="none" strike="noStrike" baseline="0" dirty="0">
+                <a:solidFill>
+                  <a:srgbClr val="000000"/>
+                </a:solidFill>
+                <a:latin typeface="Calibri" panose="020F0502020204030204" pitchFamily="34" charset="0"/>
+              </a:rPr>
+              <a:t>es Depotkonten, in dem die von den Kunden gekauften Aktien </a:t>
             </a:r>
             <a:r>
               <a:rPr lang="de-DE" sz="1800" b="0" i="0" u="none" strike="sngStrike" baseline="0" dirty="0">
@@ -5630,18 +6010,39 @@
                 </a:highlight>
                 <a:latin typeface="Calibri" panose="020F0502020204030204" pitchFamily="34" charset="0"/>
               </a:rPr>
-              <a:t>gibt</a:t>
+              <a:t>abgelegt</a:t>
             </a:r>
             <a:r>
               <a:rPr lang="de-DE" sz="1800" b="0" i="0" u="none" strike="noStrike" baseline="0" dirty="0">
                 <a:solidFill>
                   <a:srgbClr val="000000"/>
                 </a:solidFill>
+                <a:latin typeface="Calibri" panose="020F0502020204030204" pitchFamily="34" charset="0"/>
+              </a:rPr>
+              <a:t> werden. Der Kunde kann sich eine Auflistung der verschiedenen Posten in seinen Depots </a:t>
+            </a:r>
+            <a:r>
+              <a:rPr lang="de-DE" sz="1800" b="1" i="0" u="none" strike="noStrike" baseline="0" dirty="0">
+                <a:solidFill>
+                  <a:srgbClr val="000000"/>
+                </a:solidFill>
                 <a:highlight>
                   <a:srgbClr val="00FFFF"/>
                 </a:highlight>
                 <a:latin typeface="Calibri" panose="020F0502020204030204" pitchFamily="34" charset="0"/>
               </a:rPr>
+              <a:t>anzeigen</a:t>
+            </a:r>
+            <a:r>
+              <a:rPr lang="de-DE" sz="1800" b="0" i="0" u="none" strike="noStrike" baseline="0" dirty="0">
+                <a:solidFill>
+                  <a:srgbClr val="000000"/>
+                </a:solidFill>
+                <a:highlight>
+                  <a:srgbClr val="00FFFF"/>
+                </a:highlight>
+                <a:latin typeface="Calibri" panose="020F0502020204030204" pitchFamily="34" charset="0"/>
+              </a:rPr>
               <a:t> </a:t>
             </a:r>
             <a:r>
@@ -5651,19 +6052,16 @@
                 </a:solidFill>
                 <a:latin typeface="Calibri" panose="020F0502020204030204" pitchFamily="34" charset="0"/>
               </a:rPr>
-              <a:t>es Depotkonten, in dem die von den Kunden gekauften Aktien </a:t>
-            </a:r>
-            <a:r>
-              <a:rPr lang="de-DE" sz="1800" b="0" i="0" u="none" strike="sngStrike" baseline="0" dirty="0">
+              <a:t>lassen. Wichtig ist, dass zur Deckung von </a:t>
+            </a:r>
+            <a:r>
+              <a:rPr lang="de-DE" sz="1800" b="0" i="0" u="none" baseline="0" dirty="0">
                 <a:solidFill>
                   <a:srgbClr val="000000"/>
                 </a:solidFill>
-                <a:highlight>
-                  <a:srgbClr val="00FFFF"/>
-                </a:highlight>
-                <a:latin typeface="Calibri" panose="020F0502020204030204" pitchFamily="34" charset="0"/>
-              </a:rPr>
-              <a:t>abgelegt</a:t>
+                <a:latin typeface="Calibri" panose="020F0502020204030204" pitchFamily="34" charset="0"/>
+              </a:rPr>
+              <a:t>Käufen</a:t>
             </a:r>
             <a:r>
               <a:rPr lang="de-DE" sz="1800" b="0" i="0" u="none" strike="noStrike" baseline="0" dirty="0">
@@ -5672,58 +6070,13 @@
                 </a:solidFill>
                 <a:latin typeface="Calibri" panose="020F0502020204030204" pitchFamily="34" charset="0"/>
               </a:rPr>
-              <a:t> werden. Der Kunde kann sich eine Auflistung der verschiedenen Posten in seinen Depots </a:t>
-            </a:r>
-            <a:r>
-              <a:rPr lang="de-DE" sz="1800" b="0" i="0" u="none" strike="noStrike" baseline="0" dirty="0">
+              <a:t> und zur Ausschüttung bei </a:t>
+            </a:r>
+            <a:r>
+              <a:rPr lang="de-DE" sz="1800" b="0" i="0" u="none" baseline="0" dirty="0">
                 <a:solidFill>
                   <a:srgbClr val="000000"/>
                 </a:solidFill>
-                <a:highlight>
-                  <a:srgbClr val="00FFFF"/>
-                </a:highlight>
-                <a:latin typeface="Calibri" panose="020F0502020204030204" pitchFamily="34" charset="0"/>
-              </a:rPr>
-              <a:t>anzeigen </a:t>
-            </a:r>
-            <a:r>
-              <a:rPr lang="de-DE" sz="1800" b="0" i="0" u="none" strike="noStrike" baseline="0" dirty="0">
-                <a:solidFill>
-                  <a:srgbClr val="000000"/>
-                </a:solidFill>
-                <a:latin typeface="Calibri" panose="020F0502020204030204" pitchFamily="34" charset="0"/>
-              </a:rPr>
-              <a:t>lassen. Wichtig ist, dass zur Deckung von </a:t>
-            </a:r>
-            <a:r>
-              <a:rPr lang="de-DE" sz="1800" b="0" i="0" u="none" strike="noStrike" baseline="0" dirty="0">
-                <a:solidFill>
-                  <a:srgbClr val="000000"/>
-                </a:solidFill>
-                <a:highlight>
-                  <a:srgbClr val="00FFFF"/>
-                </a:highlight>
-                <a:latin typeface="Calibri" panose="020F0502020204030204" pitchFamily="34" charset="0"/>
-              </a:rPr>
-              <a:t>Käufen</a:t>
-            </a:r>
-            <a:r>
-              <a:rPr lang="de-DE" sz="1800" b="0" i="0" u="none" strike="noStrike" baseline="0" dirty="0">
-                <a:solidFill>
-                  <a:srgbClr val="000000"/>
-                </a:solidFill>
-                <a:latin typeface="Calibri" panose="020F0502020204030204" pitchFamily="34" charset="0"/>
-              </a:rPr>
-              <a:t> und zur Ausschüttung bei </a:t>
-            </a:r>
-            <a:r>
-              <a:rPr lang="de-DE" sz="1800" b="0" i="0" u="none" strike="noStrike" baseline="0" dirty="0">
-                <a:solidFill>
-                  <a:srgbClr val="000000"/>
-                </a:solidFill>
-                <a:highlight>
-                  <a:srgbClr val="00FFFF"/>
-                </a:highlight>
                 <a:latin typeface="Calibri" panose="020F0502020204030204" pitchFamily="34" charset="0"/>
               </a:rPr>
               <a:t>Verkäufen</a:t>
@@ -5835,6 +6188,23 @@
                 <a:latin typeface="Calibri" panose="020F0502020204030204" pitchFamily="34" charset="0"/>
               </a:rPr>
               <a:t>Bank (G2)</a:t>
+            </a:r>
+            <a:br>
+              <a:rPr lang="de-DE" sz="2400" b="0" i="0" u="none" strike="noStrike" baseline="0" dirty="0">
+                <a:solidFill>
+                  <a:srgbClr val="4471C4"/>
+                </a:solidFill>
+                <a:latin typeface="Calibri" panose="020F0502020204030204" pitchFamily="34" charset="0"/>
+              </a:rPr>
+            </a:br>
+            <a:r>
+              <a:rPr lang="de-DE" sz="2400" b="0" i="0" u="none" strike="noStrike" baseline="0" dirty="0">
+                <a:solidFill>
+                  <a:srgbClr val="4471C4"/>
+                </a:solidFill>
+                <a:latin typeface="Calibri" panose="020F0502020204030204" pitchFamily="34" charset="0"/>
+              </a:rPr>
+              <a:t>Entfernen der Verben</a:t>
             </a:r>
             <a:endParaRPr lang="de-DE" dirty="0"/>
           </a:p>

</xml_diff>

<commit_message>
epic and user stories done
</commit_message>
<xml_diff>
--- a/Vorlage_Praesentation_2022_Subgroup_2_4_OOA.pptx
+++ b/Vorlage_Praesentation_2022_Subgroup_2_4_OOA.pptx
@@ -21,10 +21,10 @@
     <p:sldId id="275" r:id="rId9"/>
     <p:sldId id="282" r:id="rId10"/>
     <p:sldId id="273" r:id="rId11"/>
-    <p:sldId id="274" r:id="rId12"/>
-    <p:sldId id="283" r:id="rId13"/>
-    <p:sldId id="284" r:id="rId14"/>
-    <p:sldId id="285" r:id="rId15"/>
+    <p:sldId id="283" r:id="rId12"/>
+    <p:sldId id="284" r:id="rId13"/>
+    <p:sldId id="285" r:id="rId14"/>
+    <p:sldId id="286" r:id="rId15"/>
   </p:sldIdLst>
   <p:sldSz cx="10160000" cy="5715000"/>
   <p:notesSz cx="6858000" cy="9144000"/>
@@ -2054,17 +2054,14 @@
           <a:p>
             <a:r>
               <a:rPr lang="de-DE" sz="2400" dirty="0"/>
-              <a:t>Silvia Wen ()</a:t>
+              <a:t>Silvia Wen</a:t>
             </a:r>
           </a:p>
           <a:p>
             <a:r>
               <a:rPr lang="de-DE" sz="2400" dirty="0"/>
-              <a:t>Muhammad Daryl Rashad (538066)</a:t>
-            </a:r>
-            <a:endParaRPr lang="de-DE" sz="2667" dirty="0"/>
-          </a:p>
-          <a:p>
+              <a:t>Muhammad Daryl Rashad</a:t>
+            </a:r>
             <a:endParaRPr lang="de-DE" sz="2667" dirty="0"/>
           </a:p>
           <a:p>
@@ -2254,138 +2251,39 @@
         </p:nvSpPr>
         <p:spPr/>
         <p:txBody>
-          <a:bodyPr anchor="ctr"/>
+          <a:bodyPr anchor="t"/>
           <a:lstStyle/>
           <a:p>
-            <a:pPr marL="0" indent="0" algn="ctr">
+            <a:pPr marL="457200" indent="-457200">
+              <a:buFont typeface="+mj-lt"/>
+              <a:buAutoNum type="arabicPeriod"/>
+            </a:pPr>
+            <a:r>
+              <a:rPr lang="de-DE" b="1" dirty="0"/>
+              <a:t>Als Kunde möchte ich einen Girokonto eröffnen können, um mein Geld in der Bank aufzubewahren.</a:t>
+            </a:r>
+          </a:p>
+          <a:p>
+            <a:pPr marL="596164" lvl="2" indent="0">
               <a:buNone/>
             </a:pPr>
             <a:r>
-              <a:rPr lang="de-DE" dirty="0">
-                <a:solidFill>
-                  <a:srgbClr val="FF0000"/>
-                </a:solidFill>
-              </a:rPr>
-              <a:t>Fügen Sie bitte Ihre </a:t>
-            </a:r>
-            <a:r>
-              <a:rPr lang="de-DE" dirty="0" err="1">
-                <a:solidFill>
-                  <a:srgbClr val="FF0000"/>
-                </a:solidFill>
-              </a:rPr>
-              <a:t>Epics</a:t>
-            </a:r>
-            <a:r>
-              <a:rPr lang="de-DE" dirty="0">
-                <a:solidFill>
-                  <a:srgbClr val="FF0000"/>
-                </a:solidFill>
-              </a:rPr>
-              <a:t> ein und ordnen sie die </a:t>
-            </a:r>
-            <a:r>
-              <a:rPr lang="de-DE" dirty="0" err="1">
-                <a:solidFill>
-                  <a:srgbClr val="FF0000"/>
-                </a:solidFill>
-              </a:rPr>
-              <a:t>Epics</a:t>
-            </a:r>
-            <a:r>
-              <a:rPr lang="de-DE" dirty="0">
-                <a:solidFill>
-                  <a:srgbClr val="FF0000"/>
-                </a:solidFill>
-              </a:rPr>
-              <a:t> den </a:t>
-            </a:r>
-            <a:r>
-              <a:rPr lang="de-DE" dirty="0" err="1">
-                <a:solidFill>
-                  <a:srgbClr val="FF0000"/>
-                </a:solidFill>
-              </a:rPr>
-              <a:t>Use</a:t>
-            </a:r>
-            <a:r>
-              <a:rPr lang="de-DE" dirty="0">
-                <a:solidFill>
-                  <a:srgbClr val="FF0000"/>
-                </a:solidFill>
-              </a:rPr>
-              <a:t> Cases zu (Verwenden sie die Textschablone für </a:t>
-            </a:r>
-            <a:r>
-              <a:rPr lang="de-DE" dirty="0" err="1">
-                <a:solidFill>
-                  <a:srgbClr val="FF0000"/>
-                </a:solidFill>
-              </a:rPr>
-              <a:t>Use</a:t>
-            </a:r>
-            <a:r>
-              <a:rPr lang="de-DE" dirty="0">
-                <a:solidFill>
-                  <a:srgbClr val="FF0000"/>
-                </a:solidFill>
-              </a:rPr>
-              <a:t> Cases aus der Vorlesung für die Beschreibung der </a:t>
-            </a:r>
-            <a:r>
-              <a:rPr lang="de-DE" dirty="0" err="1">
-                <a:solidFill>
-                  <a:srgbClr val="FF0000"/>
-                </a:solidFill>
-              </a:rPr>
-              <a:t>Epics</a:t>
-            </a:r>
-            <a:r>
-              <a:rPr lang="de-DE" dirty="0">
-                <a:solidFill>
-                  <a:srgbClr val="FF0000"/>
-                </a:solidFill>
-              </a:rPr>
-              <a:t>)</a:t>
-            </a:r>
-          </a:p>
-          <a:p>
-            <a:pPr marL="0" indent="0" algn="ctr">
-              <a:buNone/>
-            </a:pPr>
-            <a:endParaRPr lang="de-DE" dirty="0">
-              <a:solidFill>
-                <a:srgbClr val="FF0000"/>
-              </a:solidFill>
-            </a:endParaRPr>
-          </a:p>
-          <a:p>
-            <a:pPr marL="0" indent="0" algn="ctr">
-              <a:buNone/>
-            </a:pPr>
-            <a:r>
-              <a:rPr lang="de-DE" dirty="0">
-                <a:solidFill>
-                  <a:srgbClr val="FF0000"/>
-                </a:solidFill>
-              </a:rPr>
-              <a:t>Fügen sie ihre User-Stories zu den </a:t>
-            </a:r>
-            <a:r>
-              <a:rPr lang="de-DE" dirty="0" err="1">
-                <a:solidFill>
-                  <a:srgbClr val="FF0000"/>
-                </a:solidFill>
-              </a:rPr>
-              <a:t>Epics</a:t>
-            </a:r>
-            <a:r>
-              <a:rPr lang="de-DE" dirty="0">
-                <a:solidFill>
-                  <a:srgbClr val="FF0000"/>
-                </a:solidFill>
-              </a:rPr>
-              <a:t> ein. Beschreiben sie die User-Stories mit Story-Cards (Textschablone aus der Vorlesung beachten) ein. Vergessen sie nicht die Akzeptanzkriterien für die User-Stories zu beschreiben.</a:t>
+              <a:rPr lang="de-DE" u="sng" dirty="0"/>
+              <a:t>Akzeptanzkriterien:</a:t>
+            </a:r>
+          </a:p>
+          <a:p>
+            <a:pPr lvl="2"/>
+            <a:r>
+              <a:rPr lang="de-DE" dirty="0"/>
+              <a:t>Wenn die Kunde ihre persönliche Daten eingibt, läuft der Girokontoeröffnung weiter.</a:t>
+            </a:r>
+          </a:p>
+          <a:p>
+            <a:pPr lvl="2"/>
+            <a:r>
+              <a:rPr lang="de-DE" dirty="0"/>
+              <a:t>Wenn die Girokontoeröffnung erfolgreich ist, werden die IBAN, der Saldo und die Berechtigung dem Kunden angezeigt. </a:t>
             </a:r>
           </a:p>
         </p:txBody>
@@ -2406,28 +2304,21 @@
           <a:lstStyle/>
           <a:p>
             <a:r>
-              <a:rPr lang="de-DE" dirty="0" err="1"/>
-              <a:t>Epics</a:t>
-            </a:r>
-            <a:r>
               <a:rPr lang="de-DE" dirty="0"/>
-              <a:t> und User-Stories </a:t>
-            </a:r>
-            <a:r>
-              <a:rPr lang="de-DE" sz="1400" dirty="0">
-                <a:solidFill>
-                  <a:srgbClr val="00B050"/>
-                </a:solidFill>
-              </a:rPr>
-              <a:t>(Hinweis: Hier können Sie mehrere Folien erstellen)</a:t>
-            </a:r>
+              <a:t>Epic 1: Konto eröffnen</a:t>
+            </a:r>
+            <a:endParaRPr lang="de-DE" sz="1400" dirty="0">
+              <a:solidFill>
+                <a:srgbClr val="00B050"/>
+              </a:solidFill>
+            </a:endParaRPr>
           </a:p>
         </p:txBody>
       </p:sp>
     </p:spTree>
     <p:extLst>
       <p:ext uri="{BB962C8B-B14F-4D97-AF65-F5344CB8AC3E}">
-        <p14:creationId xmlns:p14="http://schemas.microsoft.com/office/powerpoint/2010/main" val="3211472332"/>
+        <p14:creationId xmlns:p14="http://schemas.microsoft.com/office/powerpoint/2010/main" val="2434018515"/>
       </p:ext>
     </p:extLst>
   </p:cSld>
@@ -2471,11 +2362,11 @@
           <a:p>
             <a:pPr marL="457200" indent="-457200">
               <a:buFont typeface="+mj-lt"/>
-              <a:buAutoNum type="arabicPeriod"/>
+              <a:buAutoNum type="arabicPeriod" startAt="2"/>
             </a:pPr>
             <a:r>
               <a:rPr lang="de-DE" b="1" dirty="0"/>
-              <a:t>Als Kunde möchte ich einen Girokonto eröffnen können, um mein Geld in der Bank aufzubewahren.</a:t>
+              <a:t>Als Kunde möchte ich einen Depotkonto eröffnen können, um mein Aktien hinterlegen zu können.</a:t>
             </a:r>
           </a:p>
           <a:p>
@@ -2491,14 +2382,14 @@
             <a:pPr lvl="2"/>
             <a:r>
               <a:rPr lang="de-DE" dirty="0"/>
-              <a:t>Wenn die Kunde ihre persönliche Daten eingibt, läuft der Girokontoeröffnung weiter.</a:t>
+              <a:t>Wenn die Kunde ihre persönliche Daten und Referenzkonto eingibt, läuft der Depotkontoeröffnung weiter.</a:t>
             </a:r>
           </a:p>
           <a:p>
             <a:pPr lvl="2"/>
             <a:r>
               <a:rPr lang="de-DE" dirty="0"/>
-              <a:t>Wenn die Girokontoeröffnung erfolgreich ist, werden die IBAN, der Saldo und die Berechtigung dem Kunden angezeigt. </a:t>
+              <a:t>Wenn die Depotkontoeröffnung erfolgreich ist, werden die Kontonummer, der Saldo und die Berechtigung dem Kunden gegeben.</a:t>
             </a:r>
           </a:p>
         </p:txBody>
@@ -2533,7 +2424,7 @@
     </p:spTree>
     <p:extLst>
       <p:ext uri="{BB962C8B-B14F-4D97-AF65-F5344CB8AC3E}">
-        <p14:creationId xmlns:p14="http://schemas.microsoft.com/office/powerpoint/2010/main" val="2434018515"/>
+        <p14:creationId xmlns:p14="http://schemas.microsoft.com/office/powerpoint/2010/main" val="4199853890"/>
       </p:ext>
     </p:extLst>
   </p:cSld>
@@ -2577,11 +2468,11 @@
           <a:p>
             <a:pPr marL="457200" indent="-457200">
               <a:buFont typeface="+mj-lt"/>
-              <a:buAutoNum type="arabicPeriod" startAt="2"/>
+              <a:buAutoNum type="arabicPeriod"/>
             </a:pPr>
             <a:r>
               <a:rPr lang="de-DE" b="1" dirty="0"/>
-              <a:t>Als Kunde möchte ich einen Depotkonto eröffnen können, um mein Aktien hinterlegen zu können.</a:t>
+              <a:t>Als Kunde möchte ich die Liste der Posten in meinem Depot ansehen können, um die gesamte Werte meiner Aktien zu überwachen.</a:t>
             </a:r>
           </a:p>
           <a:p>
@@ -2597,15 +2488,19 @@
             <a:pPr lvl="2"/>
             <a:r>
               <a:rPr lang="de-DE" dirty="0"/>
-              <a:t>Wenn die Kunde ihre persönliche Daten und Referenzkonto eingibt, läuft der Depotkontoeröffnung weiter.</a:t>
+              <a:t>Die Kunde kann ihre Kontonummer und Personalausweis eingeben, um die Identität zu verifizieren, falls sie noch nicht verifiziert ist.</a:t>
             </a:r>
           </a:p>
           <a:p>
             <a:pPr lvl="2"/>
             <a:r>
               <a:rPr lang="de-DE" dirty="0"/>
-              <a:t>Wenn die Depotkontoeröffnung erfolgreich ist, werden die Kontonummer, der Saldo und die Berechtigung dem Kunden gegeben.</a:t>
-            </a:r>
+              <a:t>Nach der Verifizierung bekommt der Kunde die Liste der Posten in ihrem Depot und die gesamte Saldo des Depots angezeigt.</a:t>
+            </a:r>
+          </a:p>
+          <a:p>
+            <a:pPr lvl="2"/>
+            <a:endParaRPr lang="de-DE" dirty="0"/>
           </a:p>
         </p:txBody>
       </p:sp>
@@ -2626,7 +2521,7 @@
           <a:p>
             <a:r>
               <a:rPr lang="de-DE" dirty="0"/>
-              <a:t>Epic 1: Konto eröffnen</a:t>
+              <a:t>Epic 2: Posten ansehen</a:t>
             </a:r>
             <a:endParaRPr lang="de-DE" sz="1400" dirty="0">
               <a:solidFill>
@@ -2639,7 +2534,7 @@
     </p:spTree>
     <p:extLst>
       <p:ext uri="{BB962C8B-B14F-4D97-AF65-F5344CB8AC3E}">
-        <p14:creationId xmlns:p14="http://schemas.microsoft.com/office/powerpoint/2010/main" val="4199853890"/>
+        <p14:creationId xmlns:p14="http://schemas.microsoft.com/office/powerpoint/2010/main" val="231201351"/>
       </p:ext>
     </p:extLst>
   </p:cSld>
@@ -2687,7 +2582,7 @@
             </a:pPr>
             <a:r>
               <a:rPr lang="de-DE" b="1" dirty="0"/>
-              <a:t>Als Kunde möchte ich einen Depotkonto eröffnen können, um mein Aktien hinterlegen zu können.</a:t>
+              <a:t>Als Kunde möchte ich die Details der einzelnen Posten in meinem Depots sehen können, um eine Entscheidung über den Verkauf zu treffen.</a:t>
             </a:r>
           </a:p>
           <a:p>
@@ -2703,14 +2598,14 @@
             <a:pPr lvl="2"/>
             <a:r>
               <a:rPr lang="de-DE" dirty="0"/>
-              <a:t>Wenn die Kunde ihre persönliche Daten und Referenzkonto eingibt, läuft der Depotkontoeröffnung weiter.</a:t>
+              <a:t>Die Kunde kann ihre Kontonummer und Personalausweis eingeben, um die Identität zu verifizieren, falls sie noch nicht verifiziert ist.</a:t>
             </a:r>
           </a:p>
           <a:p>
             <a:pPr lvl="2"/>
             <a:r>
               <a:rPr lang="de-DE" dirty="0"/>
-              <a:t>Wenn die Depotkontoeröffnung erfolgreich ist, werden die Kontonummer und Berechtigung dem Kunden gegeben.</a:t>
+              <a:t>Nach der Verifizierung bekommt der Kunde der Verlauf der Tageskurse, die Wertpapierkennnummer und andere Details von dem einzelnen Posten angezeigt.</a:t>
             </a:r>
           </a:p>
         </p:txBody>
@@ -2732,7 +2627,7 @@
           <a:p>
             <a:r>
               <a:rPr lang="de-DE" dirty="0"/>
-              <a:t>Epic 2: A</a:t>
+              <a:t>Epic 2: Posten ansehen</a:t>
             </a:r>
             <a:endParaRPr lang="de-DE" sz="1400" dirty="0">
               <a:solidFill>
@@ -2745,7 +2640,7 @@
     </p:spTree>
     <p:extLst>
       <p:ext uri="{BB962C8B-B14F-4D97-AF65-F5344CB8AC3E}">
-        <p14:creationId xmlns:p14="http://schemas.microsoft.com/office/powerpoint/2010/main" val="231201351"/>
+        <p14:creationId xmlns:p14="http://schemas.microsoft.com/office/powerpoint/2010/main" val="2759166135"/>
       </p:ext>
     </p:extLst>
   </p:cSld>

</xml_diff>

<commit_message>
fixed based on feedback
</commit_message>
<xml_diff>
--- a/Vorlage_Praesentation_2022_Subgroup_2_4_OOA.pptx
+++ b/Vorlage_Praesentation_2022_Subgroup_2_4_OOA.pptx
@@ -159,13 +159,113 @@
 <file path=ppt/revisionInfo.xml><?xml version="1.0" encoding="utf-8"?>
 <p1510:revInfo xmlns:a="http://schemas.openxmlformats.org/drawingml/2006/main" xmlns:r="http://schemas.openxmlformats.org/officeDocument/2006/relationships" xmlns:p1510="http://schemas.microsoft.com/office/powerpoint/2015/10/main">
   <p1510:revLst>
-    <p1510:client id="{B0CAD78C-A8C2-4822-8F0B-73EBA05ED240}" v="2" dt="2022-12-06T16:40:13.911"/>
+    <p1510:client id="{9A5423AC-A219-4E59-9E7F-D04EF45BABF4}" v="2" dt="2022-12-11T16:16:33.358"/>
   </p1510:revLst>
 </p1510:revInfo>
 </file>
 
 <file path=ppt/changesInfos/changesInfo1.xml><?xml version="1.0" encoding="utf-8"?>
 <pc:chgInfo xmlns:a="http://schemas.openxmlformats.org/drawingml/2006/main" xmlns:r="http://schemas.openxmlformats.org/officeDocument/2006/relationships" xmlns:ac="http://schemas.microsoft.com/office/drawing/2013/main/command" xmlns:pc="http://schemas.microsoft.com/office/powerpoint/2013/main/command">
+  <pc:docChgLst>
+    <pc:chgData name="Silvia Wen" userId="fa3c34b288dc686c" providerId="LiveId" clId="{9A5423AC-A219-4E59-9E7F-D04EF45BABF4}"/>
+    <pc:docChg chg="custSel modSld">
+      <pc:chgData name="Silvia Wen" userId="fa3c34b288dc686c" providerId="LiveId" clId="{9A5423AC-A219-4E59-9E7F-D04EF45BABF4}" dt="2022-12-11T16:17:23.124" v="17" actId="113"/>
+      <pc:docMkLst>
+        <pc:docMk/>
+      </pc:docMkLst>
+      <pc:sldChg chg="addSp delSp modSp mod">
+        <pc:chgData name="Silvia Wen" userId="fa3c34b288dc686c" providerId="LiveId" clId="{9A5423AC-A219-4E59-9E7F-D04EF45BABF4}" dt="2022-12-11T16:01:20.637" v="10" actId="1076"/>
+        <pc:sldMkLst>
+          <pc:docMk/>
+          <pc:sldMk cId="138220384" sldId="257"/>
+        </pc:sldMkLst>
+        <pc:picChg chg="del">
+          <ac:chgData name="Silvia Wen" userId="fa3c34b288dc686c" providerId="LiveId" clId="{9A5423AC-A219-4E59-9E7F-D04EF45BABF4}" dt="2022-12-11T15:58:30.593" v="5" actId="478"/>
+          <ac:picMkLst>
+            <pc:docMk/>
+            <pc:sldMk cId="138220384" sldId="257"/>
+            <ac:picMk id="3" creationId="{46ABA154-3415-E55B-9279-A591E3A1A454}"/>
+          </ac:picMkLst>
+        </pc:picChg>
+        <pc:picChg chg="add mod">
+          <ac:chgData name="Silvia Wen" userId="fa3c34b288dc686c" providerId="LiveId" clId="{9A5423AC-A219-4E59-9E7F-D04EF45BABF4}" dt="2022-12-11T16:01:20.637" v="10" actId="1076"/>
+          <ac:picMkLst>
+            <pc:docMk/>
+            <pc:sldMk cId="138220384" sldId="257"/>
+            <ac:picMk id="3" creationId="{65A013B5-7489-7E17-611E-AB2DAEC9FF84}"/>
+          </ac:picMkLst>
+        </pc:picChg>
+      </pc:sldChg>
+      <pc:sldChg chg="addSp delSp modSp mod">
+        <pc:chgData name="Silvia Wen" userId="fa3c34b288dc686c" providerId="LiveId" clId="{9A5423AC-A219-4E59-9E7F-D04EF45BABF4}" dt="2022-12-11T16:16:36.257" v="13" actId="1076"/>
+        <pc:sldMkLst>
+          <pc:docMk/>
+          <pc:sldMk cId="3064782011" sldId="273"/>
+        </pc:sldMkLst>
+        <pc:picChg chg="del">
+          <ac:chgData name="Silvia Wen" userId="fa3c34b288dc686c" providerId="LiveId" clId="{9A5423AC-A219-4E59-9E7F-D04EF45BABF4}" dt="2022-12-11T16:00:38.122" v="6" actId="478"/>
+          <ac:picMkLst>
+            <pc:docMk/>
+            <pc:sldMk cId="3064782011" sldId="273"/>
+            <ac:picMk id="3" creationId="{C7C179A8-7397-BBA2-3D2F-D0C7086CB5DD}"/>
+          </ac:picMkLst>
+        </pc:picChg>
+        <pc:picChg chg="add mod">
+          <ac:chgData name="Silvia Wen" userId="fa3c34b288dc686c" providerId="LiveId" clId="{9A5423AC-A219-4E59-9E7F-D04EF45BABF4}" dt="2022-12-11T16:16:36.257" v="13" actId="1076"/>
+          <ac:picMkLst>
+            <pc:docMk/>
+            <pc:sldMk cId="3064782011" sldId="273"/>
+            <ac:picMk id="6" creationId="{49759A96-61D6-79A9-136A-A721A0B6FB53}"/>
+          </ac:picMkLst>
+        </pc:picChg>
+      </pc:sldChg>
+      <pc:sldChg chg="modSp mod">
+        <pc:chgData name="Silvia Wen" userId="fa3c34b288dc686c" providerId="LiveId" clId="{9A5423AC-A219-4E59-9E7F-D04EF45BABF4}" dt="2022-12-11T15:57:37.612" v="1" actId="400"/>
+        <pc:sldMkLst>
+          <pc:docMk/>
+          <pc:sldMk cId="826796080" sldId="280"/>
+        </pc:sldMkLst>
+        <pc:spChg chg="mod">
+          <ac:chgData name="Silvia Wen" userId="fa3c34b288dc686c" providerId="LiveId" clId="{9A5423AC-A219-4E59-9E7F-D04EF45BABF4}" dt="2022-12-11T15:57:37.612" v="1" actId="400"/>
+          <ac:spMkLst>
+            <pc:docMk/>
+            <pc:sldMk cId="826796080" sldId="280"/>
+            <ac:spMk id="5" creationId="{00000000-0000-0000-0000-000000000000}"/>
+          </ac:spMkLst>
+        </pc:spChg>
+      </pc:sldChg>
+      <pc:sldChg chg="modSp mod">
+        <pc:chgData name="Silvia Wen" userId="fa3c34b288dc686c" providerId="LiveId" clId="{9A5423AC-A219-4E59-9E7F-D04EF45BABF4}" dt="2022-12-11T15:57:57.874" v="4" actId="400"/>
+        <pc:sldMkLst>
+          <pc:docMk/>
+          <pc:sldMk cId="784046229" sldId="281"/>
+        </pc:sldMkLst>
+        <pc:spChg chg="mod">
+          <ac:chgData name="Silvia Wen" userId="fa3c34b288dc686c" providerId="LiveId" clId="{9A5423AC-A219-4E59-9E7F-D04EF45BABF4}" dt="2022-12-11T15:57:57.874" v="4" actId="400"/>
+          <ac:spMkLst>
+            <pc:docMk/>
+            <pc:sldMk cId="784046229" sldId="281"/>
+            <ac:spMk id="5" creationId="{00000000-0000-0000-0000-000000000000}"/>
+          </ac:spMkLst>
+        </pc:spChg>
+      </pc:sldChg>
+      <pc:sldChg chg="modSp mod">
+        <pc:chgData name="Silvia Wen" userId="fa3c34b288dc686c" providerId="LiveId" clId="{9A5423AC-A219-4E59-9E7F-D04EF45BABF4}" dt="2022-12-11T16:17:23.124" v="17" actId="113"/>
+        <pc:sldMkLst>
+          <pc:docMk/>
+          <pc:sldMk cId="1449993590" sldId="282"/>
+        </pc:sldMkLst>
+        <pc:spChg chg="mod">
+          <ac:chgData name="Silvia Wen" userId="fa3c34b288dc686c" providerId="LiveId" clId="{9A5423AC-A219-4E59-9E7F-D04EF45BABF4}" dt="2022-12-11T16:17:23.124" v="17" actId="113"/>
+          <ac:spMkLst>
+            <pc:docMk/>
+            <pc:sldMk cId="1449993590" sldId="282"/>
+            <ac:spMk id="5" creationId="{00000000-0000-0000-0000-000000000000}"/>
+          </ac:spMkLst>
+        </pc:spChg>
+      </pc:sldChg>
+    </pc:docChg>
+  </pc:docChgLst>
   <pc:docChgLst>
     <pc:chgData name="Silvia Wen" userId="fa3c34b288dc686c" providerId="LiveId" clId="{B0CAD78C-A8C2-4822-8F0B-73EBA05ED240}"/>
     <pc:docChg chg="undo custSel addSld delSld modSld sldOrd">
@@ -385,7 +485,7 @@
                 <a:latin typeface="Arial" panose="020B0604020202020204" pitchFamily="34" charset="0"/>
                 <a:cs typeface="Arial" panose="020B0604020202020204" pitchFamily="34" charset="0"/>
               </a:rPr>
-              <a:t>07.12.2022</a:t>
+              <a:t>11.12.2022</a:t>
             </a:fld>
             <a:endParaRPr lang="de-DE">
               <a:latin typeface="Arial" panose="020B0604020202020204" pitchFamily="34" charset="0"/>
@@ -460,7 +560,7 @@
                 <a:latin typeface="Arial" panose="020B0604020202020204" pitchFamily="34" charset="0"/>
                 <a:cs typeface="Arial" panose="020B0604020202020204" pitchFamily="34" charset="0"/>
               </a:rPr>
-              <a:t>‹#›</a:t>
+              <a:t>‹Nr.›</a:t>
             </a:fld>
             <a:endParaRPr lang="de-DE">
               <a:latin typeface="Arial" panose="020B0604020202020204" pitchFamily="34" charset="0"/>
@@ -569,7 +669,7 @@
             <a:fld id="{5801EACB-8D12-49F2-9088-5A635C50DDBD}" type="datetimeFigureOut">
               <a:rPr lang="de-DE" smtClean="0"/>
               <a:pPr/>
-              <a:t>07.12.2022</a:t>
+              <a:t>11.12.2022</a:t>
             </a:fld>
             <a:endParaRPr lang="de-DE"/>
           </a:p>
@@ -734,7 +834,7 @@
             <a:fld id="{272E3E51-A3F3-4FD4-9C75-1C612CCCCA5A}" type="slidenum">
               <a:rPr lang="de-DE" smtClean="0"/>
               <a:pPr/>
-              <a:t>‹#›</a:t>
+              <a:t>‹Nr.›</a:t>
             </a:fld>
             <a:endParaRPr lang="de-DE"/>
           </a:p>
@@ -990,7 +1090,7 @@
             <a:fld id="{911D8C60-1F2D-4436-BF53-22882F494404}" type="datetimeFigureOut">
               <a:rPr lang="de-DE" smtClean="0"/>
               <a:pPr/>
-              <a:t>07.12.2022</a:t>
+              <a:t>11.12.2022</a:t>
             </a:fld>
             <a:endParaRPr lang="de-DE" dirty="0"/>
           </a:p>
@@ -1057,7 +1157,7 @@
             <a:fld id="{83B23FF1-3F66-4904-91CE-1AE4A5050627}" type="slidenum">
               <a:rPr lang="de-DE" smtClean="0"/>
               <a:pPr/>
-              <a:t>‹#›</a:t>
+              <a:t>‹Nr.›</a:t>
             </a:fld>
             <a:endParaRPr lang="de-DE" dirty="0"/>
           </a:p>
@@ -1599,7 +1699,7 @@
                   <a:spcPct val="50000"/>
                 </a:spcBef>
               </a:pPr>
-              <a:t>‹#›</a:t>
+              <a:t>‹Nr.›</a:t>
             </a:fld>
             <a:endParaRPr lang="de-DE" altLang="de-DE" sz="1111" dirty="0">
               <a:solidFill>
@@ -2175,10 +2275,10 @@
       </p:sp>
       <p:pic>
         <p:nvPicPr>
-          <p:cNvPr id="3" name="Picture 2">
+          <p:cNvPr id="6" name="Grafik 5">
             <a:extLst>
               <a:ext uri="{FF2B5EF4-FFF2-40B4-BE49-F238E27FC236}">
-                <a16:creationId xmlns:a16="http://schemas.microsoft.com/office/drawing/2014/main" id="{C7C179A8-7397-BBA2-3D2F-D0C7086CB5DD}"/>
+                <a16:creationId xmlns:a16="http://schemas.microsoft.com/office/drawing/2014/main" id="{49759A96-61D6-79A9-136A-A721A0B6FB53}"/>
               </a:ext>
             </a:extLst>
           </p:cNvPr>
@@ -2201,8 +2301,8 @@
         </p:blipFill>
         <p:spPr>
           <a:xfrm>
-            <a:off x="2144295" y="1296412"/>
-            <a:ext cx="5871409" cy="3851019"/>
+            <a:off x="1691899" y="1176546"/>
+            <a:ext cx="6485166" cy="4090751"/>
           </a:xfrm>
           <a:prstGeom prst="rect">
             <a:avLst/>
@@ -4256,7 +4356,10 @@
               <a:t> der verschiedenen </a:t>
             </a:r>
             <a:r>
-              <a:rPr lang="de-DE" sz="1800" b="0" i="0" u="none" baseline="0" dirty="0">
+              <a:rPr lang="de-DE" sz="1800" b="0" i="0" u="none" strike="sngStrike" baseline="0" dirty="0">
+                <a:solidFill>
+                  <a:srgbClr val="00B0F0"/>
+                </a:solidFill>
                 <a:highlight>
                   <a:srgbClr val="FFFF00"/>
                 </a:highlight>
@@ -4873,7 +4976,10 @@
               <a:t> der verschiedenen </a:t>
             </a:r>
             <a:r>
-              <a:rPr lang="de-DE" sz="1800" b="1" i="0" u="none" baseline="0" dirty="0">
+              <a:rPr lang="de-DE" sz="1800" i="0" u="none" strike="sngStrike" baseline="0" dirty="0">
+                <a:solidFill>
+                  <a:srgbClr val="00B0F0"/>
+                </a:solidFill>
                 <a:highlight>
                   <a:srgbClr val="FFFF00"/>
                 </a:highlight>
@@ -5237,10 +5343,10 @@
       </p:sp>
       <p:pic>
         <p:nvPicPr>
-          <p:cNvPr id="3" name="Picture 2">
+          <p:cNvPr id="3" name="Grafik 2">
             <a:extLst>
               <a:ext uri="{FF2B5EF4-FFF2-40B4-BE49-F238E27FC236}">
-                <a16:creationId xmlns:a16="http://schemas.microsoft.com/office/drawing/2014/main" id="{46ABA154-3415-E55B-9279-A591E3A1A454}"/>
+                <a16:creationId xmlns:a16="http://schemas.microsoft.com/office/drawing/2014/main" id="{65A013B5-7489-7E17-611E-AB2DAEC9FF84}"/>
               </a:ext>
             </a:extLst>
           </p:cNvPr>
@@ -5263,8 +5369,8 @@
         </p:blipFill>
         <p:spPr>
           <a:xfrm>
-            <a:off x="910672" y="1169541"/>
-            <a:ext cx="8047619" cy="4104762"/>
+            <a:off x="346129" y="1561356"/>
+            <a:ext cx="9176705" cy="2952328"/>
           </a:xfrm>
           <a:prstGeom prst="rect">
             <a:avLst/>
@@ -5737,6 +5843,27 @@
               <a:t>. Hierzu müssen der Name und die Adresse </a:t>
             </a:r>
             <a:r>
+              <a:rPr lang="de-DE" sz="1800" b="1" i="0" u="none" baseline="0" dirty="0">
+                <a:solidFill>
+                  <a:srgbClr val="000000"/>
+                </a:solidFill>
+                <a:highlight>
+                  <a:srgbClr val="00FFFF"/>
+                </a:highlight>
+                <a:latin typeface="Calibri" panose="020F0502020204030204" pitchFamily="34" charset="0"/>
+              </a:rPr>
+              <a:t>hinterlegt</a:t>
+            </a:r>
+            <a:r>
+              <a:rPr lang="de-DE" sz="1800" b="0" i="0" u="none" strike="noStrike" baseline="0" dirty="0">
+                <a:solidFill>
+                  <a:srgbClr val="000000"/>
+                </a:solidFill>
+                <a:latin typeface="Calibri" panose="020F0502020204030204" pitchFamily="34" charset="0"/>
+              </a:rPr>
+              <a:t> werden. Alle Konten </a:t>
+            </a:r>
+            <a:r>
               <a:rPr lang="de-DE" sz="1800" b="0" i="0" u="none" strike="sngStrike" baseline="0" dirty="0">
                 <a:solidFill>
                   <a:srgbClr val="000000"/>
@@ -5746,7 +5873,7 @@
                 </a:highlight>
                 <a:latin typeface="Calibri" panose="020F0502020204030204" pitchFamily="34" charset="0"/>
               </a:rPr>
-              <a:t>hinterlegt</a:t>
+              <a:t>haben</a:t>
             </a:r>
             <a:r>
               <a:rPr lang="de-DE" sz="1800" b="0" i="0" u="none" strike="noStrike" baseline="0" dirty="0">
@@ -5755,7 +5882,7 @@
                 </a:solidFill>
                 <a:latin typeface="Calibri" panose="020F0502020204030204" pitchFamily="34" charset="0"/>
               </a:rPr>
-              <a:t> werden. Alle Konten </a:t>
+              <a:t> einen Saldo, welcher </a:t>
             </a:r>
             <a:r>
               <a:rPr lang="de-DE" sz="1800" b="0" i="0" u="none" strike="sngStrike" baseline="0" dirty="0">
@@ -5767,7 +5894,7 @@
                 </a:highlight>
                 <a:latin typeface="Calibri" panose="020F0502020204030204" pitchFamily="34" charset="0"/>
               </a:rPr>
-              <a:t>haben</a:t>
+              <a:t>angibt</a:t>
             </a:r>
             <a:r>
               <a:rPr lang="de-DE" sz="1800" b="0" i="0" u="none" strike="noStrike" baseline="0" dirty="0">
@@ -5776,7 +5903,7 @@
                 </a:solidFill>
                 <a:latin typeface="Calibri" panose="020F0502020204030204" pitchFamily="34" charset="0"/>
               </a:rPr>
-              <a:t> einen Saldo, welcher </a:t>
+              <a:t>, was für ein Wert sich aktuell auf dem Konto </a:t>
             </a:r>
             <a:r>
               <a:rPr lang="de-DE" sz="1800" b="0" i="0" u="none" strike="sngStrike" baseline="0" dirty="0">
@@ -5788,7 +5915,7 @@
                 </a:highlight>
                 <a:latin typeface="Calibri" panose="020F0502020204030204" pitchFamily="34" charset="0"/>
               </a:rPr>
-              <a:t>angibt</a:t>
+              <a:t>befindet</a:t>
             </a:r>
             <a:r>
               <a:rPr lang="de-DE" sz="1800" b="0" i="0" u="none" strike="noStrike" baseline="0" dirty="0">
@@ -5797,7 +5924,7 @@
                 </a:solidFill>
                 <a:latin typeface="Calibri" panose="020F0502020204030204" pitchFamily="34" charset="0"/>
               </a:rPr>
-              <a:t>, was für ein Wert sich aktuell auf dem Konto </a:t>
+              <a:t>. Girokonten </a:t>
             </a:r>
             <a:r>
               <a:rPr lang="de-DE" sz="1800" b="0" i="0" u="none" strike="sngStrike" baseline="0" dirty="0">
@@ -5809,7 +5936,7 @@
                 </a:highlight>
                 <a:latin typeface="Calibri" panose="020F0502020204030204" pitchFamily="34" charset="0"/>
               </a:rPr>
-              <a:t>befindet</a:t>
+              <a:t>sind</a:t>
             </a:r>
             <a:r>
               <a:rPr lang="de-DE" sz="1800" b="0" i="0" u="none" strike="noStrike" baseline="0" dirty="0">
@@ -5818,7 +5945,7 @@
                 </a:solidFill>
                 <a:latin typeface="Calibri" panose="020F0502020204030204" pitchFamily="34" charset="0"/>
               </a:rPr>
-              <a:t>. Girokonten </a:t>
+              <a:t> die ganz normalen Konten, sie werden durch eine eindeutige IBAN </a:t>
             </a:r>
             <a:r>
               <a:rPr lang="de-DE" sz="1800" b="0" i="0" u="none" strike="sngStrike" baseline="0" dirty="0">
@@ -5830,7 +5957,7 @@
                 </a:highlight>
                 <a:latin typeface="Calibri" panose="020F0502020204030204" pitchFamily="34" charset="0"/>
               </a:rPr>
-              <a:t>sind</a:t>
+              <a:t>identifiziert</a:t>
             </a:r>
             <a:r>
               <a:rPr lang="de-DE" sz="1800" b="0" i="0" u="none" strike="noStrike" baseline="0" dirty="0">
@@ -5839,7 +5966,7 @@
                 </a:solidFill>
                 <a:latin typeface="Calibri" panose="020F0502020204030204" pitchFamily="34" charset="0"/>
               </a:rPr>
-              <a:t> die ganz normalen Konten, sie werden durch eine eindeutige IBAN </a:t>
+              <a:t>. Zudem </a:t>
             </a:r>
             <a:r>
               <a:rPr lang="de-DE" sz="1800" b="0" i="0" u="none" strike="sngStrike" baseline="0" dirty="0">
@@ -5851,52 +5978,31 @@
                 </a:highlight>
                 <a:latin typeface="Calibri" panose="020F0502020204030204" pitchFamily="34" charset="0"/>
               </a:rPr>
-              <a:t>identifiziert</a:t>
+              <a:t>gibt</a:t>
             </a:r>
             <a:r>
               <a:rPr lang="de-DE" sz="1800" b="0" i="0" u="none" strike="noStrike" baseline="0" dirty="0">
                 <a:solidFill>
                   <a:srgbClr val="000000"/>
                 </a:solidFill>
-                <a:latin typeface="Calibri" panose="020F0502020204030204" pitchFamily="34" charset="0"/>
-              </a:rPr>
-              <a:t>. Zudem </a:t>
-            </a:r>
-            <a:r>
-              <a:rPr lang="de-DE" sz="1800" b="0" i="0" u="none" strike="sngStrike" baseline="0" dirty="0">
+                <a:highlight>
+                  <a:srgbClr val="00FFFF"/>
+                </a:highlight>
+                <a:latin typeface="Calibri" panose="020F0502020204030204" pitchFamily="34" charset="0"/>
+              </a:rPr>
+              <a:t> </a:t>
+            </a:r>
+            <a:r>
+              <a:rPr lang="de-DE" sz="1800" b="0" i="0" u="none" strike="noStrike" baseline="0" dirty="0">
                 <a:solidFill>
                   <a:srgbClr val="000000"/>
                 </a:solidFill>
-                <a:highlight>
-                  <a:srgbClr val="00FFFF"/>
-                </a:highlight>
-                <a:latin typeface="Calibri" panose="020F0502020204030204" pitchFamily="34" charset="0"/>
-              </a:rPr>
-              <a:t>gibt</a:t>
-            </a:r>
-            <a:r>
-              <a:rPr lang="de-DE" sz="1800" b="0" i="0" u="none" strike="noStrike" baseline="0" dirty="0">
-                <a:solidFill>
-                  <a:srgbClr val="000000"/>
-                </a:solidFill>
-                <a:highlight>
-                  <a:srgbClr val="00FFFF"/>
-                </a:highlight>
-                <a:latin typeface="Calibri" panose="020F0502020204030204" pitchFamily="34" charset="0"/>
-              </a:rPr>
-              <a:t> </a:t>
-            </a:r>
-            <a:r>
-              <a:rPr lang="de-DE" sz="1800" b="0" i="0" u="none" strike="noStrike" baseline="0" dirty="0">
-                <a:solidFill>
-                  <a:srgbClr val="000000"/>
-                </a:solidFill>
                 <a:latin typeface="Calibri" panose="020F0502020204030204" pitchFamily="34" charset="0"/>
               </a:rPr>
               <a:t>es Depotkonten, in dem die von den Kunden gekauften Aktien </a:t>
             </a:r>
             <a:r>
-              <a:rPr lang="de-DE" sz="1800" b="0" i="0" u="none" strike="sngStrike" baseline="0" dirty="0">
+              <a:rPr lang="de-DE" sz="1800" b="1" i="0" u="none" baseline="0" dirty="0">
                 <a:solidFill>
                   <a:srgbClr val="000000"/>
                 </a:solidFill>

</xml_diff>

<commit_message>
cleaned up anforderungstext and user stories
</commit_message>
<xml_diff>
--- a/Vorlage_Praesentation_2022_Subgroup_2_4_OOA.pptx
+++ b/Vorlage_Praesentation_2022_Subgroup_2_4_OOA.pptx
@@ -5,10 +5,10 @@
     <p:sldMasterId id="2147483696" r:id="rId1"/>
   </p:sldMasterIdLst>
   <p:notesMasterIdLst>
-    <p:notesMasterId r:id="rId16"/>
+    <p:notesMasterId r:id="rId17"/>
   </p:notesMasterIdLst>
   <p:handoutMasterIdLst>
-    <p:handoutMasterId r:id="rId17"/>
+    <p:handoutMasterId r:id="rId18"/>
   </p:handoutMasterIdLst>
   <p:sldIdLst>
     <p:sldId id="256" r:id="rId2"/>
@@ -20,11 +20,12 @@
     <p:sldId id="257" r:id="rId8"/>
     <p:sldId id="275" r:id="rId9"/>
     <p:sldId id="282" r:id="rId10"/>
-    <p:sldId id="273" r:id="rId11"/>
-    <p:sldId id="283" r:id="rId12"/>
-    <p:sldId id="284" r:id="rId13"/>
-    <p:sldId id="285" r:id="rId14"/>
-    <p:sldId id="286" r:id="rId15"/>
+    <p:sldId id="287" r:id="rId11"/>
+    <p:sldId id="273" r:id="rId12"/>
+    <p:sldId id="283" r:id="rId13"/>
+    <p:sldId id="284" r:id="rId14"/>
+    <p:sldId id="285" r:id="rId15"/>
+    <p:sldId id="286" r:id="rId16"/>
   </p:sldIdLst>
   <p:sldSz cx="10160000" cy="5715000"/>
   <p:notesSz cx="6858000" cy="9144000"/>
@@ -167,106 +168,6 @@
 <file path=ppt/changesInfos/changesInfo1.xml><?xml version="1.0" encoding="utf-8"?>
 <pc:chgInfo xmlns:a="http://schemas.openxmlformats.org/drawingml/2006/main" xmlns:r="http://schemas.openxmlformats.org/officeDocument/2006/relationships" xmlns:ac="http://schemas.microsoft.com/office/drawing/2013/main/command" xmlns:pc="http://schemas.microsoft.com/office/powerpoint/2013/main/command">
   <pc:docChgLst>
-    <pc:chgData name="Silvia Wen" userId="fa3c34b288dc686c" providerId="LiveId" clId="{9A5423AC-A219-4E59-9E7F-D04EF45BABF4}"/>
-    <pc:docChg chg="custSel modSld">
-      <pc:chgData name="Silvia Wen" userId="fa3c34b288dc686c" providerId="LiveId" clId="{9A5423AC-A219-4E59-9E7F-D04EF45BABF4}" dt="2022-12-11T16:17:23.124" v="17" actId="113"/>
-      <pc:docMkLst>
-        <pc:docMk/>
-      </pc:docMkLst>
-      <pc:sldChg chg="addSp delSp modSp mod">
-        <pc:chgData name="Silvia Wen" userId="fa3c34b288dc686c" providerId="LiveId" clId="{9A5423AC-A219-4E59-9E7F-D04EF45BABF4}" dt="2022-12-11T16:01:20.637" v="10" actId="1076"/>
-        <pc:sldMkLst>
-          <pc:docMk/>
-          <pc:sldMk cId="138220384" sldId="257"/>
-        </pc:sldMkLst>
-        <pc:picChg chg="del">
-          <ac:chgData name="Silvia Wen" userId="fa3c34b288dc686c" providerId="LiveId" clId="{9A5423AC-A219-4E59-9E7F-D04EF45BABF4}" dt="2022-12-11T15:58:30.593" v="5" actId="478"/>
-          <ac:picMkLst>
-            <pc:docMk/>
-            <pc:sldMk cId="138220384" sldId="257"/>
-            <ac:picMk id="3" creationId="{46ABA154-3415-E55B-9279-A591E3A1A454}"/>
-          </ac:picMkLst>
-        </pc:picChg>
-        <pc:picChg chg="add mod">
-          <ac:chgData name="Silvia Wen" userId="fa3c34b288dc686c" providerId="LiveId" clId="{9A5423AC-A219-4E59-9E7F-D04EF45BABF4}" dt="2022-12-11T16:01:20.637" v="10" actId="1076"/>
-          <ac:picMkLst>
-            <pc:docMk/>
-            <pc:sldMk cId="138220384" sldId="257"/>
-            <ac:picMk id="3" creationId="{65A013B5-7489-7E17-611E-AB2DAEC9FF84}"/>
-          </ac:picMkLst>
-        </pc:picChg>
-      </pc:sldChg>
-      <pc:sldChg chg="addSp delSp modSp mod">
-        <pc:chgData name="Silvia Wen" userId="fa3c34b288dc686c" providerId="LiveId" clId="{9A5423AC-A219-4E59-9E7F-D04EF45BABF4}" dt="2022-12-11T16:16:36.257" v="13" actId="1076"/>
-        <pc:sldMkLst>
-          <pc:docMk/>
-          <pc:sldMk cId="3064782011" sldId="273"/>
-        </pc:sldMkLst>
-        <pc:picChg chg="del">
-          <ac:chgData name="Silvia Wen" userId="fa3c34b288dc686c" providerId="LiveId" clId="{9A5423AC-A219-4E59-9E7F-D04EF45BABF4}" dt="2022-12-11T16:00:38.122" v="6" actId="478"/>
-          <ac:picMkLst>
-            <pc:docMk/>
-            <pc:sldMk cId="3064782011" sldId="273"/>
-            <ac:picMk id="3" creationId="{C7C179A8-7397-BBA2-3D2F-D0C7086CB5DD}"/>
-          </ac:picMkLst>
-        </pc:picChg>
-        <pc:picChg chg="add mod">
-          <ac:chgData name="Silvia Wen" userId="fa3c34b288dc686c" providerId="LiveId" clId="{9A5423AC-A219-4E59-9E7F-D04EF45BABF4}" dt="2022-12-11T16:16:36.257" v="13" actId="1076"/>
-          <ac:picMkLst>
-            <pc:docMk/>
-            <pc:sldMk cId="3064782011" sldId="273"/>
-            <ac:picMk id="6" creationId="{49759A96-61D6-79A9-136A-A721A0B6FB53}"/>
-          </ac:picMkLst>
-        </pc:picChg>
-      </pc:sldChg>
-      <pc:sldChg chg="modSp mod">
-        <pc:chgData name="Silvia Wen" userId="fa3c34b288dc686c" providerId="LiveId" clId="{9A5423AC-A219-4E59-9E7F-D04EF45BABF4}" dt="2022-12-11T15:57:37.612" v="1" actId="400"/>
-        <pc:sldMkLst>
-          <pc:docMk/>
-          <pc:sldMk cId="826796080" sldId="280"/>
-        </pc:sldMkLst>
-        <pc:spChg chg="mod">
-          <ac:chgData name="Silvia Wen" userId="fa3c34b288dc686c" providerId="LiveId" clId="{9A5423AC-A219-4E59-9E7F-D04EF45BABF4}" dt="2022-12-11T15:57:37.612" v="1" actId="400"/>
-          <ac:spMkLst>
-            <pc:docMk/>
-            <pc:sldMk cId="826796080" sldId="280"/>
-            <ac:spMk id="5" creationId="{00000000-0000-0000-0000-000000000000}"/>
-          </ac:spMkLst>
-        </pc:spChg>
-      </pc:sldChg>
-      <pc:sldChg chg="modSp mod">
-        <pc:chgData name="Silvia Wen" userId="fa3c34b288dc686c" providerId="LiveId" clId="{9A5423AC-A219-4E59-9E7F-D04EF45BABF4}" dt="2022-12-11T15:57:57.874" v="4" actId="400"/>
-        <pc:sldMkLst>
-          <pc:docMk/>
-          <pc:sldMk cId="784046229" sldId="281"/>
-        </pc:sldMkLst>
-        <pc:spChg chg="mod">
-          <ac:chgData name="Silvia Wen" userId="fa3c34b288dc686c" providerId="LiveId" clId="{9A5423AC-A219-4E59-9E7F-D04EF45BABF4}" dt="2022-12-11T15:57:57.874" v="4" actId="400"/>
-          <ac:spMkLst>
-            <pc:docMk/>
-            <pc:sldMk cId="784046229" sldId="281"/>
-            <ac:spMk id="5" creationId="{00000000-0000-0000-0000-000000000000}"/>
-          </ac:spMkLst>
-        </pc:spChg>
-      </pc:sldChg>
-      <pc:sldChg chg="modSp mod">
-        <pc:chgData name="Silvia Wen" userId="fa3c34b288dc686c" providerId="LiveId" clId="{9A5423AC-A219-4E59-9E7F-D04EF45BABF4}" dt="2022-12-11T16:17:23.124" v="17" actId="113"/>
-        <pc:sldMkLst>
-          <pc:docMk/>
-          <pc:sldMk cId="1449993590" sldId="282"/>
-        </pc:sldMkLst>
-        <pc:spChg chg="mod">
-          <ac:chgData name="Silvia Wen" userId="fa3c34b288dc686c" providerId="LiveId" clId="{9A5423AC-A219-4E59-9E7F-D04EF45BABF4}" dt="2022-12-11T16:17:23.124" v="17" actId="113"/>
-          <ac:spMkLst>
-            <pc:docMk/>
-            <pc:sldMk cId="1449993590" sldId="282"/>
-            <ac:spMk id="5" creationId="{00000000-0000-0000-0000-000000000000}"/>
-          </ac:spMkLst>
-        </pc:spChg>
-      </pc:sldChg>
-    </pc:docChg>
-  </pc:docChgLst>
-  <pc:docChgLst>
     <pc:chgData name="Silvia Wen" userId="fa3c34b288dc686c" providerId="LiveId" clId="{B0CAD78C-A8C2-4822-8F0B-73EBA05ED240}"/>
     <pc:docChg chg="undo custSel addSld delSld modSld sldOrd">
       <pc:chgData name="Silvia Wen" userId="fa3c34b288dc686c" providerId="LiveId" clId="{B0CAD78C-A8C2-4822-8F0B-73EBA05ED240}" dt="2022-12-06T18:35:27.468" v="254" actId="13926"/>
@@ -394,6 +295,106 @@
       </pc:sldChg>
     </pc:docChg>
   </pc:docChgLst>
+  <pc:docChgLst>
+    <pc:chgData name="Silvia Wen" userId="fa3c34b288dc686c" providerId="LiveId" clId="{9A5423AC-A219-4E59-9E7F-D04EF45BABF4}"/>
+    <pc:docChg chg="custSel modSld">
+      <pc:chgData name="Silvia Wen" userId="fa3c34b288dc686c" providerId="LiveId" clId="{9A5423AC-A219-4E59-9E7F-D04EF45BABF4}" dt="2022-12-11T16:17:23.124" v="17" actId="113"/>
+      <pc:docMkLst>
+        <pc:docMk/>
+      </pc:docMkLst>
+      <pc:sldChg chg="addSp delSp modSp mod">
+        <pc:chgData name="Silvia Wen" userId="fa3c34b288dc686c" providerId="LiveId" clId="{9A5423AC-A219-4E59-9E7F-D04EF45BABF4}" dt="2022-12-11T16:01:20.637" v="10" actId="1076"/>
+        <pc:sldMkLst>
+          <pc:docMk/>
+          <pc:sldMk cId="138220384" sldId="257"/>
+        </pc:sldMkLst>
+        <pc:picChg chg="del">
+          <ac:chgData name="Silvia Wen" userId="fa3c34b288dc686c" providerId="LiveId" clId="{9A5423AC-A219-4E59-9E7F-D04EF45BABF4}" dt="2022-12-11T15:58:30.593" v="5" actId="478"/>
+          <ac:picMkLst>
+            <pc:docMk/>
+            <pc:sldMk cId="138220384" sldId="257"/>
+            <ac:picMk id="3" creationId="{46ABA154-3415-E55B-9279-A591E3A1A454}"/>
+          </ac:picMkLst>
+        </pc:picChg>
+        <pc:picChg chg="add mod">
+          <ac:chgData name="Silvia Wen" userId="fa3c34b288dc686c" providerId="LiveId" clId="{9A5423AC-A219-4E59-9E7F-D04EF45BABF4}" dt="2022-12-11T16:01:20.637" v="10" actId="1076"/>
+          <ac:picMkLst>
+            <pc:docMk/>
+            <pc:sldMk cId="138220384" sldId="257"/>
+            <ac:picMk id="3" creationId="{65A013B5-7489-7E17-611E-AB2DAEC9FF84}"/>
+          </ac:picMkLst>
+        </pc:picChg>
+      </pc:sldChg>
+      <pc:sldChg chg="addSp delSp modSp mod">
+        <pc:chgData name="Silvia Wen" userId="fa3c34b288dc686c" providerId="LiveId" clId="{9A5423AC-A219-4E59-9E7F-D04EF45BABF4}" dt="2022-12-11T16:16:36.257" v="13" actId="1076"/>
+        <pc:sldMkLst>
+          <pc:docMk/>
+          <pc:sldMk cId="3064782011" sldId="273"/>
+        </pc:sldMkLst>
+        <pc:picChg chg="del">
+          <ac:chgData name="Silvia Wen" userId="fa3c34b288dc686c" providerId="LiveId" clId="{9A5423AC-A219-4E59-9E7F-D04EF45BABF4}" dt="2022-12-11T16:00:38.122" v="6" actId="478"/>
+          <ac:picMkLst>
+            <pc:docMk/>
+            <pc:sldMk cId="3064782011" sldId="273"/>
+            <ac:picMk id="3" creationId="{C7C179A8-7397-BBA2-3D2F-D0C7086CB5DD}"/>
+          </ac:picMkLst>
+        </pc:picChg>
+        <pc:picChg chg="add mod">
+          <ac:chgData name="Silvia Wen" userId="fa3c34b288dc686c" providerId="LiveId" clId="{9A5423AC-A219-4E59-9E7F-D04EF45BABF4}" dt="2022-12-11T16:16:36.257" v="13" actId="1076"/>
+          <ac:picMkLst>
+            <pc:docMk/>
+            <pc:sldMk cId="3064782011" sldId="273"/>
+            <ac:picMk id="6" creationId="{49759A96-61D6-79A9-136A-A721A0B6FB53}"/>
+          </ac:picMkLst>
+        </pc:picChg>
+      </pc:sldChg>
+      <pc:sldChg chg="modSp mod">
+        <pc:chgData name="Silvia Wen" userId="fa3c34b288dc686c" providerId="LiveId" clId="{9A5423AC-A219-4E59-9E7F-D04EF45BABF4}" dt="2022-12-11T15:57:37.612" v="1" actId="400"/>
+        <pc:sldMkLst>
+          <pc:docMk/>
+          <pc:sldMk cId="826796080" sldId="280"/>
+        </pc:sldMkLst>
+        <pc:spChg chg="mod">
+          <ac:chgData name="Silvia Wen" userId="fa3c34b288dc686c" providerId="LiveId" clId="{9A5423AC-A219-4E59-9E7F-D04EF45BABF4}" dt="2022-12-11T15:57:37.612" v="1" actId="400"/>
+          <ac:spMkLst>
+            <pc:docMk/>
+            <pc:sldMk cId="826796080" sldId="280"/>
+            <ac:spMk id="5" creationId="{00000000-0000-0000-0000-000000000000}"/>
+          </ac:spMkLst>
+        </pc:spChg>
+      </pc:sldChg>
+      <pc:sldChg chg="modSp mod">
+        <pc:chgData name="Silvia Wen" userId="fa3c34b288dc686c" providerId="LiveId" clId="{9A5423AC-A219-4E59-9E7F-D04EF45BABF4}" dt="2022-12-11T15:57:57.874" v="4" actId="400"/>
+        <pc:sldMkLst>
+          <pc:docMk/>
+          <pc:sldMk cId="784046229" sldId="281"/>
+        </pc:sldMkLst>
+        <pc:spChg chg="mod">
+          <ac:chgData name="Silvia Wen" userId="fa3c34b288dc686c" providerId="LiveId" clId="{9A5423AC-A219-4E59-9E7F-D04EF45BABF4}" dt="2022-12-11T15:57:57.874" v="4" actId="400"/>
+          <ac:spMkLst>
+            <pc:docMk/>
+            <pc:sldMk cId="784046229" sldId="281"/>
+            <ac:spMk id="5" creationId="{00000000-0000-0000-0000-000000000000}"/>
+          </ac:spMkLst>
+        </pc:spChg>
+      </pc:sldChg>
+      <pc:sldChg chg="modSp mod">
+        <pc:chgData name="Silvia Wen" userId="fa3c34b288dc686c" providerId="LiveId" clId="{9A5423AC-A219-4E59-9E7F-D04EF45BABF4}" dt="2022-12-11T16:17:23.124" v="17" actId="113"/>
+        <pc:sldMkLst>
+          <pc:docMk/>
+          <pc:sldMk cId="1449993590" sldId="282"/>
+        </pc:sldMkLst>
+        <pc:spChg chg="mod">
+          <ac:chgData name="Silvia Wen" userId="fa3c34b288dc686c" providerId="LiveId" clId="{9A5423AC-A219-4E59-9E7F-D04EF45BABF4}" dt="2022-12-11T16:17:23.124" v="17" actId="113"/>
+          <ac:spMkLst>
+            <pc:docMk/>
+            <pc:sldMk cId="1449993590" sldId="282"/>
+            <ac:spMk id="5" creationId="{00000000-0000-0000-0000-000000000000}"/>
+          </ac:spMkLst>
+        </pc:spChg>
+      </pc:sldChg>
+    </pc:docChg>
+  </pc:docChgLst>
 </pc:chgInfo>
 </file>
 
@@ -560,7 +561,7 @@
                 <a:latin typeface="Arial" panose="020B0604020202020204" pitchFamily="34" charset="0"/>
                 <a:cs typeface="Arial" panose="020B0604020202020204" pitchFamily="34" charset="0"/>
               </a:rPr>
-              <a:t>‹Nr.›</a:t>
+              <a:t>‹#›</a:t>
             </a:fld>
             <a:endParaRPr lang="de-DE">
               <a:latin typeface="Arial" panose="020B0604020202020204" pitchFamily="34" charset="0"/>
@@ -834,7 +835,7 @@
             <a:fld id="{272E3E51-A3F3-4FD4-9C75-1C612CCCCA5A}" type="slidenum">
               <a:rPr lang="de-DE" smtClean="0"/>
               <a:pPr/>
-              <a:t>‹Nr.›</a:t>
+              <a:t>‹#›</a:t>
             </a:fld>
             <a:endParaRPr lang="de-DE"/>
           </a:p>
@@ -943,6 +944,103 @@
 </p:notesMaster>
 </file>
 
+<file path=ppt/notesSlides/notesSlide1.xml><?xml version="1.0" encoding="utf-8"?>
+<p:notes xmlns:a="http://schemas.openxmlformats.org/drawingml/2006/main" xmlns:r="http://schemas.openxmlformats.org/officeDocument/2006/relationships" xmlns:p="http://schemas.openxmlformats.org/presentationml/2006/main">
+  <p:cSld>
+    <p:spTree>
+      <p:nvGrpSpPr>
+        <p:cNvPr id="1" name=""/>
+        <p:cNvGrpSpPr/>
+        <p:nvPr/>
+      </p:nvGrpSpPr>
+      <p:grpSpPr>
+        <a:xfrm>
+          <a:off x="0" y="0"/>
+          <a:ext cx="0" cy="0"/>
+          <a:chOff x="0" y="0"/>
+          <a:chExt cx="0" cy="0"/>
+        </a:xfrm>
+      </p:grpSpPr>
+      <p:sp>
+        <p:nvSpPr>
+          <p:cNvPr id="2" name="Slide Image Placeholder 1"/>
+          <p:cNvSpPr>
+            <a:spLocks noGrp="1" noRot="1" noChangeAspect="1"/>
+          </p:cNvSpPr>
+          <p:nvPr>
+            <p:ph type="sldImg"/>
+          </p:nvPr>
+        </p:nvSpPr>
+        <p:spPr/>
+      </p:sp>
+      <p:sp>
+        <p:nvSpPr>
+          <p:cNvPr id="3" name="Notes Placeholder 2"/>
+          <p:cNvSpPr>
+            <a:spLocks noGrp="1"/>
+          </p:cNvSpPr>
+          <p:nvPr>
+            <p:ph type="body" idx="1"/>
+          </p:nvPr>
+        </p:nvSpPr>
+        <p:spPr/>
+        <p:txBody>
+          <a:bodyPr/>
+          <a:lstStyle/>
+          <a:p>
+            <a:r>
+              <a:rPr lang="de-DE" dirty="0"/>
+              <a:t>Name und </a:t>
+            </a:r>
+            <a:r>
+              <a:rPr lang="de-DE" dirty="0" err="1"/>
+              <a:t>Addresse</a:t>
+            </a:r>
+            <a:r>
+              <a:rPr lang="de-DE" dirty="0"/>
+              <a:t> hinterlegen =&gt; Kontodaten verwalten</a:t>
+            </a:r>
+            <a:endParaRPr lang="en-ID" dirty="0"/>
+          </a:p>
+        </p:txBody>
+      </p:sp>
+      <p:sp>
+        <p:nvSpPr>
+          <p:cNvPr id="4" name="Slide Number Placeholder 3"/>
+          <p:cNvSpPr>
+            <a:spLocks noGrp="1"/>
+          </p:cNvSpPr>
+          <p:nvPr>
+            <p:ph type="sldNum" sz="quarter" idx="5"/>
+          </p:nvPr>
+        </p:nvSpPr>
+        <p:spPr/>
+        <p:txBody>
+          <a:bodyPr/>
+          <a:lstStyle/>
+          <a:p>
+            <a:fld id="{272E3E51-A3F3-4FD4-9C75-1C612CCCCA5A}" type="slidenum">
+              <a:rPr lang="de-DE" smtClean="0"/>
+              <a:pPr/>
+              <a:t>11</a:t>
+            </a:fld>
+            <a:endParaRPr lang="de-DE"/>
+          </a:p>
+        </p:txBody>
+      </p:sp>
+    </p:spTree>
+    <p:extLst>
+      <p:ext uri="{BB962C8B-B14F-4D97-AF65-F5344CB8AC3E}">
+        <p14:creationId xmlns:p14="http://schemas.microsoft.com/office/powerpoint/2010/main" val="3812068711"/>
+      </p:ext>
+    </p:extLst>
+  </p:cSld>
+  <p:clrMapOvr>
+    <a:masterClrMapping/>
+  </p:clrMapOvr>
+</p:notes>
+</file>
+
 <file path=ppt/slideLayouts/slideLayout1.xml><?xml version="1.0" encoding="utf-8"?>
 <p:sldLayout xmlns:a="http://schemas.openxmlformats.org/drawingml/2006/main" xmlns:r="http://schemas.openxmlformats.org/officeDocument/2006/relationships" xmlns:p="http://schemas.openxmlformats.org/presentationml/2006/main" preserve="1" userDrawn="1">
   <p:cSld name="Titelfolie">
@@ -1157,7 +1255,7 @@
             <a:fld id="{83B23FF1-3F66-4904-91CE-1AE4A5050627}" type="slidenum">
               <a:rPr lang="de-DE" smtClean="0"/>
               <a:pPr/>
-              <a:t>‹Nr.›</a:t>
+              <a:t>‹#›</a:t>
             </a:fld>
             <a:endParaRPr lang="de-DE" dirty="0"/>
           </a:p>
@@ -1699,7 +1797,7 @@
                   <a:spcPct val="50000"/>
                 </a:spcBef>
               </a:pPr>
-              <a:t>‹Nr.›</a:t>
+              <a:t>‹#›</a:t>
             </a:fld>
             <a:endParaRPr lang="de-DE" altLang="de-DE" sz="1111" dirty="0">
               <a:solidFill>
@@ -2217,33 +2315,314 @@
           <a:bodyPr anchor="ctr"/>
           <a:lstStyle/>
           <a:p>
-            <a:pPr marL="0" indent="0" algn="ctr">
+            <a:pPr marL="0" indent="0">
               <a:buNone/>
             </a:pPr>
             <a:r>
-              <a:rPr lang="de-DE" dirty="0">
-                <a:solidFill>
-                  <a:srgbClr val="FF0000"/>
-                </a:solidFill>
-              </a:rPr>
-              <a:t>Fügen Sie bitte Ihr </a:t>
-            </a:r>
-            <a:r>
-              <a:rPr lang="de-DE" dirty="0" err="1">
-                <a:solidFill>
-                  <a:srgbClr val="FF0000"/>
-                </a:solidFill>
-              </a:rPr>
-              <a:t>Use</a:t>
-            </a:r>
-            <a:r>
-              <a:rPr lang="de-DE" dirty="0">
-                <a:solidFill>
-                  <a:srgbClr val="FF0000"/>
-                </a:solidFill>
-              </a:rPr>
-              <a:t>-Case Diagramm ein.</a:t>
-            </a:r>
+              <a:rPr lang="de-DE" sz="1800" b="0" i="0" u="none" strike="noStrike" baseline="0" dirty="0">
+                <a:solidFill>
+                  <a:srgbClr val="000000"/>
+                </a:solidFill>
+                <a:latin typeface="Calibri" panose="020F0502020204030204" pitchFamily="34" charset="0"/>
+              </a:rPr>
+              <a:t>In einer Bank können Kunden eine Reihe von Konten </a:t>
+            </a:r>
+            <a:r>
+              <a:rPr lang="de-DE" sz="1800" b="1" i="0" u="none" strike="noStrike" baseline="0" dirty="0">
+                <a:solidFill>
+                  <a:srgbClr val="000000"/>
+                </a:solidFill>
+                <a:highlight>
+                  <a:srgbClr val="00FFFF"/>
+                </a:highlight>
+                <a:latin typeface="Calibri" panose="020F0502020204030204" pitchFamily="34" charset="0"/>
+              </a:rPr>
+              <a:t>eröffnen</a:t>
+            </a:r>
+            <a:r>
+              <a:rPr lang="de-DE" sz="1800" b="0" i="0" u="none" strike="noStrike" baseline="0" dirty="0">
+                <a:solidFill>
+                  <a:srgbClr val="000000"/>
+                </a:solidFill>
+                <a:latin typeface="Calibri" panose="020F0502020204030204" pitchFamily="34" charset="0"/>
+              </a:rPr>
+              <a:t>. Hierzu müssen der Name und die Adresse </a:t>
+            </a:r>
+            <a:r>
+              <a:rPr lang="de-DE" sz="1800" b="1" i="0" u="none" baseline="0" dirty="0">
+                <a:solidFill>
+                  <a:srgbClr val="000000"/>
+                </a:solidFill>
+                <a:highlight>
+                  <a:srgbClr val="00FFFF"/>
+                </a:highlight>
+                <a:latin typeface="Calibri" panose="020F0502020204030204" pitchFamily="34" charset="0"/>
+              </a:rPr>
+              <a:t>hinterlegt</a:t>
+            </a:r>
+            <a:r>
+              <a:rPr lang="de-DE" sz="1800" b="0" i="0" u="none" strike="noStrike" baseline="0" dirty="0">
+                <a:solidFill>
+                  <a:srgbClr val="000000"/>
+                </a:solidFill>
+                <a:latin typeface="Calibri" panose="020F0502020204030204" pitchFamily="34" charset="0"/>
+              </a:rPr>
+              <a:t> werden. Alle Konten </a:t>
+            </a:r>
+            <a:r>
+              <a:rPr lang="de-DE" sz="1800" b="0" i="0" u="none" baseline="0" dirty="0">
+                <a:solidFill>
+                  <a:srgbClr val="000000"/>
+                </a:solidFill>
+                <a:latin typeface="Calibri" panose="020F0502020204030204" pitchFamily="34" charset="0"/>
+              </a:rPr>
+              <a:t>haben</a:t>
+            </a:r>
+            <a:r>
+              <a:rPr lang="de-DE" sz="1800" b="0" i="0" u="none" strike="noStrike" baseline="0" dirty="0">
+                <a:solidFill>
+                  <a:srgbClr val="000000"/>
+                </a:solidFill>
+                <a:latin typeface="Calibri" panose="020F0502020204030204" pitchFamily="34" charset="0"/>
+              </a:rPr>
+              <a:t> einen Saldo, welcher </a:t>
+            </a:r>
+            <a:r>
+              <a:rPr lang="de-DE" sz="1800" b="0" i="0" u="none" baseline="0" dirty="0">
+                <a:solidFill>
+                  <a:srgbClr val="000000"/>
+                </a:solidFill>
+                <a:latin typeface="Calibri" panose="020F0502020204030204" pitchFamily="34" charset="0"/>
+              </a:rPr>
+              <a:t>angibt</a:t>
+            </a:r>
+            <a:r>
+              <a:rPr lang="de-DE" sz="1800" b="0" i="0" u="none" strike="noStrike" baseline="0" dirty="0">
+                <a:solidFill>
+                  <a:srgbClr val="000000"/>
+                </a:solidFill>
+                <a:latin typeface="Calibri" panose="020F0502020204030204" pitchFamily="34" charset="0"/>
+              </a:rPr>
+              <a:t>, was für ein Wert sich aktuell auf dem Konto </a:t>
+            </a:r>
+            <a:r>
+              <a:rPr lang="de-DE" sz="1800" b="0" i="0" u="none" baseline="0" dirty="0">
+                <a:latin typeface="Calibri" panose="020F0502020204030204" pitchFamily="34" charset="0"/>
+              </a:rPr>
+              <a:t>befindet</a:t>
+            </a:r>
+            <a:r>
+              <a:rPr lang="de-DE" sz="1800" b="0" i="0" u="none" strike="noStrike" baseline="0" dirty="0">
+                <a:solidFill>
+                  <a:srgbClr val="000000"/>
+                </a:solidFill>
+                <a:latin typeface="Calibri" panose="020F0502020204030204" pitchFamily="34" charset="0"/>
+              </a:rPr>
+              <a:t>. Girokonten </a:t>
+            </a:r>
+            <a:r>
+              <a:rPr lang="de-DE" sz="1800" b="0" i="0" u="none" baseline="0" dirty="0">
+                <a:solidFill>
+                  <a:srgbClr val="000000"/>
+                </a:solidFill>
+                <a:latin typeface="Calibri" panose="020F0502020204030204" pitchFamily="34" charset="0"/>
+              </a:rPr>
+              <a:t>sind</a:t>
+            </a:r>
+            <a:r>
+              <a:rPr lang="de-DE" sz="1800" b="0" i="0" u="none" strike="noStrike" baseline="0" dirty="0">
+                <a:solidFill>
+                  <a:srgbClr val="000000"/>
+                </a:solidFill>
+                <a:latin typeface="Calibri" panose="020F0502020204030204" pitchFamily="34" charset="0"/>
+              </a:rPr>
+              <a:t> die ganz normalen Konten, sie werden durch eine eindeutige IBAN </a:t>
+            </a:r>
+            <a:r>
+              <a:rPr lang="de-DE" sz="1800" b="0" i="0" u="none" baseline="0" dirty="0">
+                <a:solidFill>
+                  <a:srgbClr val="000000"/>
+                </a:solidFill>
+                <a:latin typeface="Calibri" panose="020F0502020204030204" pitchFamily="34" charset="0"/>
+              </a:rPr>
+              <a:t>identifiziert</a:t>
+            </a:r>
+            <a:r>
+              <a:rPr lang="de-DE" sz="1800" b="0" i="0" u="none" strike="noStrike" baseline="0" dirty="0">
+                <a:solidFill>
+                  <a:srgbClr val="000000"/>
+                </a:solidFill>
+                <a:latin typeface="Calibri" panose="020F0502020204030204" pitchFamily="34" charset="0"/>
+              </a:rPr>
+              <a:t>. Zudem </a:t>
+            </a:r>
+            <a:r>
+              <a:rPr lang="de-DE" sz="1800" b="0" i="0" u="none" baseline="0" dirty="0">
+                <a:solidFill>
+                  <a:srgbClr val="000000"/>
+                </a:solidFill>
+                <a:latin typeface="Calibri" panose="020F0502020204030204" pitchFamily="34" charset="0"/>
+              </a:rPr>
+              <a:t>gibt</a:t>
+            </a:r>
+            <a:r>
+              <a:rPr lang="de-DE" sz="1800" b="0" i="0" u="none" strike="noStrike" baseline="0" dirty="0">
+                <a:solidFill>
+                  <a:srgbClr val="000000"/>
+                </a:solidFill>
+                <a:latin typeface="Calibri" panose="020F0502020204030204" pitchFamily="34" charset="0"/>
+              </a:rPr>
+              <a:t> es Depotkonten, in dem die von den Kunden gekauften Aktien </a:t>
+            </a:r>
+            <a:r>
+              <a:rPr lang="de-DE" sz="1800" b="1" i="0" u="none" baseline="0" dirty="0">
+                <a:solidFill>
+                  <a:srgbClr val="000000"/>
+                </a:solidFill>
+                <a:highlight>
+                  <a:srgbClr val="00FFFF"/>
+                </a:highlight>
+                <a:latin typeface="Calibri" panose="020F0502020204030204" pitchFamily="34" charset="0"/>
+              </a:rPr>
+              <a:t>abgelegt</a:t>
+            </a:r>
+            <a:r>
+              <a:rPr lang="de-DE" sz="1800" b="0" i="0" u="none" strike="noStrike" baseline="0" dirty="0">
+                <a:solidFill>
+                  <a:srgbClr val="000000"/>
+                </a:solidFill>
+                <a:latin typeface="Calibri" panose="020F0502020204030204" pitchFamily="34" charset="0"/>
+              </a:rPr>
+              <a:t> werden. Der Kunde kann sich eine Auflistung der verschiedenen Posten in seinen Depots </a:t>
+            </a:r>
+            <a:r>
+              <a:rPr lang="de-DE" sz="1800" b="1" i="0" u="none" strike="noStrike" baseline="0" dirty="0">
+                <a:solidFill>
+                  <a:srgbClr val="000000"/>
+                </a:solidFill>
+                <a:highlight>
+                  <a:srgbClr val="00FFFF"/>
+                </a:highlight>
+                <a:latin typeface="Calibri" panose="020F0502020204030204" pitchFamily="34" charset="0"/>
+              </a:rPr>
+              <a:t>anzeigen</a:t>
+            </a:r>
+            <a:r>
+              <a:rPr lang="de-DE" sz="1800" b="0" i="0" u="none" strike="noStrike" baseline="0" dirty="0">
+                <a:solidFill>
+                  <a:srgbClr val="000000"/>
+                </a:solidFill>
+                <a:highlight>
+                  <a:srgbClr val="00FFFF"/>
+                </a:highlight>
+                <a:latin typeface="Calibri" panose="020F0502020204030204" pitchFamily="34" charset="0"/>
+              </a:rPr>
+              <a:t> </a:t>
+            </a:r>
+            <a:r>
+              <a:rPr lang="de-DE" sz="1800" b="0" i="0" u="none" strike="noStrike" baseline="0" dirty="0">
+                <a:solidFill>
+                  <a:srgbClr val="000000"/>
+                </a:solidFill>
+                <a:latin typeface="Calibri" panose="020F0502020204030204" pitchFamily="34" charset="0"/>
+              </a:rPr>
+              <a:t>lassen. Wichtig ist, dass zur Deckung von </a:t>
+            </a:r>
+            <a:r>
+              <a:rPr lang="de-DE" sz="1800" b="0" i="0" u="none" baseline="0" dirty="0">
+                <a:solidFill>
+                  <a:srgbClr val="000000"/>
+                </a:solidFill>
+                <a:latin typeface="Calibri" panose="020F0502020204030204" pitchFamily="34" charset="0"/>
+              </a:rPr>
+              <a:t>Käufen</a:t>
+            </a:r>
+            <a:r>
+              <a:rPr lang="de-DE" sz="1800" b="0" i="0" u="none" strike="noStrike" baseline="0" dirty="0">
+                <a:solidFill>
+                  <a:srgbClr val="000000"/>
+                </a:solidFill>
+                <a:latin typeface="Calibri" panose="020F0502020204030204" pitchFamily="34" charset="0"/>
+              </a:rPr>
+              <a:t> und zur Ausschüttung bei </a:t>
+            </a:r>
+            <a:r>
+              <a:rPr lang="de-DE" sz="1800" b="0" i="0" u="none" baseline="0" dirty="0">
+                <a:solidFill>
+                  <a:srgbClr val="000000"/>
+                </a:solidFill>
+                <a:latin typeface="Calibri" panose="020F0502020204030204" pitchFamily="34" charset="0"/>
+              </a:rPr>
+              <a:t>Verkäufen</a:t>
+            </a:r>
+            <a:r>
+              <a:rPr lang="de-DE" sz="1800" b="0" i="0" u="none" strike="noStrike" baseline="0" dirty="0">
+                <a:solidFill>
+                  <a:srgbClr val="000000"/>
+                </a:solidFill>
+                <a:latin typeface="Calibri" panose="020F0502020204030204" pitchFamily="34" charset="0"/>
+              </a:rPr>
+              <a:t> oder Dividendenzahlungen immer ein Referenzkonto </a:t>
+            </a:r>
+            <a:r>
+              <a:rPr lang="de-DE" sz="1800" b="0" i="0" u="none" baseline="0" dirty="0">
+                <a:solidFill>
+                  <a:srgbClr val="000000"/>
+                </a:solidFill>
+                <a:latin typeface="Calibri" panose="020F0502020204030204" pitchFamily="34" charset="0"/>
+              </a:rPr>
+              <a:t>angegeben</a:t>
+            </a:r>
+            <a:r>
+              <a:rPr lang="de-DE" sz="1800" b="0" i="0" u="none" strike="noStrike" baseline="0" dirty="0">
+                <a:solidFill>
+                  <a:srgbClr val="000000"/>
+                </a:solidFill>
+                <a:latin typeface="Calibri" panose="020F0502020204030204" pitchFamily="34" charset="0"/>
+              </a:rPr>
+              <a:t> werden muss. Zur Berechnung des Saldos eines Depots werden immer die Tageskurse der Aktien </a:t>
+            </a:r>
+            <a:r>
+              <a:rPr lang="de-DE" sz="1800" b="0" i="0" u="none" baseline="0" dirty="0">
+                <a:solidFill>
+                  <a:srgbClr val="000000"/>
+                </a:solidFill>
+                <a:latin typeface="Calibri" panose="020F0502020204030204" pitchFamily="34" charset="0"/>
+              </a:rPr>
+              <a:t>verwendet</a:t>
+            </a:r>
+            <a:r>
+              <a:rPr lang="de-DE" sz="1800" b="0" i="0" u="none" strike="noStrike" baseline="0" dirty="0">
+                <a:solidFill>
+                  <a:srgbClr val="000000"/>
+                </a:solidFill>
+                <a:latin typeface="Calibri" panose="020F0502020204030204" pitchFamily="34" charset="0"/>
+              </a:rPr>
+              <a:t>. Aktien werden durch die sogenannte Wertpapierkennnummer eindeutig </a:t>
+            </a:r>
+            <a:r>
+              <a:rPr lang="de-DE" sz="1800" b="0" i="0" u="none" baseline="0" dirty="0">
+                <a:solidFill>
+                  <a:srgbClr val="000000"/>
+                </a:solidFill>
+                <a:latin typeface="Calibri" panose="020F0502020204030204" pitchFamily="34" charset="0"/>
+              </a:rPr>
+              <a:t>identifiziert</a:t>
+            </a:r>
+            <a:r>
+              <a:rPr lang="de-DE" sz="1800" b="0" i="0" u="none" strike="noStrike" baseline="0" dirty="0">
+                <a:solidFill>
+                  <a:srgbClr val="000000"/>
+                </a:solidFill>
+                <a:latin typeface="Calibri" panose="020F0502020204030204" pitchFamily="34" charset="0"/>
+              </a:rPr>
+              <a:t>. </a:t>
+            </a:r>
+            <a:endParaRPr lang="de-DE" dirty="0">
+              <a:solidFill>
+                <a:srgbClr val="FF0000"/>
+              </a:solidFill>
+            </a:endParaRPr>
           </a:p>
         </p:txBody>
       </p:sp>
@@ -2257,62 +2636,37 @@
             <p:ph type="title"/>
           </p:nvPr>
         </p:nvSpPr>
-        <p:spPr/>
+        <p:spPr>
+          <a:xfrm>
+            <a:off x="508005" y="769268"/>
+            <a:ext cx="8822972" cy="792088"/>
+          </a:xfrm>
+        </p:spPr>
         <p:txBody>
           <a:bodyPr/>
           <a:lstStyle/>
           <a:p>
             <a:r>
-              <a:rPr lang="de-DE" dirty="0" err="1"/>
-              <a:t>Use</a:t>
-            </a:r>
-            <a:r>
               <a:rPr lang="de-DE" dirty="0"/>
-              <a:t>-Case Diagramm</a:t>
-            </a:r>
+              <a:t>Anforderungstext – </a:t>
+            </a:r>
+            <a:r>
+              <a:rPr lang="de-DE" sz="2400" b="0" i="0" u="none" strike="noStrike" baseline="0" dirty="0">
+                <a:solidFill>
+                  <a:srgbClr val="4471C4"/>
+                </a:solidFill>
+                <a:latin typeface="Calibri" panose="020F0502020204030204" pitchFamily="34" charset="0"/>
+              </a:rPr>
+              <a:t>Bank (G2)</a:t>
+            </a:r>
+            <a:endParaRPr lang="de-DE" dirty="0"/>
           </a:p>
         </p:txBody>
       </p:sp>
-      <p:pic>
-        <p:nvPicPr>
-          <p:cNvPr id="6" name="Grafik 5">
-            <a:extLst>
-              <a:ext uri="{FF2B5EF4-FFF2-40B4-BE49-F238E27FC236}">
-                <a16:creationId xmlns:a16="http://schemas.microsoft.com/office/drawing/2014/main" id="{49759A96-61D6-79A9-136A-A721A0B6FB53}"/>
-              </a:ext>
-            </a:extLst>
-          </p:cNvPr>
-          <p:cNvPicPr>
-            <a:picLocks noChangeAspect="1"/>
-          </p:cNvPicPr>
-          <p:nvPr/>
-        </p:nvPicPr>
-        <p:blipFill>
-          <a:blip r:embed="rId2">
-            <a:extLst>
-              <a:ext uri="{28A0092B-C50C-407E-A947-70E740481C1C}">
-                <a14:useLocalDpi xmlns:a14="http://schemas.microsoft.com/office/drawing/2010/main" val="0"/>
-              </a:ext>
-            </a:extLst>
-          </a:blip>
-          <a:stretch>
-            <a:fillRect/>
-          </a:stretch>
-        </p:blipFill>
-        <p:spPr>
-          <a:xfrm>
-            <a:off x="1691899" y="1176546"/>
-            <a:ext cx="6485166" cy="4090751"/>
-          </a:xfrm>
-          <a:prstGeom prst="rect">
-            <a:avLst/>
-          </a:prstGeom>
-        </p:spPr>
-      </p:pic>
     </p:spTree>
     <p:extLst>
       <p:ext uri="{BB962C8B-B14F-4D97-AF65-F5344CB8AC3E}">
-        <p14:creationId xmlns:p14="http://schemas.microsoft.com/office/powerpoint/2010/main" val="3064782011"/>
+        <p14:creationId xmlns:p14="http://schemas.microsoft.com/office/powerpoint/2010/main" val="2505125154"/>
       </p:ext>
     </p:extLst>
   </p:cSld>
@@ -2351,39 +2705,35 @@
         </p:nvSpPr>
         <p:spPr/>
         <p:txBody>
-          <a:bodyPr anchor="t"/>
+          <a:bodyPr anchor="ctr"/>
           <a:lstStyle/>
           <a:p>
-            <a:pPr marL="457200" indent="-457200">
-              <a:buFont typeface="+mj-lt"/>
-              <a:buAutoNum type="arabicPeriod"/>
-            </a:pPr>
-            <a:r>
-              <a:rPr lang="de-DE" b="1" dirty="0"/>
-              <a:t>Als Kunde möchte ich einen Girokonto eröffnen können, um mein Geld in der Bank aufzubewahren.</a:t>
-            </a:r>
-          </a:p>
-          <a:p>
-            <a:pPr marL="596164" lvl="2" indent="0">
+            <a:pPr marL="0" indent="0" algn="ctr">
               <a:buNone/>
             </a:pPr>
             <a:r>
-              <a:rPr lang="de-DE" u="sng" dirty="0"/>
-              <a:t>Akzeptanzkriterien:</a:t>
-            </a:r>
-          </a:p>
-          <a:p>
-            <a:pPr lvl="2"/>
-            <a:r>
-              <a:rPr lang="de-DE" dirty="0"/>
-              <a:t>Wenn die Kunde ihre persönliche Daten eingibt, läuft der Girokontoeröffnung weiter.</a:t>
-            </a:r>
-          </a:p>
-          <a:p>
-            <a:pPr lvl="2"/>
-            <a:r>
-              <a:rPr lang="de-DE" dirty="0"/>
-              <a:t>Wenn die Girokontoeröffnung erfolgreich ist, werden die IBAN, der Saldo und die Berechtigung dem Kunden angezeigt. </a:t>
+              <a:rPr lang="de-DE" dirty="0">
+                <a:solidFill>
+                  <a:srgbClr val="FF0000"/>
+                </a:solidFill>
+              </a:rPr>
+              <a:t>Fügen Sie bitte Ihr </a:t>
+            </a:r>
+            <a:r>
+              <a:rPr lang="de-DE" dirty="0" err="1">
+                <a:solidFill>
+                  <a:srgbClr val="FF0000"/>
+                </a:solidFill>
+              </a:rPr>
+              <a:t>Use</a:t>
+            </a:r>
+            <a:r>
+              <a:rPr lang="de-DE" dirty="0">
+                <a:solidFill>
+                  <a:srgbClr val="FF0000"/>
+                </a:solidFill>
+              </a:rPr>
+              <a:t>-Case Diagramm ein.</a:t>
             </a:r>
           </a:p>
         </p:txBody>
@@ -2404,21 +2754,56 @@
           <a:lstStyle/>
           <a:p>
             <a:r>
+              <a:rPr lang="de-DE" dirty="0" err="1"/>
+              <a:t>Use</a:t>
+            </a:r>
+            <a:r>
               <a:rPr lang="de-DE" dirty="0"/>
-              <a:t>Epic 1: Konto eröffnen</a:t>
-            </a:r>
-            <a:endParaRPr lang="de-DE" sz="1400" dirty="0">
-              <a:solidFill>
-                <a:srgbClr val="00B050"/>
-              </a:solidFill>
-            </a:endParaRPr>
+              <a:t>-Case Diagramm</a:t>
+            </a:r>
           </a:p>
         </p:txBody>
       </p:sp>
+      <p:pic>
+        <p:nvPicPr>
+          <p:cNvPr id="6" name="Grafik 5">
+            <a:extLst>
+              <a:ext uri="{FF2B5EF4-FFF2-40B4-BE49-F238E27FC236}">
+                <a16:creationId xmlns:a16="http://schemas.microsoft.com/office/drawing/2014/main" id="{49759A96-61D6-79A9-136A-A721A0B6FB53}"/>
+              </a:ext>
+            </a:extLst>
+          </p:cNvPr>
+          <p:cNvPicPr>
+            <a:picLocks noChangeAspect="1"/>
+          </p:cNvPicPr>
+          <p:nvPr/>
+        </p:nvPicPr>
+        <p:blipFill>
+          <a:blip r:embed="rId3">
+            <a:extLst>
+              <a:ext uri="{28A0092B-C50C-407E-A947-70E740481C1C}">
+                <a14:useLocalDpi xmlns:a14="http://schemas.microsoft.com/office/drawing/2010/main" val="0"/>
+              </a:ext>
+            </a:extLst>
+          </a:blip>
+          <a:stretch>
+            <a:fillRect/>
+          </a:stretch>
+        </p:blipFill>
+        <p:spPr>
+          <a:xfrm>
+            <a:off x="1691899" y="1176546"/>
+            <a:ext cx="6485166" cy="4090751"/>
+          </a:xfrm>
+          <a:prstGeom prst="rect">
+            <a:avLst/>
+          </a:prstGeom>
+        </p:spPr>
+      </p:pic>
     </p:spTree>
     <p:extLst>
       <p:ext uri="{BB962C8B-B14F-4D97-AF65-F5344CB8AC3E}">
-        <p14:creationId xmlns:p14="http://schemas.microsoft.com/office/powerpoint/2010/main" val="2434018515"/>
+        <p14:creationId xmlns:p14="http://schemas.microsoft.com/office/powerpoint/2010/main" val="3064782011"/>
       </p:ext>
     </p:extLst>
   </p:cSld>
@@ -2462,11 +2847,11 @@
           <a:p>
             <a:pPr marL="457200" indent="-457200">
               <a:buFont typeface="+mj-lt"/>
-              <a:buAutoNum type="arabicPeriod" startAt="2"/>
+              <a:buAutoNum type="arabicPeriod"/>
             </a:pPr>
             <a:r>
               <a:rPr lang="de-DE" b="1" dirty="0"/>
-              <a:t>Als Kunde möchte ich einen Depotkonto eröffnen können, um mein Aktien hinterlegen zu können.</a:t>
+              <a:t>Als Kunde möchte ich einen Girokonto eröffnen können, um mein Geld in der Bank aufzubewahren.</a:t>
             </a:r>
           </a:p>
           <a:p>
@@ -2482,14 +2867,28 @@
             <a:pPr lvl="2"/>
             <a:r>
               <a:rPr lang="de-DE" dirty="0"/>
-              <a:t>Wenn die Kunde ihre persönliche Daten und Referenzkonto eingibt, läuft der Depotkontoeröffnung weiter.</a:t>
+              <a:t>Der Kunde kann seine Name und Adresse eingeben.</a:t>
             </a:r>
           </a:p>
           <a:p>
             <a:pPr lvl="2"/>
             <a:r>
               <a:rPr lang="de-DE" dirty="0"/>
-              <a:t>Wenn die Depotkontoeröffnung erfolgreich ist, werden die Kontonummer, der Saldo und die Berechtigung dem Kunden gegeben.</a:t>
+              <a:t>Der Kunde kann seine Identität mit einem gültigem Ausweis überprüfen.</a:t>
+            </a:r>
+          </a:p>
+          <a:p>
+            <a:pPr lvl="2"/>
+            <a:r>
+              <a:rPr lang="de-DE" dirty="0"/>
+              <a:t>Der Kunde kann eine Summe Geld für den Anfangssaldo eingeben.</a:t>
+            </a:r>
+          </a:p>
+          <a:p>
+            <a:pPr lvl="2"/>
+            <a:r>
+              <a:rPr lang="de-DE" dirty="0"/>
+              <a:t>Wenn die Girokontoeröffnung erfolgreich ist, werden die IBAN, der Anfangssaldo und die PIN dem Kunden angezeigt.</a:t>
             </a:r>
           </a:p>
         </p:txBody>
@@ -2524,7 +2923,7 @@
     </p:spTree>
     <p:extLst>
       <p:ext uri="{BB962C8B-B14F-4D97-AF65-F5344CB8AC3E}">
-        <p14:creationId xmlns:p14="http://schemas.microsoft.com/office/powerpoint/2010/main" val="4199853890"/>
+        <p14:creationId xmlns:p14="http://schemas.microsoft.com/office/powerpoint/2010/main" val="2434018515"/>
       </p:ext>
     </p:extLst>
   </p:cSld>
@@ -2568,11 +2967,11 @@
           <a:p>
             <a:pPr marL="457200" indent="-457200">
               <a:buFont typeface="+mj-lt"/>
-              <a:buAutoNum type="arabicPeriod"/>
+              <a:buAutoNum type="arabicPeriod" startAt="2"/>
             </a:pPr>
             <a:r>
               <a:rPr lang="de-DE" b="1" dirty="0"/>
-              <a:t>Als Kunde möchte ich die Liste der Posten in meinem Depot ansehen können, um die gesamte Werte meiner Aktien zu überwachen.</a:t>
+              <a:t>Als Kunde möchte ich einen Depotkonto eröffnen können, um mein Aktien hinterlegen zu können.</a:t>
             </a:r>
           </a:p>
           <a:p>
@@ -2588,19 +2987,29 @@
             <a:pPr lvl="2"/>
             <a:r>
               <a:rPr lang="de-DE" dirty="0"/>
-              <a:t>Die Kunde kann ihre Kontonummer und Personalausweis eingeben, um die Identität zu verifizieren, falls sie noch nicht verifiziert ist.</a:t>
+              <a:t>Der Kunde kann seine Name und Adresse eingeben.</a:t>
             </a:r>
           </a:p>
           <a:p>
             <a:pPr lvl="2"/>
             <a:r>
               <a:rPr lang="de-DE" dirty="0"/>
-              <a:t>Nach der Verifizierung bekommt der Kunde die Liste der Posten in ihrem Depot und die gesamte Saldo des Depots angezeigt.</a:t>
+              <a:t>Der Kunde kann seine Identität mit einem gültigem Ausweis verifizieren.</a:t>
             </a:r>
           </a:p>
           <a:p>
             <a:pPr lvl="2"/>
-            <a:endParaRPr lang="de-DE" dirty="0"/>
+            <a:r>
+              <a:rPr lang="de-DE" dirty="0"/>
+              <a:t>Der Kunde kann eine Referenzkonto mit dem neuen Depotkonto verbinden.</a:t>
+            </a:r>
+          </a:p>
+          <a:p>
+            <a:pPr lvl="2"/>
+            <a:r>
+              <a:rPr lang="de-DE" dirty="0"/>
+              <a:t>Wenn die Depotkontoeröffnung erfolgreich ist, werden die Kontonummer, der Saldo und die PIN dem Kunden gegeben.</a:t>
+            </a:r>
           </a:p>
         </p:txBody>
       </p:sp>
@@ -2621,7 +3030,7 @@
           <a:p>
             <a:r>
               <a:rPr lang="de-DE" dirty="0"/>
-              <a:t>Epic 2: Posten ansehen</a:t>
+              <a:t>Epic 1: Konto eröffnen</a:t>
             </a:r>
             <a:endParaRPr lang="de-DE" sz="1400" dirty="0">
               <a:solidFill>
@@ -2634,7 +3043,7 @@
     </p:spTree>
     <p:extLst>
       <p:ext uri="{BB962C8B-B14F-4D97-AF65-F5344CB8AC3E}">
-        <p14:creationId xmlns:p14="http://schemas.microsoft.com/office/powerpoint/2010/main" val="231201351"/>
+        <p14:creationId xmlns:p14="http://schemas.microsoft.com/office/powerpoint/2010/main" val="4199853890"/>
       </p:ext>
     </p:extLst>
   </p:cSld>
@@ -2678,11 +3087,11 @@
           <a:p>
             <a:pPr marL="457200" indent="-457200">
               <a:buFont typeface="+mj-lt"/>
-              <a:buAutoNum type="arabicPeriod" startAt="2"/>
+              <a:buAutoNum type="arabicPeriod"/>
             </a:pPr>
             <a:r>
               <a:rPr lang="de-DE" b="1" dirty="0"/>
-              <a:t>Als Kunde möchte ich die Details der einzelnen Posten in meinem Depots sehen können, um eine Entscheidung über den Verkauf zu treffen.</a:t>
+              <a:t>Als Kunde möchte ich die Liste der Posten in meinem Depot ansehen können, um die gesamte Werte meiner Aktien zu überwachen.</a:t>
             </a:r>
           </a:p>
           <a:p>
@@ -2698,14 +3107,124 @@
             <a:pPr lvl="2"/>
             <a:r>
               <a:rPr lang="de-DE" dirty="0"/>
-              <a:t>Die Kunde kann ihre Kontonummer und Personalausweis eingeben, um die Identität zu verifizieren, falls sie noch nicht verifiziert ist.</a:t>
+              <a:t>Der Kunde kann seine Kontonummer und PIN eingeben, um die Identität zu verifizieren, falls er noch nicht verifiziert ist.</a:t>
             </a:r>
           </a:p>
           <a:p>
             <a:pPr lvl="2"/>
             <a:r>
               <a:rPr lang="de-DE" dirty="0"/>
-              <a:t>Nach der Verifizierung bekommt der Kunde der Verlauf der Tageskurse, die Wertpapierkennnummer und andere Details von dem einzelnen Posten angezeigt.</a:t>
+              <a:t>Wenn der Kunde schon verifiziert ist, bekommt er die Liste der Posten in ihrem Depot und die gesamte Saldo des Depots angezeigt.</a:t>
+            </a:r>
+          </a:p>
+          <a:p>
+            <a:pPr lvl="2"/>
+            <a:endParaRPr lang="de-DE" dirty="0"/>
+          </a:p>
+        </p:txBody>
+      </p:sp>
+      <p:sp>
+        <p:nvSpPr>
+          <p:cNvPr id="4" name="Titel 3"/>
+          <p:cNvSpPr>
+            <a:spLocks noGrp="1"/>
+          </p:cNvSpPr>
+          <p:nvPr>
+            <p:ph type="title"/>
+          </p:nvPr>
+        </p:nvSpPr>
+        <p:spPr/>
+        <p:txBody>
+          <a:bodyPr/>
+          <a:lstStyle/>
+          <a:p>
+            <a:r>
+              <a:rPr lang="de-DE" dirty="0"/>
+              <a:t>Epic 2: Posten ansehen</a:t>
+            </a:r>
+            <a:endParaRPr lang="de-DE" sz="1400" dirty="0">
+              <a:solidFill>
+                <a:srgbClr val="00B050"/>
+              </a:solidFill>
+            </a:endParaRPr>
+          </a:p>
+        </p:txBody>
+      </p:sp>
+    </p:spTree>
+    <p:extLst>
+      <p:ext uri="{BB962C8B-B14F-4D97-AF65-F5344CB8AC3E}">
+        <p14:creationId xmlns:p14="http://schemas.microsoft.com/office/powerpoint/2010/main" val="231201351"/>
+      </p:ext>
+    </p:extLst>
+  </p:cSld>
+  <p:clrMapOvr>
+    <a:masterClrMapping/>
+  </p:clrMapOvr>
+</p:sld>
+</file>
+
+<file path=ppt/slides/slide15.xml><?xml version="1.0" encoding="utf-8"?>
+<p:sld xmlns:a="http://schemas.openxmlformats.org/drawingml/2006/main" xmlns:r="http://schemas.openxmlformats.org/officeDocument/2006/relationships" xmlns:p="http://schemas.openxmlformats.org/presentationml/2006/main">
+  <p:cSld>
+    <p:spTree>
+      <p:nvGrpSpPr>
+        <p:cNvPr id="1" name=""/>
+        <p:cNvGrpSpPr/>
+        <p:nvPr/>
+      </p:nvGrpSpPr>
+      <p:grpSpPr>
+        <a:xfrm>
+          <a:off x="0" y="0"/>
+          <a:ext cx="0" cy="0"/>
+          <a:chOff x="0" y="0"/>
+          <a:chExt cx="0" cy="0"/>
+        </a:xfrm>
+      </p:grpSpPr>
+      <p:sp>
+        <p:nvSpPr>
+          <p:cNvPr id="5" name="Inhaltsplatzhalter 4"/>
+          <p:cNvSpPr>
+            <a:spLocks noGrp="1"/>
+          </p:cNvSpPr>
+          <p:nvPr>
+            <p:ph idx="1"/>
+          </p:nvPr>
+        </p:nvSpPr>
+        <p:spPr/>
+        <p:txBody>
+          <a:bodyPr anchor="t"/>
+          <a:lstStyle/>
+          <a:p>
+            <a:pPr marL="457200" indent="-457200">
+              <a:buFont typeface="+mj-lt"/>
+              <a:buAutoNum type="arabicPeriod" startAt="2"/>
+            </a:pPr>
+            <a:r>
+              <a:rPr lang="de-DE" b="1" dirty="0"/>
+              <a:t>Als Kunde möchte ich die Details der einzelnen Posten in meinem Depots sehen können, um eine Entscheidung über den Verkauf zu treffen.</a:t>
+            </a:r>
+          </a:p>
+          <a:p>
+            <a:pPr marL="596164" lvl="2" indent="0">
+              <a:buNone/>
+            </a:pPr>
+            <a:r>
+              <a:rPr lang="de-DE" u="sng" dirty="0"/>
+              <a:t>Akzeptanzkriterien:</a:t>
+            </a:r>
+          </a:p>
+          <a:p>
+            <a:pPr lvl="2"/>
+            <a:r>
+              <a:rPr lang="de-DE" dirty="0"/>
+              <a:t>Der Kunde kann seine Kontonummer und PIN eingeben, um die Identität zu verifizieren, falls er noch nicht verifiziert ist.</a:t>
+            </a:r>
+          </a:p>
+          <a:p>
+            <a:pPr lvl="2"/>
+            <a:r>
+              <a:rPr lang="de-DE" dirty="0"/>
+              <a:t>Wenn der Kunde schon verifiziert ist, kann er der Verlauf die Wertpapierkennnummer, der Tageskurse, und andere Details von dem einzelnen Posten ansehen.</a:t>
             </a:r>
           </a:p>
         </p:txBody>
@@ -3439,9 +3958,6 @@
             </a:br>
             <a:r>
               <a:rPr lang="de-DE" sz="2400" b="0" dirty="0">
-                <a:solidFill>
-                  <a:srgbClr val="4471C4"/>
-                </a:solidFill>
                 <a:latin typeface="Calibri" panose="020F0502020204030204" pitchFamily="34" charset="0"/>
               </a:rPr>
               <a:t>Markierung der Substantive</a:t>
@@ -4026,12 +4542,9 @@
             </a:br>
             <a:r>
               <a:rPr lang="de-DE" sz="2400" b="0" dirty="0">
-                <a:solidFill>
-                  <a:srgbClr val="4471C4"/>
-                </a:solidFill>
-                <a:latin typeface="Calibri" panose="020F0502020204030204" pitchFamily="34" charset="0"/>
-              </a:rPr>
-              <a:t>Entfernen der Substantive</a:t>
+                <a:latin typeface="Calibri" panose="020F0502020204030204" pitchFamily="34" charset="0"/>
+              </a:rPr>
+              <a:t>Durchstrichen der doppelten</a:t>
             </a:r>
             <a:endParaRPr lang="de-DE" dirty="0"/>
           </a:p>
@@ -4110,7 +4623,7 @@
               <a:t> können </a:t>
             </a:r>
             <a:r>
-              <a:rPr lang="de-DE" sz="1800" i="0" u="none" baseline="0" dirty="0">
+              <a:rPr lang="de-DE" sz="1800" b="1" i="0" u="none" baseline="0" dirty="0">
                 <a:highlight>
                   <a:srgbClr val="FFFF00"/>
                 </a:highlight>
@@ -4125,7 +4638,7 @@
               <a:t> eine Reihe von </a:t>
             </a:r>
             <a:r>
-              <a:rPr lang="de-DE" sz="1800" i="0" u="none" baseline="0" dirty="0">
+              <a:rPr lang="de-DE" sz="1800" b="1" i="0" u="none" baseline="0" dirty="0">
                 <a:highlight>
                   <a:srgbClr val="FFFF00"/>
                 </a:highlight>
@@ -4140,7 +4653,7 @@
               <a:t> eröffnen. Hierzu müssen der </a:t>
             </a:r>
             <a:r>
-              <a:rPr lang="de-DE" sz="1800" b="0" i="0" u="none" baseline="0" dirty="0">
+              <a:rPr lang="de-DE" sz="1800" b="1" i="0" u="none" baseline="0" dirty="0">
                 <a:highlight>
                   <a:srgbClr val="FFFF00"/>
                 </a:highlight>
@@ -4155,7 +4668,7 @@
               <a:t> und die </a:t>
             </a:r>
             <a:r>
-              <a:rPr lang="de-DE" sz="1800" b="0" i="0" u="none" baseline="0" dirty="0">
+              <a:rPr lang="de-DE" sz="1800" b="1" i="0" u="none" baseline="0" dirty="0">
                 <a:highlight>
                   <a:srgbClr val="FFFF00"/>
                 </a:highlight>
@@ -4167,37 +4680,100 @@
               <a:rPr lang="de-DE" sz="1800" b="0" i="0" u="none" baseline="0" dirty="0">
                 <a:latin typeface="Calibri" panose="020F0502020204030204" pitchFamily="34" charset="0"/>
               </a:rPr>
-              <a:t> hinterlegt werden. Alle </a:t>
+              <a:t> hinterlegt werden. Alle Konten haben einen </a:t>
+            </a:r>
+            <a:r>
+              <a:rPr lang="de-DE" sz="1800" b="1" i="0" u="none" baseline="0" dirty="0">
+                <a:highlight>
+                  <a:srgbClr val="FFFF00"/>
+                </a:highlight>
+                <a:latin typeface="Calibri" panose="020F0502020204030204" pitchFamily="34" charset="0"/>
+              </a:rPr>
+              <a:t>Saldo</a:t>
+            </a:r>
+            <a:r>
+              <a:rPr lang="de-DE" sz="1800" b="0" i="0" u="none" baseline="0" dirty="0">
+                <a:latin typeface="Calibri" panose="020F0502020204030204" pitchFamily="34" charset="0"/>
+              </a:rPr>
+              <a:t>, welcher angibt, was für ein </a:t>
             </a:r>
             <a:r>
               <a:rPr lang="de-DE" sz="1800" b="0" i="0" u="none" strike="sngStrike" baseline="0" dirty="0">
-                <a:highlight>
-                  <a:srgbClr val="FFFF00"/>
-                </a:highlight>
-                <a:latin typeface="Calibri" panose="020F0502020204030204" pitchFamily="34" charset="0"/>
-              </a:rPr>
-              <a:t>Konten</a:t>
-            </a:r>
-            <a:r>
-              <a:rPr lang="de-DE" sz="1800" b="0" i="0" u="none" baseline="0" dirty="0">
-                <a:latin typeface="Calibri" panose="020F0502020204030204" pitchFamily="34" charset="0"/>
-              </a:rPr>
-              <a:t> haben einen </a:t>
-            </a:r>
-            <a:r>
-              <a:rPr lang="de-DE" sz="1800" b="0" i="0" u="none" baseline="0" dirty="0">
-                <a:highlight>
-                  <a:srgbClr val="FFFF00"/>
-                </a:highlight>
-                <a:latin typeface="Calibri" panose="020F0502020204030204" pitchFamily="34" charset="0"/>
-              </a:rPr>
-              <a:t>Saldo</a:t>
-            </a:r>
-            <a:r>
-              <a:rPr lang="de-DE" sz="1800" b="0" i="0" u="none" baseline="0" dirty="0">
-                <a:latin typeface="Calibri" panose="020F0502020204030204" pitchFamily="34" charset="0"/>
-              </a:rPr>
-              <a:t>, welcher angibt, was für ein </a:t>
+                <a:solidFill>
+                  <a:srgbClr val="00B0F0"/>
+                </a:solidFill>
+                <a:highlight>
+                  <a:srgbClr val="FFFF00"/>
+                </a:highlight>
+                <a:latin typeface="Calibri" panose="020F0502020204030204" pitchFamily="34" charset="0"/>
+              </a:rPr>
+              <a:t>Wert</a:t>
+            </a:r>
+            <a:r>
+              <a:rPr lang="de-DE" sz="1800" b="0" i="0" u="none" baseline="0" dirty="0">
+                <a:latin typeface="Calibri" panose="020F0502020204030204" pitchFamily="34" charset="0"/>
+              </a:rPr>
+              <a:t> sich aktuell auf dem Konto befindet. </a:t>
+            </a:r>
+            <a:r>
+              <a:rPr lang="de-DE" sz="1800" b="1" i="0" u="none" baseline="0" dirty="0">
+                <a:highlight>
+                  <a:srgbClr val="FFFF00"/>
+                </a:highlight>
+                <a:latin typeface="Calibri" panose="020F0502020204030204" pitchFamily="34" charset="0"/>
+              </a:rPr>
+              <a:t>Girokonten</a:t>
+            </a:r>
+            <a:r>
+              <a:rPr lang="de-DE" sz="1800" b="0" i="0" u="none" baseline="0" dirty="0">
+                <a:latin typeface="Calibri" panose="020F0502020204030204" pitchFamily="34" charset="0"/>
+              </a:rPr>
+              <a:t> sind die ganz normalen Konten, sie werden durch eine eindeutige </a:t>
+            </a:r>
+            <a:r>
+              <a:rPr lang="de-DE" sz="1800" b="1" i="0" u="none" baseline="0" dirty="0">
+                <a:highlight>
+                  <a:srgbClr val="FFFF00"/>
+                </a:highlight>
+                <a:latin typeface="Calibri" panose="020F0502020204030204" pitchFamily="34" charset="0"/>
+              </a:rPr>
+              <a:t>IBAN</a:t>
+            </a:r>
+            <a:r>
+              <a:rPr lang="de-DE" sz="1800" b="0" i="0" u="none" baseline="0" dirty="0">
+                <a:latin typeface="Calibri" panose="020F0502020204030204" pitchFamily="34" charset="0"/>
+              </a:rPr>
+              <a:t> identifiziert. Zudem gibt es </a:t>
+            </a:r>
+            <a:r>
+              <a:rPr lang="de-DE" sz="1800" b="1" i="0" u="none" baseline="0" dirty="0">
+                <a:highlight>
+                  <a:srgbClr val="FFFF00"/>
+                </a:highlight>
+                <a:latin typeface="Calibri" panose="020F0502020204030204" pitchFamily="34" charset="0"/>
+              </a:rPr>
+              <a:t>Depotkonten</a:t>
+            </a:r>
+            <a:r>
+              <a:rPr lang="de-DE" sz="1800" b="0" i="0" u="none" baseline="0" dirty="0">
+                <a:latin typeface="Calibri" panose="020F0502020204030204" pitchFamily="34" charset="0"/>
+              </a:rPr>
+              <a:t>, in dem die von den Kunden gekauften </a:t>
+            </a:r>
+            <a:r>
+              <a:rPr lang="de-DE" sz="1800" b="1" i="0" u="none" baseline="0" dirty="0">
+                <a:highlight>
+                  <a:srgbClr val="FFFF00"/>
+                </a:highlight>
+                <a:latin typeface="Calibri" panose="020F0502020204030204" pitchFamily="34" charset="0"/>
+              </a:rPr>
+              <a:t>Aktien</a:t>
+            </a:r>
+            <a:r>
+              <a:rPr lang="de-DE" sz="1800" b="0" i="0" u="none" baseline="0" dirty="0">
+                <a:latin typeface="Calibri" panose="020F0502020204030204" pitchFamily="34" charset="0"/>
+              </a:rPr>
+              <a:t> abgelegt werden. Der Kunde kann sich eine </a:t>
             </a:r>
             <a:r>
               <a:rPr lang="de-DE" sz="1800" b="0" i="0" u="none" strike="sngStrike" baseline="0" dirty="0">
@@ -4209,133 +4785,85 @@
                 </a:highlight>
                 <a:latin typeface="Calibri" panose="020F0502020204030204" pitchFamily="34" charset="0"/>
               </a:rPr>
-              <a:t>Wert</a:t>
-            </a:r>
-            <a:r>
-              <a:rPr lang="de-DE" sz="1800" b="0" i="0" u="none" baseline="0" dirty="0">
-                <a:latin typeface="Calibri" panose="020F0502020204030204" pitchFamily="34" charset="0"/>
-              </a:rPr>
-              <a:t> sich aktuell auf dem </a:t>
+              <a:t>Auflistung</a:t>
+            </a:r>
+            <a:r>
+              <a:rPr lang="de-DE" sz="1800" b="0" i="0" u="none" baseline="0" dirty="0">
+                <a:latin typeface="Calibri" panose="020F0502020204030204" pitchFamily="34" charset="0"/>
+              </a:rPr>
+              <a:t> der verschiedenen </a:t>
             </a:r>
             <a:r>
               <a:rPr lang="de-DE" sz="1800" b="0" i="0" u="none" strike="sngStrike" baseline="0" dirty="0">
-                <a:highlight>
-                  <a:srgbClr val="FFFF00"/>
-                </a:highlight>
-                <a:latin typeface="Calibri" panose="020F0502020204030204" pitchFamily="34" charset="0"/>
-              </a:rPr>
-              <a:t>Konto</a:t>
-            </a:r>
-            <a:r>
-              <a:rPr lang="de-DE" sz="1800" b="0" i="0" u="none" baseline="0" dirty="0">
-                <a:latin typeface="Calibri" panose="020F0502020204030204" pitchFamily="34" charset="0"/>
-              </a:rPr>
-              <a:t> befindet. </a:t>
-            </a:r>
-            <a:r>
-              <a:rPr lang="de-DE" sz="1800" b="0" i="0" u="none" baseline="0" dirty="0">
-                <a:highlight>
-                  <a:srgbClr val="FFFF00"/>
-                </a:highlight>
-                <a:latin typeface="Calibri" panose="020F0502020204030204" pitchFamily="34" charset="0"/>
-              </a:rPr>
-              <a:t>Girokonten</a:t>
-            </a:r>
-            <a:r>
-              <a:rPr lang="de-DE" sz="1800" b="0" i="0" u="none" baseline="0" dirty="0">
-                <a:latin typeface="Calibri" panose="020F0502020204030204" pitchFamily="34" charset="0"/>
-              </a:rPr>
-              <a:t> sind die ganz normalen </a:t>
+                <a:solidFill>
+                  <a:srgbClr val="00B0F0"/>
+                </a:solidFill>
+                <a:highlight>
+                  <a:srgbClr val="FFFF00"/>
+                </a:highlight>
+                <a:latin typeface="Calibri" panose="020F0502020204030204" pitchFamily="34" charset="0"/>
+              </a:rPr>
+              <a:t>Posten</a:t>
+            </a:r>
+            <a:r>
+              <a:rPr lang="de-DE" sz="1800" b="0" i="0" u="none" baseline="0" dirty="0">
+                <a:latin typeface="Calibri" panose="020F0502020204030204" pitchFamily="34" charset="0"/>
+              </a:rPr>
+              <a:t> in seinen </a:t>
             </a:r>
             <a:r>
               <a:rPr lang="de-DE" sz="1800" b="0" i="0" u="none" strike="sngStrike" baseline="0" dirty="0">
-                <a:highlight>
-                  <a:srgbClr val="FFFF00"/>
-                </a:highlight>
-                <a:latin typeface="Calibri" panose="020F0502020204030204" pitchFamily="34" charset="0"/>
-              </a:rPr>
-              <a:t>Konten</a:t>
-            </a:r>
-            <a:r>
-              <a:rPr lang="de-DE" sz="1800" b="0" i="0" u="none" baseline="0" dirty="0">
-                <a:latin typeface="Calibri" panose="020F0502020204030204" pitchFamily="34" charset="0"/>
-              </a:rPr>
-              <a:t>, sie werden durch eine eindeutige </a:t>
-            </a:r>
-            <a:r>
-              <a:rPr lang="de-DE" sz="1800" b="0" i="0" u="none" baseline="0" dirty="0">
-                <a:highlight>
-                  <a:srgbClr val="FFFF00"/>
-                </a:highlight>
-                <a:latin typeface="Calibri" panose="020F0502020204030204" pitchFamily="34" charset="0"/>
-              </a:rPr>
-              <a:t>IBAN</a:t>
-            </a:r>
-            <a:r>
-              <a:rPr lang="de-DE" sz="1800" b="0" i="0" u="none" baseline="0" dirty="0">
-                <a:latin typeface="Calibri" panose="020F0502020204030204" pitchFamily="34" charset="0"/>
-              </a:rPr>
-              <a:t> identifiziert. Zudem gibt es </a:t>
-            </a:r>
-            <a:r>
-              <a:rPr lang="de-DE" sz="1800" b="0" i="0" u="none" baseline="0" dirty="0">
-                <a:highlight>
-                  <a:srgbClr val="FFFF00"/>
-                </a:highlight>
-                <a:latin typeface="Calibri" panose="020F0502020204030204" pitchFamily="34" charset="0"/>
-              </a:rPr>
-              <a:t>Depotkonten</a:t>
-            </a:r>
-            <a:r>
-              <a:rPr lang="de-DE" sz="1800" b="0" i="0" u="none" baseline="0" dirty="0">
-                <a:latin typeface="Calibri" panose="020F0502020204030204" pitchFamily="34" charset="0"/>
-              </a:rPr>
-              <a:t>, in dem die von den </a:t>
+                <a:solidFill>
+                  <a:srgbClr val="00B0F0"/>
+                </a:solidFill>
+                <a:highlight>
+                  <a:srgbClr val="FFFF00"/>
+                </a:highlight>
+                <a:latin typeface="Calibri" panose="020F0502020204030204" pitchFamily="34" charset="0"/>
+              </a:rPr>
+              <a:t>Depots</a:t>
+            </a:r>
+            <a:r>
+              <a:rPr lang="de-DE" sz="1800" b="0" i="0" u="none" baseline="0" dirty="0">
+                <a:latin typeface="Calibri" panose="020F0502020204030204" pitchFamily="34" charset="0"/>
+              </a:rPr>
+              <a:t> anzeigen lassen. Wichtig ist, dass zur </a:t>
             </a:r>
             <a:r>
               <a:rPr lang="de-DE" sz="1800" b="0" i="0" u="none" strike="sngStrike" baseline="0" dirty="0">
-                <a:highlight>
-                  <a:srgbClr val="FFFF00"/>
-                </a:highlight>
-                <a:latin typeface="Calibri" panose="020F0502020204030204" pitchFamily="34" charset="0"/>
-              </a:rPr>
-              <a:t>Kunden</a:t>
-            </a:r>
-            <a:r>
-              <a:rPr lang="de-DE" sz="1800" b="0" i="0" u="none" baseline="0" dirty="0">
-                <a:latin typeface="Calibri" panose="020F0502020204030204" pitchFamily="34" charset="0"/>
-              </a:rPr>
-              <a:t> gekauften </a:t>
-            </a:r>
-            <a:r>
-              <a:rPr lang="de-DE" sz="1800" b="0" i="0" u="none" baseline="0" dirty="0">
-                <a:highlight>
-                  <a:srgbClr val="FFFF00"/>
-                </a:highlight>
-                <a:latin typeface="Calibri" panose="020F0502020204030204" pitchFamily="34" charset="0"/>
-              </a:rPr>
-              <a:t>Aktien</a:t>
-            </a:r>
-            <a:r>
-              <a:rPr lang="de-DE" sz="1800" b="0" i="0" u="none" baseline="0" dirty="0">
-                <a:latin typeface="Calibri" panose="020F0502020204030204" pitchFamily="34" charset="0"/>
-              </a:rPr>
-              <a:t> abgelegt werden. Der </a:t>
+                <a:solidFill>
+                  <a:srgbClr val="00B0F0"/>
+                </a:solidFill>
+                <a:highlight>
+                  <a:srgbClr val="FFFF00"/>
+                </a:highlight>
+                <a:latin typeface="Calibri" panose="020F0502020204030204" pitchFamily="34" charset="0"/>
+              </a:rPr>
+              <a:t>Deckung</a:t>
+            </a:r>
+            <a:r>
+              <a:rPr lang="de-DE" sz="1800" b="0" i="0" u="none" baseline="0" dirty="0">
+                <a:latin typeface="Calibri" panose="020F0502020204030204" pitchFamily="34" charset="0"/>
+              </a:rPr>
+              <a:t> von </a:t>
             </a:r>
             <a:r>
               <a:rPr lang="de-DE" sz="1800" b="0" i="0" u="none" strike="sngStrike" baseline="0" dirty="0">
-                <a:highlight>
-                  <a:srgbClr val="FFFF00"/>
-                </a:highlight>
-                <a:latin typeface="Calibri" panose="020F0502020204030204" pitchFamily="34" charset="0"/>
-              </a:rPr>
-              <a:t>Kunde</a:t>
-            </a:r>
-            <a:r>
-              <a:rPr lang="de-DE" sz="1800" b="0" i="0" u="none" baseline="0" dirty="0">
-                <a:latin typeface="Calibri" panose="020F0502020204030204" pitchFamily="34" charset="0"/>
-              </a:rPr>
-              <a:t> kann sich eine </a:t>
+                <a:solidFill>
+                  <a:srgbClr val="00B0F0"/>
+                </a:solidFill>
+                <a:highlight>
+                  <a:srgbClr val="FFFF00"/>
+                </a:highlight>
+                <a:latin typeface="Calibri" panose="020F0502020204030204" pitchFamily="34" charset="0"/>
+              </a:rPr>
+              <a:t>Käufen</a:t>
+            </a:r>
+            <a:r>
+              <a:rPr lang="de-DE" sz="1800" b="0" i="0" u="none" baseline="0" dirty="0">
+                <a:latin typeface="Calibri" panose="020F0502020204030204" pitchFamily="34" charset="0"/>
+              </a:rPr>
+              <a:t> und zur </a:t>
             </a:r>
             <a:r>
               <a:rPr lang="de-DE" sz="1800" b="0" i="0" u="none" strike="sngStrike" baseline="0" dirty="0">
@@ -4347,13 +4875,13 @@
                 </a:highlight>
                 <a:latin typeface="Calibri" panose="020F0502020204030204" pitchFamily="34" charset="0"/>
               </a:rPr>
-              <a:t>Auflistung</a:t>
-            </a:r>
-            <a:r>
-              <a:rPr lang="de-DE" sz="1800" b="0" i="0" u="none" baseline="0" dirty="0">
-                <a:latin typeface="Calibri" panose="020F0502020204030204" pitchFamily="34" charset="0"/>
-              </a:rPr>
-              <a:t> der verschiedenen </a:t>
+              <a:t>Ausschüttung</a:t>
+            </a:r>
+            <a:r>
+              <a:rPr lang="de-DE" sz="1800" b="0" i="0" u="none" baseline="0" dirty="0">
+                <a:latin typeface="Calibri" panose="020F0502020204030204" pitchFamily="34" charset="0"/>
+              </a:rPr>
+              <a:t> bei </a:t>
             </a:r>
             <a:r>
               <a:rPr lang="de-DE" sz="1800" b="0" i="0" u="none" strike="sngStrike" baseline="0" dirty="0">
@@ -4365,13 +4893,46 @@
                 </a:highlight>
                 <a:latin typeface="Calibri" panose="020F0502020204030204" pitchFamily="34" charset="0"/>
               </a:rPr>
-              <a:t>Posten</a:t>
-            </a:r>
-            <a:r>
-              <a:rPr lang="de-DE" sz="1800" b="0" i="0" u="none" baseline="0" dirty="0">
-                <a:latin typeface="Calibri" panose="020F0502020204030204" pitchFamily="34" charset="0"/>
-              </a:rPr>
-              <a:t> in seinen </a:t>
+              <a:t>Verkäufen</a:t>
+            </a:r>
+            <a:r>
+              <a:rPr lang="de-DE" sz="1800" b="0" i="0" u="none" baseline="0" dirty="0">
+                <a:latin typeface="Calibri" panose="020F0502020204030204" pitchFamily="34" charset="0"/>
+              </a:rPr>
+              <a:t> oder </a:t>
+            </a:r>
+            <a:r>
+              <a:rPr lang="de-DE" sz="1800" b="0" i="0" strike="sngStrike" baseline="0" dirty="0">
+                <a:solidFill>
+                  <a:srgbClr val="00B0F0"/>
+                </a:solidFill>
+                <a:highlight>
+                  <a:srgbClr val="FFFF00"/>
+                </a:highlight>
+                <a:latin typeface="Calibri" panose="020F0502020204030204" pitchFamily="34" charset="0"/>
+              </a:rPr>
+              <a:t>Dividendenzahlungen</a:t>
+            </a:r>
+            <a:r>
+              <a:rPr lang="de-DE" sz="1800" b="0" i="0" u="none" baseline="0" dirty="0">
+                <a:latin typeface="Calibri" panose="020F0502020204030204" pitchFamily="34" charset="0"/>
+              </a:rPr>
+              <a:t> immer ein </a:t>
+            </a:r>
+            <a:r>
+              <a:rPr lang="de-DE" sz="1800" b="1" i="0" u="none" baseline="0" dirty="0">
+                <a:highlight>
+                  <a:srgbClr val="FFFF00"/>
+                </a:highlight>
+                <a:latin typeface="Calibri" panose="020F0502020204030204" pitchFamily="34" charset="0"/>
+              </a:rPr>
+              <a:t>Referenzkonto</a:t>
+            </a:r>
+            <a:r>
+              <a:rPr lang="de-DE" sz="1800" b="0" i="0" u="none" baseline="0" dirty="0">
+                <a:latin typeface="Calibri" panose="020F0502020204030204" pitchFamily="34" charset="0"/>
+              </a:rPr>
+              <a:t> angegeben werden muss. Zur </a:t>
             </a:r>
             <a:r>
               <a:rPr lang="de-DE" sz="1800" b="0" i="0" u="none" strike="sngStrike" baseline="0" dirty="0">
@@ -4383,169 +4944,16 @@
                 </a:highlight>
                 <a:latin typeface="Calibri" panose="020F0502020204030204" pitchFamily="34" charset="0"/>
               </a:rPr>
-              <a:t>Depots</a:t>
-            </a:r>
-            <a:r>
-              <a:rPr lang="de-DE" sz="1800" b="0" i="0" u="none" baseline="0" dirty="0">
-                <a:latin typeface="Calibri" panose="020F0502020204030204" pitchFamily="34" charset="0"/>
-              </a:rPr>
-              <a:t> anzeigen lassen. Wichtig ist, dass zur </a:t>
-            </a:r>
-            <a:r>
-              <a:rPr lang="de-DE" sz="1800" b="0" i="0" u="none" strike="sngStrike" baseline="0" dirty="0">
-                <a:solidFill>
-                  <a:srgbClr val="00B0F0"/>
-                </a:solidFill>
-                <a:highlight>
-                  <a:srgbClr val="FFFF00"/>
-                </a:highlight>
-                <a:latin typeface="Calibri" panose="020F0502020204030204" pitchFamily="34" charset="0"/>
-              </a:rPr>
-              <a:t>Deckung</a:t>
-            </a:r>
-            <a:r>
-              <a:rPr lang="de-DE" sz="1800" b="0" i="0" u="none" baseline="0" dirty="0">
-                <a:latin typeface="Calibri" panose="020F0502020204030204" pitchFamily="34" charset="0"/>
-              </a:rPr>
-              <a:t> von </a:t>
-            </a:r>
-            <a:r>
-              <a:rPr lang="de-DE" sz="1800" b="0" i="0" u="none" strike="sngStrike" baseline="0" dirty="0">
-                <a:solidFill>
-                  <a:srgbClr val="00B0F0"/>
-                </a:solidFill>
-                <a:highlight>
-                  <a:srgbClr val="FFFF00"/>
-                </a:highlight>
-                <a:latin typeface="Calibri" panose="020F0502020204030204" pitchFamily="34" charset="0"/>
-              </a:rPr>
-              <a:t>Käufen</a:t>
-            </a:r>
-            <a:r>
-              <a:rPr lang="de-DE" sz="1800" b="0" i="0" u="none" baseline="0" dirty="0">
-                <a:latin typeface="Calibri" panose="020F0502020204030204" pitchFamily="34" charset="0"/>
-              </a:rPr>
-              <a:t> und zur </a:t>
-            </a:r>
-            <a:r>
-              <a:rPr lang="de-DE" sz="1800" b="0" i="0" u="none" strike="sngStrike" baseline="0" dirty="0">
-                <a:solidFill>
-                  <a:srgbClr val="00B0F0"/>
-                </a:solidFill>
-                <a:highlight>
-                  <a:srgbClr val="FFFF00"/>
-                </a:highlight>
-                <a:latin typeface="Calibri" panose="020F0502020204030204" pitchFamily="34" charset="0"/>
-              </a:rPr>
-              <a:t>Ausschüttung</a:t>
-            </a:r>
-            <a:r>
-              <a:rPr lang="de-DE" sz="1800" b="0" i="0" u="none" baseline="0" dirty="0">
-                <a:latin typeface="Calibri" panose="020F0502020204030204" pitchFamily="34" charset="0"/>
-              </a:rPr>
-              <a:t> bei </a:t>
-            </a:r>
-            <a:r>
-              <a:rPr lang="de-DE" sz="1800" b="0" i="0" u="none" strike="sngStrike" baseline="0" dirty="0">
-                <a:solidFill>
-                  <a:srgbClr val="00B0F0"/>
-                </a:solidFill>
-                <a:highlight>
-                  <a:srgbClr val="FFFF00"/>
-                </a:highlight>
-                <a:latin typeface="Calibri" panose="020F0502020204030204" pitchFamily="34" charset="0"/>
-              </a:rPr>
-              <a:t>Verkäufen</a:t>
-            </a:r>
-            <a:r>
-              <a:rPr lang="de-DE" sz="1800" b="0" i="0" u="none" baseline="0" dirty="0">
-                <a:latin typeface="Calibri" panose="020F0502020204030204" pitchFamily="34" charset="0"/>
-              </a:rPr>
-              <a:t> oder </a:t>
-            </a:r>
-            <a:r>
-              <a:rPr lang="de-DE" sz="1800" b="0" i="0" strike="sngStrike" baseline="0" dirty="0">
-                <a:solidFill>
-                  <a:srgbClr val="00B0F0"/>
-                </a:solidFill>
-                <a:highlight>
-                  <a:srgbClr val="FFFF00"/>
-                </a:highlight>
-                <a:latin typeface="Calibri" panose="020F0502020204030204" pitchFamily="34" charset="0"/>
-              </a:rPr>
-              <a:t>Dividendenzahlungen</a:t>
-            </a:r>
-            <a:r>
-              <a:rPr lang="de-DE" sz="1800" b="0" i="0" u="none" baseline="0" dirty="0">
-                <a:latin typeface="Calibri" panose="020F0502020204030204" pitchFamily="34" charset="0"/>
-              </a:rPr>
-              <a:t> immer ein </a:t>
-            </a:r>
-            <a:r>
-              <a:rPr lang="de-DE" sz="1800" b="0" i="0" u="none" baseline="0" dirty="0">
-                <a:highlight>
-                  <a:srgbClr val="FFFF00"/>
-                </a:highlight>
-                <a:latin typeface="Calibri" panose="020F0502020204030204" pitchFamily="34" charset="0"/>
-              </a:rPr>
-              <a:t>Referenzkonto</a:t>
-            </a:r>
-            <a:r>
-              <a:rPr lang="de-DE" sz="1800" b="0" i="0" u="none" baseline="0" dirty="0">
-                <a:latin typeface="Calibri" panose="020F0502020204030204" pitchFamily="34" charset="0"/>
-              </a:rPr>
-              <a:t> angegeben werden muss. Zur </a:t>
-            </a:r>
-            <a:r>
-              <a:rPr lang="de-DE" sz="1800" b="0" i="0" u="none" strike="sngStrike" baseline="0" dirty="0">
-                <a:solidFill>
-                  <a:srgbClr val="00B0F0"/>
-                </a:solidFill>
-                <a:highlight>
-                  <a:srgbClr val="FFFF00"/>
-                </a:highlight>
-                <a:latin typeface="Calibri" panose="020F0502020204030204" pitchFamily="34" charset="0"/>
-              </a:rPr>
               <a:t>Berechnung</a:t>
             </a:r>
             <a:r>
               <a:rPr lang="de-DE" sz="1800" b="0" i="0" u="none" baseline="0" dirty="0">
                 <a:latin typeface="Calibri" panose="020F0502020204030204" pitchFamily="34" charset="0"/>
               </a:rPr>
-              <a:t> des </a:t>
-            </a:r>
-            <a:r>
-              <a:rPr lang="de-DE" sz="1800" b="0" i="0" u="none" strike="sngStrike" baseline="0" dirty="0">
-                <a:highlight>
-                  <a:srgbClr val="FFFF00"/>
-                </a:highlight>
-                <a:latin typeface="Calibri" panose="020F0502020204030204" pitchFamily="34" charset="0"/>
-              </a:rPr>
-              <a:t>Saldos</a:t>
-            </a:r>
-            <a:r>
-              <a:rPr lang="de-DE" sz="1800" b="0" i="0" u="none" baseline="0" dirty="0">
-                <a:latin typeface="Calibri" panose="020F0502020204030204" pitchFamily="34" charset="0"/>
-              </a:rPr>
-              <a:t> eines </a:t>
-            </a:r>
-            <a:r>
-              <a:rPr lang="de-DE" sz="1800" b="0" i="0" u="none" strike="sngStrike" baseline="0" dirty="0">
-                <a:highlight>
-                  <a:srgbClr val="FFFF00"/>
-                </a:highlight>
-                <a:latin typeface="Calibri" panose="020F0502020204030204" pitchFamily="34" charset="0"/>
-              </a:rPr>
-              <a:t>Depots</a:t>
-            </a:r>
-            <a:r>
-              <a:rPr lang="de-DE" sz="1800" b="0" i="0" u="none" baseline="0" dirty="0">
-                <a:latin typeface="Calibri" panose="020F0502020204030204" pitchFamily="34" charset="0"/>
-              </a:rPr>
-              <a:t> werden immer die </a:t>
-            </a:r>
-            <a:r>
-              <a:rPr lang="de-DE" sz="1800" b="0" i="0" u="none" baseline="0" dirty="0">
+              <a:t> des Saldos eines Depots werden immer die </a:t>
+            </a:r>
+            <a:r>
+              <a:rPr lang="de-DE" sz="1800" b="1" i="0" u="none" baseline="0" dirty="0">
                 <a:highlight>
                   <a:srgbClr val="FFFF00"/>
                 </a:highlight>
@@ -4557,40 +4965,10 @@
               <a:rPr lang="de-DE" sz="1800" b="0" i="0" u="none" baseline="0" dirty="0">
                 <a:latin typeface="Calibri" panose="020F0502020204030204" pitchFamily="34" charset="0"/>
               </a:rPr>
-              <a:t> der </a:t>
-            </a:r>
-            <a:r>
-              <a:rPr lang="de-DE" sz="1800" b="0" i="0" u="none" strike="sngStrike" baseline="0" dirty="0">
-                <a:highlight>
-                  <a:srgbClr val="FFFF00"/>
-                </a:highlight>
-                <a:latin typeface="Calibri" panose="020F0502020204030204" pitchFamily="34" charset="0"/>
-              </a:rPr>
-              <a:t>Aktien</a:t>
-            </a:r>
-            <a:r>
-              <a:rPr lang="de-DE" sz="1800" b="0" i="0" u="none" baseline="0" dirty="0">
-                <a:latin typeface="Calibri" panose="020F0502020204030204" pitchFamily="34" charset="0"/>
-              </a:rPr>
-              <a:t> verwendet. </a:t>
-            </a:r>
-            <a:r>
-              <a:rPr lang="de-DE" sz="1800" b="0" i="0" u="none" strike="sngStrike" baseline="0" dirty="0">
-                <a:highlight>
-                  <a:srgbClr val="FFFF00"/>
-                </a:highlight>
-                <a:latin typeface="Calibri" panose="020F0502020204030204" pitchFamily="34" charset="0"/>
-              </a:rPr>
-              <a:t>Aktien</a:t>
-            </a:r>
-            <a:r>
-              <a:rPr lang="de-DE" sz="1800" b="0" i="0" u="none" baseline="0" dirty="0">
-                <a:latin typeface="Calibri" panose="020F0502020204030204" pitchFamily="34" charset="0"/>
-              </a:rPr>
-              <a:t> werden durch die sogenannte </a:t>
-            </a:r>
-            <a:r>
-              <a:rPr lang="de-DE" sz="1800" b="0" i="0" u="none" baseline="0" dirty="0">
+              <a:t> der Aktien verwendet. Aktien werden durch die sogenannte </a:t>
+            </a:r>
+            <a:r>
+              <a:rPr lang="de-DE" sz="1800" b="1" i="0" u="none" baseline="0" dirty="0">
                 <a:highlight>
                   <a:srgbClr val="FFFF00"/>
                 </a:highlight>
@@ -4646,12 +5024,9 @@
             </a:br>
             <a:r>
               <a:rPr lang="de-DE" sz="2400" b="0" dirty="0">
-                <a:solidFill>
-                  <a:srgbClr val="4471C4"/>
-                </a:solidFill>
-                <a:latin typeface="Calibri" panose="020F0502020204030204" pitchFamily="34" charset="0"/>
-              </a:rPr>
-              <a:t>Entfernen der Substantive</a:t>
+                <a:latin typeface="Calibri" panose="020F0502020204030204" pitchFamily="34" charset="0"/>
+              </a:rPr>
+              <a:t>Durchstrichen der nicht relevanten</a:t>
             </a:r>
             <a:endParaRPr lang="de-DE" dirty="0"/>
           </a:p>
@@ -4709,25 +5084,7 @@
               <a:rPr lang="de-DE" sz="1800" b="0" i="0" u="none" baseline="0" dirty="0">
                 <a:latin typeface="Calibri" panose="020F0502020204030204" pitchFamily="34" charset="0"/>
               </a:rPr>
-              <a:t>In einer </a:t>
-            </a:r>
-            <a:r>
-              <a:rPr lang="de-DE" sz="1800" b="0" i="0" u="none" strike="sngStrike" baseline="0" dirty="0">
-                <a:solidFill>
-                  <a:srgbClr val="00B0F0"/>
-                </a:solidFill>
-                <a:highlight>
-                  <a:srgbClr val="FFFF00"/>
-                </a:highlight>
-                <a:latin typeface="Calibri" panose="020F0502020204030204" pitchFamily="34" charset="0"/>
-              </a:rPr>
-              <a:t>Bank</a:t>
-            </a:r>
-            <a:r>
-              <a:rPr lang="de-DE" sz="1800" b="0" i="0" u="none" baseline="0" dirty="0">
-                <a:latin typeface="Calibri" panose="020F0502020204030204" pitchFamily="34" charset="0"/>
-              </a:rPr>
-              <a:t> können </a:t>
+              <a:t>In einer Bank können </a:t>
             </a:r>
             <a:r>
               <a:rPr lang="de-DE" sz="1800" b="1" i="0" u="none" baseline="0" dirty="0">
@@ -4760,7 +5117,7 @@
               <a:t> eröffnen. Hierzu müssen der </a:t>
             </a:r>
             <a:r>
-              <a:rPr lang="de-DE" sz="1800" b="0" i="0" u="none" baseline="0" dirty="0">
+              <a:rPr lang="de-DE" sz="1800" b="1" i="0" u="none" baseline="0" dirty="0">
                 <a:highlight>
                   <a:srgbClr val="00FF00"/>
                 </a:highlight>
@@ -4775,7 +5132,7 @@
               <a:t> und die </a:t>
             </a:r>
             <a:r>
-              <a:rPr lang="de-DE" sz="1800" b="0" i="0" u="none" baseline="0" dirty="0">
+              <a:rPr lang="de-DE" sz="1800" b="1" i="0" u="none" baseline="0" dirty="0">
                 <a:highlight>
                   <a:srgbClr val="00FF00"/>
                 </a:highlight>
@@ -4787,430 +5144,175 @@
               <a:rPr lang="de-DE" sz="1800" b="0" i="0" u="none" baseline="0" dirty="0">
                 <a:latin typeface="Calibri" panose="020F0502020204030204" pitchFamily="34" charset="0"/>
               </a:rPr>
-              <a:t> hinterlegt werden. Alle </a:t>
-            </a:r>
-            <a:r>
-              <a:rPr lang="de-DE" sz="1800" b="0" i="0" u="none" strike="sngStrike" baseline="0" dirty="0">
-                <a:highlight>
-                  <a:srgbClr val="FFFF00"/>
-                </a:highlight>
-                <a:latin typeface="Calibri" panose="020F0502020204030204" pitchFamily="34" charset="0"/>
-              </a:rPr>
-              <a:t>Konten</a:t>
-            </a:r>
-            <a:r>
-              <a:rPr lang="de-DE" sz="1800" b="0" i="0" u="none" baseline="0" dirty="0">
-                <a:latin typeface="Calibri" panose="020F0502020204030204" pitchFamily="34" charset="0"/>
-              </a:rPr>
-              <a:t> haben einen </a:t>
+              <a:t> hinterlegt werden. Alle Konten haben einen </a:t>
+            </a:r>
+            <a:r>
+              <a:rPr lang="de-DE" sz="1800" b="1" i="0" u="none" baseline="0" dirty="0">
+                <a:highlight>
+                  <a:srgbClr val="00FF00"/>
+                </a:highlight>
+                <a:latin typeface="Calibri" panose="020F0502020204030204" pitchFamily="34" charset="0"/>
+              </a:rPr>
+              <a:t>Saldo</a:t>
+            </a:r>
+            <a:r>
+              <a:rPr lang="de-DE" sz="1800" b="0" i="0" u="none" baseline="0" dirty="0">
+                <a:latin typeface="Calibri" panose="020F0502020204030204" pitchFamily="34" charset="0"/>
+              </a:rPr>
+              <a:t>, welcher angibt, was für ein Wert sich aktuell auf dem Konto befindet. </a:t>
+            </a:r>
+            <a:r>
+              <a:rPr lang="de-DE" sz="1800" b="1" i="0" u="none" baseline="0" dirty="0">
+                <a:highlight>
+                  <a:srgbClr val="FFFF00"/>
+                </a:highlight>
+                <a:latin typeface="Calibri" panose="020F0502020204030204" pitchFamily="34" charset="0"/>
+              </a:rPr>
+              <a:t>Girokonten</a:t>
+            </a:r>
+            <a:r>
+              <a:rPr lang="de-DE" sz="1800" b="0" i="0" u="none" baseline="0" dirty="0">
+                <a:latin typeface="Calibri" panose="020F0502020204030204" pitchFamily="34" charset="0"/>
+              </a:rPr>
+              <a:t> sind die ganz normalen Konten, sie werden durch eine eindeutige </a:t>
+            </a:r>
+            <a:r>
+              <a:rPr lang="de-DE" sz="1800" b="1" i="0" u="none" baseline="0" dirty="0">
+                <a:highlight>
+                  <a:srgbClr val="00FF00"/>
+                </a:highlight>
+                <a:latin typeface="Calibri" panose="020F0502020204030204" pitchFamily="34" charset="0"/>
+              </a:rPr>
+              <a:t>IBAN</a:t>
+            </a:r>
+            <a:r>
+              <a:rPr lang="de-DE" sz="1800" b="0" i="0" u="none" baseline="0" dirty="0">
+                <a:latin typeface="Calibri" panose="020F0502020204030204" pitchFamily="34" charset="0"/>
+              </a:rPr>
+              <a:t> identifiziert. Zudem gibt es </a:t>
+            </a:r>
+            <a:r>
+              <a:rPr lang="de-DE" sz="1800" b="1" i="0" u="none" baseline="0" dirty="0">
+                <a:highlight>
+                  <a:srgbClr val="FFFF00"/>
+                </a:highlight>
+                <a:latin typeface="Calibri" panose="020F0502020204030204" pitchFamily="34" charset="0"/>
+              </a:rPr>
+              <a:t>Depotkonten</a:t>
+            </a:r>
+            <a:r>
+              <a:rPr lang="de-DE" sz="1800" b="0" i="0" u="none" baseline="0" dirty="0">
+                <a:latin typeface="Calibri" panose="020F0502020204030204" pitchFamily="34" charset="0"/>
+              </a:rPr>
+              <a:t>, in dem die von den Kunden gekauften </a:t>
+            </a:r>
+            <a:r>
+              <a:rPr lang="de-DE" sz="1800" b="1" i="0" u="none" baseline="0" dirty="0">
+                <a:highlight>
+                  <a:srgbClr val="FFFF00"/>
+                </a:highlight>
+                <a:latin typeface="Calibri" panose="020F0502020204030204" pitchFamily="34" charset="0"/>
+              </a:rPr>
+              <a:t>Aktien</a:t>
+            </a:r>
+            <a:r>
+              <a:rPr lang="de-DE" sz="1800" b="0" i="0" u="none" baseline="0" dirty="0">
+                <a:latin typeface="Calibri" panose="020F0502020204030204" pitchFamily="34" charset="0"/>
+              </a:rPr>
+              <a:t> abgelegt werden. Der Kunde kann sich eine Auflistung der verschiedenen </a:t>
             </a:r>
             <a:r>
               <a:rPr lang="de-DE" sz="1800" i="0" u="none" baseline="0" dirty="0">
+                <a:latin typeface="Calibri" panose="020F0502020204030204" pitchFamily="34" charset="0"/>
+              </a:rPr>
+              <a:t>Posten</a:t>
+            </a:r>
+            <a:r>
+              <a:rPr lang="de-DE" sz="1800" b="0" i="0" u="none" baseline="0" dirty="0">
+                <a:latin typeface="Calibri" panose="020F0502020204030204" pitchFamily="34" charset="0"/>
+              </a:rPr>
+              <a:t> in seinen </a:t>
+            </a:r>
+            <a:r>
+              <a:rPr lang="de-DE" sz="1800" i="0" u="none" baseline="0" dirty="0">
+                <a:latin typeface="Calibri" panose="020F0502020204030204" pitchFamily="34" charset="0"/>
+              </a:rPr>
+              <a:t>Depots</a:t>
+            </a:r>
+            <a:r>
+              <a:rPr lang="de-DE" sz="1800" b="0" i="0" u="none" baseline="0" dirty="0">
+                <a:latin typeface="Calibri" panose="020F0502020204030204" pitchFamily="34" charset="0"/>
+              </a:rPr>
+              <a:t> anzeigen lassen. Wichtig ist, dass zur Deckung von </a:t>
+            </a:r>
+            <a:r>
+              <a:rPr lang="de-DE" sz="1800" i="0" u="none" baseline="0" dirty="0">
+                <a:latin typeface="Calibri" panose="020F0502020204030204" pitchFamily="34" charset="0"/>
+              </a:rPr>
+              <a:t>Käufen</a:t>
+            </a:r>
+            <a:r>
+              <a:rPr lang="de-DE" sz="1800" b="0" i="0" u="none" baseline="0" dirty="0">
+                <a:latin typeface="Calibri" panose="020F0502020204030204" pitchFamily="34" charset="0"/>
+              </a:rPr>
+              <a:t> und zur Ausschüttung bei </a:t>
+            </a:r>
+            <a:r>
+              <a:rPr lang="de-DE" sz="1800" i="0" u="none" baseline="0" dirty="0">
+                <a:latin typeface="Calibri" panose="020F0502020204030204" pitchFamily="34" charset="0"/>
+              </a:rPr>
+              <a:t>Verkäufen</a:t>
+            </a:r>
+            <a:r>
+              <a:rPr lang="de-DE" sz="1800" b="0" i="0" u="none" baseline="0" dirty="0">
+                <a:latin typeface="Calibri" panose="020F0502020204030204" pitchFamily="34" charset="0"/>
+              </a:rPr>
+              <a:t> oder </a:t>
+            </a:r>
+            <a:r>
+              <a:rPr lang="de-DE" sz="1800" i="0" baseline="0" dirty="0">
+                <a:latin typeface="Calibri" panose="020F0502020204030204" pitchFamily="34" charset="0"/>
+              </a:rPr>
+              <a:t>Dividendenzahlungen</a:t>
+            </a:r>
+            <a:r>
+              <a:rPr lang="de-DE" sz="1800" b="0" i="0" u="none" baseline="0" dirty="0">
+                <a:latin typeface="Calibri" panose="020F0502020204030204" pitchFamily="34" charset="0"/>
+              </a:rPr>
+              <a:t> immer ein </a:t>
+            </a:r>
+            <a:r>
+              <a:rPr lang="de-DE" sz="1800" b="1" i="0" u="none" baseline="0" dirty="0">
+                <a:highlight>
+                  <a:srgbClr val="FFFF00"/>
+                </a:highlight>
+                <a:latin typeface="Calibri" panose="020F0502020204030204" pitchFamily="34" charset="0"/>
+              </a:rPr>
+              <a:t>Referenzkonto</a:t>
+            </a:r>
+            <a:r>
+              <a:rPr lang="de-DE" sz="1800" b="0" i="0" u="none" baseline="0" dirty="0">
+                <a:latin typeface="Calibri" panose="020F0502020204030204" pitchFamily="34" charset="0"/>
+              </a:rPr>
+              <a:t> angegeben werden muss. Zur Berechnung des Saldos eines Depots werden immer die </a:t>
+            </a:r>
+            <a:r>
+              <a:rPr lang="de-DE" sz="1800" b="1" i="0" u="none" baseline="0" dirty="0">
                 <a:highlight>
                   <a:srgbClr val="00FF00"/>
                 </a:highlight>
                 <a:latin typeface="Calibri" panose="020F0502020204030204" pitchFamily="34" charset="0"/>
               </a:rPr>
-              <a:t>Saldo</a:t>
-            </a:r>
-            <a:r>
-              <a:rPr lang="de-DE" sz="1800" b="0" i="0" u="none" baseline="0" dirty="0">
-                <a:latin typeface="Calibri" panose="020F0502020204030204" pitchFamily="34" charset="0"/>
-              </a:rPr>
-              <a:t>, welcher angibt, was für ein </a:t>
-            </a:r>
-            <a:r>
-              <a:rPr lang="de-DE" sz="1800" b="0" i="0" u="none" strike="sngStrike" baseline="0" dirty="0">
-                <a:solidFill>
-                  <a:srgbClr val="00B0F0"/>
-                </a:solidFill>
-                <a:highlight>
-                  <a:srgbClr val="FFFF00"/>
-                </a:highlight>
-                <a:latin typeface="Calibri" panose="020F0502020204030204" pitchFamily="34" charset="0"/>
-              </a:rPr>
-              <a:t>Wert</a:t>
-            </a:r>
-            <a:r>
-              <a:rPr lang="de-DE" sz="1800" b="0" i="0" u="none" baseline="0" dirty="0">
-                <a:latin typeface="Calibri" panose="020F0502020204030204" pitchFamily="34" charset="0"/>
-              </a:rPr>
-              <a:t> sich aktuell auf dem </a:t>
-            </a:r>
-            <a:r>
-              <a:rPr lang="de-DE" sz="1800" b="0" i="0" u="none" strike="sngStrike" baseline="0" dirty="0">
-                <a:highlight>
-                  <a:srgbClr val="FFFF00"/>
-                </a:highlight>
-                <a:latin typeface="Calibri" panose="020F0502020204030204" pitchFamily="34" charset="0"/>
-              </a:rPr>
-              <a:t>Konto</a:t>
-            </a:r>
-            <a:r>
-              <a:rPr lang="de-DE" sz="1800" b="0" i="0" u="none" baseline="0" dirty="0">
-                <a:latin typeface="Calibri" panose="020F0502020204030204" pitchFamily="34" charset="0"/>
-              </a:rPr>
-              <a:t> befindet. </a:t>
+              <a:t>Tageskurse</a:t>
+            </a:r>
+            <a:r>
+              <a:rPr lang="de-DE" sz="1800" b="0" i="0" u="none" baseline="0" dirty="0">
+                <a:latin typeface="Calibri" panose="020F0502020204030204" pitchFamily="34" charset="0"/>
+              </a:rPr>
+              <a:t> der Aktien verwendet. Aktien werden durch die sogenannte </a:t>
             </a:r>
             <a:r>
               <a:rPr lang="de-DE" sz="1800" b="1" i="0" u="none" baseline="0" dirty="0">
-                <a:highlight>
-                  <a:srgbClr val="FFFF00"/>
-                </a:highlight>
-                <a:latin typeface="Calibri" panose="020F0502020204030204" pitchFamily="34" charset="0"/>
-              </a:rPr>
-              <a:t>Girokonten</a:t>
-            </a:r>
-            <a:r>
-              <a:rPr lang="de-DE" sz="1800" b="0" i="0" u="none" baseline="0" dirty="0">
-                <a:latin typeface="Calibri" panose="020F0502020204030204" pitchFamily="34" charset="0"/>
-              </a:rPr>
-              <a:t> sind die ganz normalen </a:t>
-            </a:r>
-            <a:r>
-              <a:rPr lang="de-DE" sz="1800" b="0" i="0" u="none" strike="sngStrike" baseline="0" dirty="0">
-                <a:highlight>
-                  <a:srgbClr val="FFFF00"/>
-                </a:highlight>
-                <a:latin typeface="Calibri" panose="020F0502020204030204" pitchFamily="34" charset="0"/>
-              </a:rPr>
-              <a:t>Konten</a:t>
-            </a:r>
-            <a:r>
-              <a:rPr lang="de-DE" sz="1800" b="0" i="0" u="none" baseline="0" dirty="0">
-                <a:latin typeface="Calibri" panose="020F0502020204030204" pitchFamily="34" charset="0"/>
-              </a:rPr>
-              <a:t>, sie werden durch eine eindeutige </a:t>
-            </a:r>
-            <a:r>
-              <a:rPr lang="de-DE" sz="1800" b="0" i="0" u="none" baseline="0" dirty="0">
-                <a:highlight>
-                  <a:srgbClr val="00FF00"/>
-                </a:highlight>
-                <a:latin typeface="Calibri" panose="020F0502020204030204" pitchFamily="34" charset="0"/>
-              </a:rPr>
-              <a:t>IBAN</a:t>
-            </a:r>
-            <a:r>
-              <a:rPr lang="de-DE" sz="1800" b="0" i="0" u="none" baseline="0" dirty="0">
-                <a:latin typeface="Calibri" panose="020F0502020204030204" pitchFamily="34" charset="0"/>
-              </a:rPr>
-              <a:t> identifiziert. Zudem gibt es </a:t>
-            </a:r>
-            <a:r>
-              <a:rPr lang="de-DE" sz="1800" b="1" i="0" u="none" baseline="0" dirty="0">
-                <a:highlight>
-                  <a:srgbClr val="FFFF00"/>
-                </a:highlight>
-                <a:latin typeface="Calibri" panose="020F0502020204030204" pitchFamily="34" charset="0"/>
-              </a:rPr>
-              <a:t>Depotkonten</a:t>
-            </a:r>
-            <a:r>
-              <a:rPr lang="de-DE" sz="1800" b="0" i="0" u="none" baseline="0" dirty="0">
-                <a:latin typeface="Calibri" panose="020F0502020204030204" pitchFamily="34" charset="0"/>
-              </a:rPr>
-              <a:t>, in dem die von den </a:t>
-            </a:r>
-            <a:r>
-              <a:rPr lang="de-DE" sz="1800" b="0" i="0" u="none" strike="sngStrike" baseline="0" dirty="0">
-                <a:highlight>
-                  <a:srgbClr val="FFFF00"/>
-                </a:highlight>
-                <a:latin typeface="Calibri" panose="020F0502020204030204" pitchFamily="34" charset="0"/>
-              </a:rPr>
-              <a:t>Kunden</a:t>
-            </a:r>
-            <a:r>
-              <a:rPr lang="de-DE" sz="1800" b="0" i="0" u="none" baseline="0" dirty="0">
-                <a:latin typeface="Calibri" panose="020F0502020204030204" pitchFamily="34" charset="0"/>
-              </a:rPr>
-              <a:t> gekauften </a:t>
-            </a:r>
-            <a:r>
-              <a:rPr lang="de-DE" sz="1800" b="1" i="0" u="none" baseline="0" dirty="0">
-                <a:highlight>
-                  <a:srgbClr val="FFFF00"/>
-                </a:highlight>
-                <a:latin typeface="Calibri" panose="020F0502020204030204" pitchFamily="34" charset="0"/>
-              </a:rPr>
-              <a:t>Aktien</a:t>
-            </a:r>
-            <a:r>
-              <a:rPr lang="de-DE" sz="1800" b="0" i="0" u="none" baseline="0" dirty="0">
-                <a:latin typeface="Calibri" panose="020F0502020204030204" pitchFamily="34" charset="0"/>
-              </a:rPr>
-              <a:t> abgelegt werden. Der </a:t>
-            </a:r>
-            <a:r>
-              <a:rPr lang="de-DE" sz="1800" b="0" i="0" u="none" strike="sngStrike" baseline="0" dirty="0">
-                <a:highlight>
-                  <a:srgbClr val="FFFF00"/>
-                </a:highlight>
-                <a:latin typeface="Calibri" panose="020F0502020204030204" pitchFamily="34" charset="0"/>
-              </a:rPr>
-              <a:t>Kunde</a:t>
-            </a:r>
-            <a:r>
-              <a:rPr lang="de-DE" sz="1800" b="0" i="0" u="none" baseline="0" dirty="0">
-                <a:latin typeface="Calibri" panose="020F0502020204030204" pitchFamily="34" charset="0"/>
-              </a:rPr>
-              <a:t> kann sich eine </a:t>
-            </a:r>
-            <a:r>
-              <a:rPr lang="de-DE" sz="1800" b="0" i="0" u="none" strike="sngStrike" baseline="0" dirty="0">
-                <a:solidFill>
-                  <a:srgbClr val="00B0F0"/>
-                </a:solidFill>
-                <a:highlight>
-                  <a:srgbClr val="FFFF00"/>
-                </a:highlight>
-                <a:latin typeface="Calibri" panose="020F0502020204030204" pitchFamily="34" charset="0"/>
-              </a:rPr>
-              <a:t>Auflistung</a:t>
-            </a:r>
-            <a:r>
-              <a:rPr lang="de-DE" sz="1800" b="0" i="0" u="none" baseline="0" dirty="0">
-                <a:latin typeface="Calibri" panose="020F0502020204030204" pitchFamily="34" charset="0"/>
-              </a:rPr>
-              <a:t> der verschiedenen </a:t>
-            </a:r>
-            <a:r>
-              <a:rPr lang="de-DE" sz="1800" i="0" u="none" strike="sngStrike" baseline="0" dirty="0">
-                <a:solidFill>
-                  <a:srgbClr val="00B0F0"/>
-                </a:solidFill>
-                <a:highlight>
-                  <a:srgbClr val="FFFF00"/>
-                </a:highlight>
-                <a:latin typeface="Calibri" panose="020F0502020204030204" pitchFamily="34" charset="0"/>
-              </a:rPr>
-              <a:t>Posten</a:t>
-            </a:r>
-            <a:r>
-              <a:rPr lang="de-DE" sz="1800" b="0" i="0" u="none" baseline="0" dirty="0">
-                <a:latin typeface="Calibri" panose="020F0502020204030204" pitchFamily="34" charset="0"/>
-              </a:rPr>
-              <a:t> in seinen </a:t>
-            </a:r>
-            <a:r>
-              <a:rPr lang="de-DE" sz="1800" i="0" u="none" strike="sngStrike" baseline="0" dirty="0">
-                <a:solidFill>
-                  <a:srgbClr val="00B0F0"/>
-                </a:solidFill>
-                <a:highlight>
-                  <a:srgbClr val="FFFF00"/>
-                </a:highlight>
-                <a:latin typeface="Calibri" panose="020F0502020204030204" pitchFamily="34" charset="0"/>
-              </a:rPr>
-              <a:t>Depots</a:t>
-            </a:r>
-            <a:r>
-              <a:rPr lang="de-DE" sz="1800" b="0" i="0" u="none" baseline="0" dirty="0">
-                <a:latin typeface="Calibri" panose="020F0502020204030204" pitchFamily="34" charset="0"/>
-              </a:rPr>
-              <a:t> anzeigen lassen. Wichtig ist, dass zur </a:t>
-            </a:r>
-            <a:r>
-              <a:rPr lang="de-DE" sz="1800" b="0" i="0" u="none" strike="sngStrike" baseline="0" dirty="0">
-                <a:solidFill>
-                  <a:srgbClr val="00B0F0"/>
-                </a:solidFill>
-                <a:highlight>
-                  <a:srgbClr val="FFFF00"/>
-                </a:highlight>
-                <a:latin typeface="Calibri" panose="020F0502020204030204" pitchFamily="34" charset="0"/>
-              </a:rPr>
-              <a:t>Deckung</a:t>
-            </a:r>
-            <a:r>
-              <a:rPr lang="de-DE" sz="1800" b="0" i="0" u="none" baseline="0" dirty="0">
-                <a:latin typeface="Calibri" panose="020F0502020204030204" pitchFamily="34" charset="0"/>
-              </a:rPr>
-              <a:t> von </a:t>
-            </a:r>
-            <a:r>
-              <a:rPr lang="de-DE" sz="1800" i="0" u="none" strike="sngStrike" baseline="0" dirty="0">
-                <a:solidFill>
-                  <a:srgbClr val="00B0F0"/>
-                </a:solidFill>
-                <a:highlight>
-                  <a:srgbClr val="FFFF00"/>
-                </a:highlight>
-                <a:latin typeface="Calibri" panose="020F0502020204030204" pitchFamily="34" charset="0"/>
-              </a:rPr>
-              <a:t>Käufen</a:t>
-            </a:r>
-            <a:r>
-              <a:rPr lang="de-DE" sz="1800" b="0" i="0" u="none" baseline="0" dirty="0">
-                <a:latin typeface="Calibri" panose="020F0502020204030204" pitchFamily="34" charset="0"/>
-              </a:rPr>
-              <a:t> und zur </a:t>
-            </a:r>
-            <a:r>
-              <a:rPr lang="de-DE" sz="1800" b="0" i="0" u="none" strike="sngStrike" baseline="0" dirty="0">
-                <a:solidFill>
-                  <a:srgbClr val="00B0F0"/>
-                </a:solidFill>
-                <a:highlight>
-                  <a:srgbClr val="FFFF00"/>
-                </a:highlight>
-                <a:latin typeface="Calibri" panose="020F0502020204030204" pitchFamily="34" charset="0"/>
-              </a:rPr>
-              <a:t>Ausschüttung</a:t>
-            </a:r>
-            <a:r>
-              <a:rPr lang="de-DE" sz="1800" b="0" i="0" u="none" baseline="0" dirty="0">
-                <a:latin typeface="Calibri" panose="020F0502020204030204" pitchFamily="34" charset="0"/>
-              </a:rPr>
-              <a:t> bei </a:t>
-            </a:r>
-            <a:r>
-              <a:rPr lang="de-DE" sz="1800" i="0" u="none" strike="sngStrike" baseline="0" dirty="0">
-                <a:solidFill>
-                  <a:srgbClr val="00B0F0"/>
-                </a:solidFill>
-                <a:highlight>
-                  <a:srgbClr val="FFFF00"/>
-                </a:highlight>
-                <a:latin typeface="Calibri" panose="020F0502020204030204" pitchFamily="34" charset="0"/>
-              </a:rPr>
-              <a:t>Verkäufen</a:t>
-            </a:r>
-            <a:r>
-              <a:rPr lang="de-DE" sz="1800" b="0" i="0" u="none" baseline="0" dirty="0">
-                <a:latin typeface="Calibri" panose="020F0502020204030204" pitchFamily="34" charset="0"/>
-              </a:rPr>
-              <a:t> oder </a:t>
-            </a:r>
-            <a:r>
-              <a:rPr lang="de-DE" sz="1800" i="0" strike="sngStrike" baseline="0" dirty="0">
-                <a:solidFill>
-                  <a:srgbClr val="00B0F0"/>
-                </a:solidFill>
-                <a:highlight>
-                  <a:srgbClr val="FFFF00"/>
-                </a:highlight>
-                <a:latin typeface="Calibri" panose="020F0502020204030204" pitchFamily="34" charset="0"/>
-              </a:rPr>
-              <a:t>Dividendenzahlungen</a:t>
-            </a:r>
-            <a:r>
-              <a:rPr lang="de-DE" sz="1800" b="0" i="0" u="none" baseline="0" dirty="0">
-                <a:latin typeface="Calibri" panose="020F0502020204030204" pitchFamily="34" charset="0"/>
-              </a:rPr>
-              <a:t> immer ein </a:t>
-            </a:r>
-            <a:r>
-              <a:rPr lang="de-DE" sz="1800" b="1" i="0" u="none" baseline="0" dirty="0">
-                <a:highlight>
-                  <a:srgbClr val="FFFF00"/>
-                </a:highlight>
-                <a:latin typeface="Calibri" panose="020F0502020204030204" pitchFamily="34" charset="0"/>
-              </a:rPr>
-              <a:t>Referenzkonto</a:t>
-            </a:r>
-            <a:r>
-              <a:rPr lang="de-DE" sz="1800" b="0" i="0" u="none" baseline="0" dirty="0">
-                <a:latin typeface="Calibri" panose="020F0502020204030204" pitchFamily="34" charset="0"/>
-              </a:rPr>
-              <a:t> angegeben werden muss. Zur </a:t>
-            </a:r>
-            <a:r>
-              <a:rPr lang="de-DE" sz="1800" b="0" i="0" u="none" strike="sngStrike" baseline="0" dirty="0">
-                <a:solidFill>
-                  <a:srgbClr val="00B0F0"/>
-                </a:solidFill>
-                <a:highlight>
-                  <a:srgbClr val="FFFF00"/>
-                </a:highlight>
-                <a:latin typeface="Calibri" panose="020F0502020204030204" pitchFamily="34" charset="0"/>
-              </a:rPr>
-              <a:t>Berechnung</a:t>
-            </a:r>
-            <a:r>
-              <a:rPr lang="de-DE" sz="1800" b="0" i="0" u="none" baseline="0" dirty="0">
-                <a:latin typeface="Calibri" panose="020F0502020204030204" pitchFamily="34" charset="0"/>
-              </a:rPr>
-              <a:t> des </a:t>
-            </a:r>
-            <a:r>
-              <a:rPr lang="de-DE" sz="1800" b="0" i="0" u="none" strike="sngStrike" baseline="0" dirty="0">
-                <a:highlight>
-                  <a:srgbClr val="FFFF00"/>
-                </a:highlight>
-                <a:latin typeface="Calibri" panose="020F0502020204030204" pitchFamily="34" charset="0"/>
-              </a:rPr>
-              <a:t>Saldos</a:t>
-            </a:r>
-            <a:r>
-              <a:rPr lang="de-DE" sz="1800" b="0" i="0" u="none" baseline="0" dirty="0">
-                <a:latin typeface="Calibri" panose="020F0502020204030204" pitchFamily="34" charset="0"/>
-              </a:rPr>
-              <a:t> eines </a:t>
-            </a:r>
-            <a:r>
-              <a:rPr lang="de-DE" sz="1800" b="0" i="0" u="none" strike="sngStrike" baseline="0" dirty="0">
-                <a:highlight>
-                  <a:srgbClr val="FFFF00"/>
-                </a:highlight>
-                <a:latin typeface="Calibri" panose="020F0502020204030204" pitchFamily="34" charset="0"/>
-              </a:rPr>
-              <a:t>Depots</a:t>
-            </a:r>
-            <a:r>
-              <a:rPr lang="de-DE" sz="1800" b="0" i="0" u="none" baseline="0" dirty="0">
-                <a:latin typeface="Calibri" panose="020F0502020204030204" pitchFamily="34" charset="0"/>
-              </a:rPr>
-              <a:t> werden immer die </a:t>
-            </a:r>
-            <a:r>
-              <a:rPr lang="de-DE" sz="1800" b="0" i="0" u="none" baseline="0" dirty="0">
-                <a:highlight>
-                  <a:srgbClr val="00FF00"/>
-                </a:highlight>
-                <a:latin typeface="Calibri" panose="020F0502020204030204" pitchFamily="34" charset="0"/>
-              </a:rPr>
-              <a:t>Tageskurse</a:t>
-            </a:r>
-            <a:r>
-              <a:rPr lang="de-DE" sz="1800" b="0" i="0" u="none" baseline="0" dirty="0">
-                <a:latin typeface="Calibri" panose="020F0502020204030204" pitchFamily="34" charset="0"/>
-              </a:rPr>
-              <a:t> der </a:t>
-            </a:r>
-            <a:r>
-              <a:rPr lang="de-DE" sz="1800" b="0" i="0" u="none" strike="sngStrike" baseline="0" dirty="0">
-                <a:highlight>
-                  <a:srgbClr val="FFFF00"/>
-                </a:highlight>
-                <a:latin typeface="Calibri" panose="020F0502020204030204" pitchFamily="34" charset="0"/>
-              </a:rPr>
-              <a:t>Aktien</a:t>
-            </a:r>
-            <a:r>
-              <a:rPr lang="de-DE" sz="1800" b="0" i="0" u="none" baseline="0" dirty="0">
-                <a:latin typeface="Calibri" panose="020F0502020204030204" pitchFamily="34" charset="0"/>
-              </a:rPr>
-              <a:t> verwendet. </a:t>
-            </a:r>
-            <a:r>
-              <a:rPr lang="de-DE" sz="1800" b="0" i="0" u="none" strike="sngStrike" baseline="0" dirty="0">
-                <a:highlight>
-                  <a:srgbClr val="FFFF00"/>
-                </a:highlight>
-                <a:latin typeface="Calibri" panose="020F0502020204030204" pitchFamily="34" charset="0"/>
-              </a:rPr>
-              <a:t>Aktien</a:t>
-            </a:r>
-            <a:r>
-              <a:rPr lang="de-DE" sz="1800" b="0" i="0" u="none" baseline="0" dirty="0">
-                <a:latin typeface="Calibri" panose="020F0502020204030204" pitchFamily="34" charset="0"/>
-              </a:rPr>
-              <a:t> werden durch die sogenannte </a:t>
-            </a:r>
-            <a:r>
-              <a:rPr lang="de-DE" sz="1800" b="0" i="0" u="none" baseline="0" dirty="0">
                 <a:highlight>
                   <a:srgbClr val="00FF00"/>
                 </a:highlight>
@@ -5255,6 +5357,58 @@
                 <a:latin typeface="Calibri" panose="020F0502020204030204" pitchFamily="34" charset="0"/>
               </a:rPr>
               <a:t>Bank (G2)</a:t>
+            </a:r>
+            <a:br>
+              <a:rPr lang="de-DE" sz="2400" b="0" i="0" u="none" strike="noStrike" baseline="0" dirty="0">
+                <a:solidFill>
+                  <a:srgbClr val="4471C4"/>
+                </a:solidFill>
+                <a:latin typeface="Calibri" panose="020F0502020204030204" pitchFamily="34" charset="0"/>
+              </a:rPr>
+            </a:br>
+            <a:r>
+              <a:rPr lang="de-DE" sz="1400" i="0" u="none" strike="noStrike" baseline="0" dirty="0">
+                <a:highlight>
+                  <a:srgbClr val="FFFF00"/>
+                </a:highlight>
+                <a:latin typeface="Calibri" panose="020F0502020204030204" pitchFamily="34" charset="0"/>
+              </a:rPr>
+              <a:t>Gelb</a:t>
+            </a:r>
+            <a:r>
+              <a:rPr lang="de-DE" sz="1400" b="0" i="0" u="none" strike="noStrike" baseline="0" dirty="0">
+                <a:solidFill>
+                  <a:srgbClr val="4471C4"/>
+                </a:solidFill>
+                <a:latin typeface="Calibri" panose="020F0502020204030204" pitchFamily="34" charset="0"/>
+              </a:rPr>
+              <a:t> </a:t>
+            </a:r>
+            <a:r>
+              <a:rPr lang="de-DE" sz="1400" b="0" i="0" u="none" strike="noStrike" baseline="0" dirty="0">
+                <a:latin typeface="Calibri" panose="020F0502020204030204" pitchFamily="34" charset="0"/>
+              </a:rPr>
+              <a:t>= Klassen</a:t>
+            </a:r>
+            <a:br>
+              <a:rPr lang="de-DE" sz="1400" b="0" i="0" u="none" strike="noStrike" baseline="0" dirty="0">
+                <a:latin typeface="Calibri" panose="020F0502020204030204" pitchFamily="34" charset="0"/>
+              </a:rPr>
+            </a:br>
+            <a:r>
+              <a:rPr lang="de-DE" sz="1400" i="0" u="none" strike="noStrike" baseline="0" dirty="0">
+                <a:highlight>
+                  <a:srgbClr val="00FF00"/>
+                </a:highlight>
+                <a:latin typeface="Calibri" panose="020F0502020204030204" pitchFamily="34" charset="0"/>
+              </a:rPr>
+              <a:t>Grün</a:t>
+            </a:r>
+            <a:r>
+              <a:rPr lang="de-DE" sz="1400" b="0" i="0" u="none" strike="noStrike" baseline="0" dirty="0">
+                <a:latin typeface="Calibri" panose="020F0502020204030204" pitchFamily="34" charset="0"/>
+              </a:rPr>
+              <a:t> = Attributen</a:t>
             </a:r>
             <a:endParaRPr lang="de-DE" dirty="0"/>
           </a:p>
@@ -5725,7 +5879,12 @@
             <p:ph type="title"/>
           </p:nvPr>
         </p:nvSpPr>
-        <p:spPr/>
+        <p:spPr>
+          <a:xfrm>
+            <a:off x="508005" y="769268"/>
+            <a:ext cx="8822972" cy="792088"/>
+          </a:xfrm>
+        </p:spPr>
         <p:txBody>
           <a:bodyPr/>
           <a:lstStyle/>
@@ -5753,9 +5912,6 @@
             </a:br>
             <a:r>
               <a:rPr lang="de-DE" sz="2400" b="0" i="0" u="none" strike="noStrike" baseline="0" dirty="0">
-                <a:solidFill>
-                  <a:srgbClr val="4471C4"/>
-                </a:solidFill>
                 <a:latin typeface="Calibri" panose="020F0502020204030204" pitchFamily="34" charset="0"/>
               </a:rPr>
               <a:t>Markierung der Verben</a:t>
@@ -6172,7 +6328,12 @@
             <p:ph type="title"/>
           </p:nvPr>
         </p:nvSpPr>
-        <p:spPr/>
+        <p:spPr>
+          <a:xfrm>
+            <a:off x="508005" y="769268"/>
+            <a:ext cx="8822972" cy="792088"/>
+          </a:xfrm>
+        </p:spPr>
         <p:txBody>
           <a:bodyPr/>
           <a:lstStyle/>
@@ -6200,12 +6361,9 @@
             </a:br>
             <a:r>
               <a:rPr lang="de-DE" sz="2400" b="0" i="0" u="none" strike="noStrike" baseline="0" dirty="0">
-                <a:solidFill>
-                  <a:srgbClr val="4471C4"/>
-                </a:solidFill>
-                <a:latin typeface="Calibri" panose="020F0502020204030204" pitchFamily="34" charset="0"/>
-              </a:rPr>
-              <a:t>Entfernen der Verben</a:t>
+                <a:latin typeface="Calibri" panose="020F0502020204030204" pitchFamily="34" charset="0"/>
+              </a:rPr>
+              <a:t>Durchstrichen der Verben</a:t>
             </a:r>
             <a:endParaRPr lang="de-DE" dirty="0"/>
           </a:p>

</xml_diff>

<commit_message>
updated epics and user stories
</commit_message>
<xml_diff>
--- a/Vorlage_Praesentation_2022_Subgroup_2_4_OOA.pptx
+++ b/Vorlage_Praesentation_2022_Subgroup_2_4_OOA.pptx
@@ -23,9 +23,9 @@
     <p:sldId id="287" r:id="rId11"/>
     <p:sldId id="273" r:id="rId12"/>
     <p:sldId id="283" r:id="rId13"/>
-    <p:sldId id="284" r:id="rId14"/>
-    <p:sldId id="285" r:id="rId15"/>
-    <p:sldId id="286" r:id="rId16"/>
+    <p:sldId id="288" r:id="rId14"/>
+    <p:sldId id="289" r:id="rId15"/>
+    <p:sldId id="290" r:id="rId16"/>
   </p:sldIdLst>
   <p:sldSz cx="10160000" cy="5715000"/>
   <p:notesSz cx="6858000" cy="9144000"/>
@@ -486,7 +486,7 @@
                 <a:latin typeface="Arial" panose="020B0604020202020204" pitchFamily="34" charset="0"/>
                 <a:cs typeface="Arial" panose="020B0604020202020204" pitchFamily="34" charset="0"/>
               </a:rPr>
-              <a:t>11.12.2022</a:t>
+              <a:t>12.12.2022</a:t>
             </a:fld>
             <a:endParaRPr lang="de-DE">
               <a:latin typeface="Arial" panose="020B0604020202020204" pitchFamily="34" charset="0"/>
@@ -670,7 +670,7 @@
             <a:fld id="{5801EACB-8D12-49F2-9088-5A635C50DDBD}" type="datetimeFigureOut">
               <a:rPr lang="de-DE" smtClean="0"/>
               <a:pPr/>
-              <a:t>11.12.2022</a:t>
+              <a:t>12.12.2022</a:t>
             </a:fld>
             <a:endParaRPr lang="de-DE"/>
           </a:p>
@@ -1188,7 +1188,7 @@
             <a:fld id="{911D8C60-1F2D-4436-BF53-22882F494404}" type="datetimeFigureOut">
               <a:rPr lang="de-DE" smtClean="0"/>
               <a:pPr/>
-              <a:t>11.12.2022</a:t>
+              <a:t>12.12.2022</a:t>
             </a:fld>
             <a:endParaRPr lang="de-DE" dirty="0"/>
           </a:p>
@@ -2830,69 +2830,238 @@
           <a:chExt cx="0" cy="0"/>
         </a:xfrm>
       </p:grpSpPr>
-      <p:sp>
-        <p:nvSpPr>
-          <p:cNvPr id="5" name="Inhaltsplatzhalter 4"/>
-          <p:cNvSpPr>
-            <a:spLocks noGrp="1"/>
-          </p:cNvSpPr>
+      <p:graphicFrame>
+        <p:nvGraphicFramePr>
+          <p:cNvPr id="6" name="Table 6">
+            <a:extLst>
+              <a:ext uri="{FF2B5EF4-FFF2-40B4-BE49-F238E27FC236}">
+                <a16:creationId xmlns:a16="http://schemas.microsoft.com/office/drawing/2014/main" id="{47AC6000-F17D-96EB-AB36-F5338868A084}"/>
+              </a:ext>
+            </a:extLst>
+          </p:cNvPr>
+          <p:cNvGraphicFramePr>
+            <a:graphicFrameLocks noGrp="1"/>
+          </p:cNvGraphicFramePr>
           <p:nvPr>
             <p:ph idx="1"/>
+            <p:extLst>
+              <p:ext uri="{D42A27DB-BD31-4B8C-83A1-F6EECF244321}">
+                <p14:modId xmlns:p14="http://schemas.microsoft.com/office/powerpoint/2010/main" val="3517367164"/>
+              </p:ext>
+            </p:extLst>
           </p:nvPr>
-        </p:nvSpPr>
-        <p:spPr/>
-        <p:txBody>
-          <a:bodyPr anchor="t"/>
-          <a:lstStyle/>
-          <a:p>
-            <a:pPr marL="457200" indent="-457200">
-              <a:buFont typeface="+mj-lt"/>
-              <a:buAutoNum type="arabicPeriod"/>
-            </a:pPr>
-            <a:r>
-              <a:rPr lang="de-DE" b="1" dirty="0"/>
-              <a:t>Als Kunde möchte ich einen Girokonto eröffnen können, um mein Geld in der Bank aufzubewahren.</a:t>
-            </a:r>
-          </a:p>
-          <a:p>
-            <a:pPr marL="596164" lvl="2" indent="0">
-              <a:buNone/>
-            </a:pPr>
-            <a:r>
-              <a:rPr lang="de-DE" u="sng" dirty="0"/>
-              <a:t>Akzeptanzkriterien:</a:t>
-            </a:r>
-          </a:p>
-          <a:p>
-            <a:pPr lvl="2"/>
-            <a:r>
-              <a:rPr lang="de-DE" dirty="0"/>
-              <a:t>Der Kunde kann seine Name und Adresse eingeben.</a:t>
-            </a:r>
-          </a:p>
-          <a:p>
-            <a:pPr lvl="2"/>
-            <a:r>
-              <a:rPr lang="de-DE" dirty="0"/>
-              <a:t>Der Kunde kann seine Identität mit einem gültigem Ausweis überprüfen.</a:t>
-            </a:r>
-          </a:p>
-          <a:p>
-            <a:pPr lvl="2"/>
-            <a:r>
-              <a:rPr lang="de-DE" dirty="0"/>
-              <a:t>Der Kunde kann eine Summe Geld für den Anfangssaldo eingeben.</a:t>
-            </a:r>
-          </a:p>
-          <a:p>
-            <a:pPr lvl="2"/>
-            <a:r>
-              <a:rPr lang="de-DE" dirty="0"/>
-              <a:t>Wenn die Girokontoeröffnung erfolgreich ist, werden die IBAN, der Anfangssaldo und die PIN dem Kunden angezeigt.</a:t>
-            </a:r>
-          </a:p>
-        </p:txBody>
-      </p:sp>
+        </p:nvGraphicFramePr>
+        <p:xfrm>
+          <a:off x="668514" y="1849388"/>
+          <a:ext cx="8659958" cy="3211448"/>
+        </p:xfrm>
+        <a:graphic>
+          <a:graphicData uri="http://schemas.openxmlformats.org/drawingml/2006/table">
+            <a:tbl>
+              <a:tblPr firstRow="1" bandRow="1">
+                <a:effectLst/>
+                <a:tableStyleId>{5C22544A-7EE6-4342-B048-85BDC9FD1C3A}</a:tableStyleId>
+              </a:tblPr>
+              <a:tblGrid>
+                <a:gridCol w="728465">
+                  <a:extLst>
+                    <a:ext uri="{9D8B030D-6E8A-4147-A177-3AD203B41FA5}">
+                      <a16:colId xmlns:a16="http://schemas.microsoft.com/office/drawing/2014/main" val="2436141691"/>
+                    </a:ext>
+                  </a:extLst>
+                </a:gridCol>
+                <a:gridCol w="7931493">
+                  <a:extLst>
+                    <a:ext uri="{9D8B030D-6E8A-4147-A177-3AD203B41FA5}">
+                      <a16:colId xmlns:a16="http://schemas.microsoft.com/office/drawing/2014/main" val="1387012222"/>
+                    </a:ext>
+                  </a:extLst>
+                </a:gridCol>
+              </a:tblGrid>
+              <a:tr h="3211448">
+                <a:tc>
+                  <a:txBody>
+                    <a:bodyPr/>
+                    <a:lstStyle/>
+                    <a:p>
+                      <a:r>
+                        <a:rPr lang="de-DE" sz="1800" dirty="0">
+                          <a:solidFill>
+                            <a:srgbClr val="00B050"/>
+                          </a:solidFill>
+                        </a:rPr>
+                        <a:t>US1</a:t>
+                      </a:r>
+                      <a:endParaRPr lang="en-ID" dirty="0">
+                        <a:solidFill>
+                          <a:srgbClr val="00B050"/>
+                        </a:solidFill>
+                      </a:endParaRPr>
+                    </a:p>
+                  </a:txBody>
+                  <a:tcPr>
+                    <a:lnL w="12700" cmpd="sng">
+                      <a:noFill/>
+                    </a:lnL>
+                    <a:lnR w="12700" cmpd="sng">
+                      <a:noFill/>
+                    </a:lnR>
+                    <a:lnT w="12700" cmpd="sng">
+                      <a:noFill/>
+                    </a:lnT>
+                    <a:lnB w="38100" cmpd="sng">
+                      <a:noFill/>
+                    </a:lnB>
+                    <a:lnTlToBr w="12700" cmpd="sng">
+                      <a:noFill/>
+                      <a:prstDash val="solid"/>
+                    </a:lnTlToBr>
+                    <a:lnBlToTr w="12700" cmpd="sng">
+                      <a:noFill/>
+                      <a:prstDash val="solid"/>
+                    </a:lnBlToTr>
+                    <a:noFill/>
+                  </a:tcPr>
+                </a:tc>
+                <a:tc>
+                  <a:txBody>
+                    <a:bodyPr/>
+                    <a:lstStyle/>
+                    <a:p>
+                      <a:pPr marL="0" indent="0">
+                        <a:buNone/>
+                      </a:pPr>
+                      <a:r>
+                        <a:rPr lang="de-DE" sz="1800" b="1" dirty="0">
+                          <a:solidFill>
+                            <a:schemeClr val="tx1"/>
+                          </a:solidFill>
+                        </a:rPr>
+                        <a:t>Als Kunde möchte ich einen Girokonto eröffnen können, um mein Geld in der Bank aufzubewahren.</a:t>
+                      </a:r>
+                    </a:p>
+                    <a:p>
+                      <a:pPr marL="0" indent="0">
+                        <a:buNone/>
+                      </a:pPr>
+                      <a:endParaRPr lang="de-DE" sz="1800" b="1" dirty="0">
+                        <a:solidFill>
+                          <a:schemeClr val="tx1"/>
+                        </a:solidFill>
+                      </a:endParaRPr>
+                    </a:p>
+                    <a:p>
+                      <a:pPr marL="0" indent="0">
+                        <a:buNone/>
+                      </a:pPr>
+                      <a:r>
+                        <a:rPr lang="de-DE" sz="1800" b="0" u="sng" dirty="0">
+                          <a:solidFill>
+                            <a:schemeClr val="tx1"/>
+                          </a:solidFill>
+                        </a:rPr>
+                        <a:t>Akzeptanzkriterien</a:t>
+                      </a:r>
+                      <a:r>
+                        <a:rPr lang="de-DE" sz="1800" u="sng" dirty="0">
+                          <a:solidFill>
+                            <a:schemeClr val="tx1"/>
+                          </a:solidFill>
+                        </a:rPr>
+                        <a:t>:</a:t>
+                      </a:r>
+                    </a:p>
+                    <a:p>
+                      <a:pPr marL="342900" lvl="0" indent="-342900">
+                        <a:buFont typeface="Arial" panose="020B0604020202020204" pitchFamily="34" charset="0"/>
+                        <a:buChar char="•"/>
+                      </a:pPr>
+                      <a:r>
+                        <a:rPr lang="de-DE" sz="1800" b="0" dirty="0">
+                          <a:solidFill>
+                            <a:schemeClr val="tx1"/>
+                          </a:solidFill>
+                        </a:rPr>
+                        <a:t>Der Kunde kann seine Name und Adresse eingeben.</a:t>
+                      </a:r>
+                    </a:p>
+                    <a:p>
+                      <a:pPr marL="342900" lvl="0" indent="-342900">
+                        <a:buFont typeface="Arial" panose="020B0604020202020204" pitchFamily="34" charset="0"/>
+                        <a:buChar char="•"/>
+                      </a:pPr>
+                      <a:r>
+                        <a:rPr lang="de-DE" sz="1800" b="0" dirty="0">
+                          <a:solidFill>
+                            <a:schemeClr val="tx1"/>
+                          </a:solidFill>
+                        </a:rPr>
+                        <a:t>Der Kunde kann seine Identität mit einem gültigem Ausweis überprüfen.</a:t>
+                      </a:r>
+                    </a:p>
+                    <a:p>
+                      <a:pPr marL="342900" lvl="0" indent="-342900">
+                        <a:buFont typeface="Arial" panose="020B0604020202020204" pitchFamily="34" charset="0"/>
+                        <a:buChar char="•"/>
+                      </a:pPr>
+                      <a:r>
+                        <a:rPr lang="de-DE" sz="1800" b="0" dirty="0">
+                          <a:solidFill>
+                            <a:schemeClr val="tx1"/>
+                          </a:solidFill>
+                        </a:rPr>
+                        <a:t>Der Kunde kann eine Summe Geld für den Anfangssaldo eingeben.</a:t>
+                      </a:r>
+                    </a:p>
+                    <a:p>
+                      <a:pPr marL="342900" lvl="0" indent="-342900">
+                        <a:buFont typeface="Arial" panose="020B0604020202020204" pitchFamily="34" charset="0"/>
+                        <a:buChar char="•"/>
+                      </a:pPr>
+                      <a:r>
+                        <a:rPr lang="de-DE" sz="1800" b="0" dirty="0">
+                          <a:solidFill>
+                            <a:schemeClr val="tx1"/>
+                          </a:solidFill>
+                        </a:rPr>
+                        <a:t>Wenn die Girokontoeröffnung erfolgreich ist, werden die IBAN, der Anfangssaldo und die PIN dem Kunden angezeigt.</a:t>
+                      </a:r>
+                    </a:p>
+                  </a:txBody>
+                  <a:tcPr>
+                    <a:lnL w="12700" cmpd="sng">
+                      <a:noFill/>
+                    </a:lnL>
+                    <a:lnR w="12700" cmpd="sng">
+                      <a:noFill/>
+                    </a:lnR>
+                    <a:lnT w="12700" cmpd="sng">
+                      <a:noFill/>
+                    </a:lnT>
+                    <a:lnB w="38100" cmpd="sng">
+                      <a:noFill/>
+                    </a:lnB>
+                    <a:lnTlToBr w="12700" cmpd="sng">
+                      <a:noFill/>
+                      <a:prstDash val="solid"/>
+                    </a:lnTlToBr>
+                    <a:lnBlToTr w="12700" cmpd="sng">
+                      <a:noFill/>
+                      <a:prstDash val="solid"/>
+                    </a:lnBlToTr>
+                    <a:noFill/>
+                  </a:tcPr>
+                </a:tc>
+                <a:extLst>
+                  <a:ext uri="{0D108BD9-81ED-4DB2-BD59-A6C34878D82A}">
+                    <a16:rowId xmlns:a16="http://schemas.microsoft.com/office/drawing/2014/main" val="372212394"/>
+                  </a:ext>
+                </a:extLst>
+              </a:tr>
+            </a:tbl>
+          </a:graphicData>
+        </a:graphic>
+      </p:graphicFrame>
       <p:sp>
         <p:nvSpPr>
           <p:cNvPr id="4" name="Titel 3"/>
@@ -2903,7 +3072,12 @@
             <p:ph type="title"/>
           </p:nvPr>
         </p:nvSpPr>
-        <p:spPr/>
+        <p:spPr>
+          <a:xfrm>
+            <a:off x="668514" y="841276"/>
+            <a:ext cx="8822972" cy="1008112"/>
+          </a:xfrm>
+        </p:spPr>
         <p:txBody>
           <a:bodyPr/>
           <a:lstStyle/>
@@ -2912,7 +3086,14 @@
               <a:rPr lang="de-DE" dirty="0"/>
               <a:t>Epic 1: Konto eröffnen</a:t>
             </a:r>
-            <a:endParaRPr lang="de-DE" sz="1400" dirty="0">
+            <a:br>
+              <a:rPr lang="de-DE" dirty="0"/>
+            </a:br>
+            <a:r>
+              <a:rPr lang="de-DE" sz="1600" b="0" dirty="0"/>
+              <a:t>Das System muss dem Kunden die Möglichkeit geben, eine Konto bei der Bank eröffnen zu können.</a:t>
+            </a:r>
+            <a:endParaRPr lang="de-DE" sz="1400" b="0" dirty="0">
               <a:solidFill>
                 <a:srgbClr val="00B050"/>
               </a:solidFill>
@@ -2950,69 +3131,233 @@
           <a:chExt cx="0" cy="0"/>
         </a:xfrm>
       </p:grpSpPr>
-      <p:sp>
-        <p:nvSpPr>
-          <p:cNvPr id="5" name="Inhaltsplatzhalter 4"/>
-          <p:cNvSpPr>
-            <a:spLocks noGrp="1"/>
-          </p:cNvSpPr>
+      <p:graphicFrame>
+        <p:nvGraphicFramePr>
+          <p:cNvPr id="6" name="Table 6">
+            <a:extLst>
+              <a:ext uri="{FF2B5EF4-FFF2-40B4-BE49-F238E27FC236}">
+                <a16:creationId xmlns:a16="http://schemas.microsoft.com/office/drawing/2014/main" id="{47AC6000-F17D-96EB-AB36-F5338868A084}"/>
+              </a:ext>
+            </a:extLst>
+          </p:cNvPr>
+          <p:cNvGraphicFramePr>
+            <a:graphicFrameLocks noGrp="1"/>
+          </p:cNvGraphicFramePr>
           <p:nvPr>
             <p:ph idx="1"/>
+            <p:extLst>
+              <p:ext uri="{D42A27DB-BD31-4B8C-83A1-F6EECF244321}">
+                <p14:modId xmlns:p14="http://schemas.microsoft.com/office/powerpoint/2010/main" val="1881432493"/>
+              </p:ext>
+            </p:extLst>
           </p:nvPr>
-        </p:nvSpPr>
-        <p:spPr/>
-        <p:txBody>
-          <a:bodyPr anchor="t"/>
-          <a:lstStyle/>
-          <a:p>
-            <a:pPr marL="457200" indent="-457200">
-              <a:buFont typeface="+mj-lt"/>
-              <a:buAutoNum type="arabicPeriod" startAt="2"/>
-            </a:pPr>
-            <a:r>
-              <a:rPr lang="de-DE" b="1" dirty="0"/>
-              <a:t>Als Kunde möchte ich einen Depotkonto eröffnen können, um mein Aktien hinterlegen zu können.</a:t>
-            </a:r>
-          </a:p>
-          <a:p>
-            <a:pPr marL="596164" lvl="2" indent="0">
-              <a:buNone/>
-            </a:pPr>
-            <a:r>
-              <a:rPr lang="de-DE" u="sng" dirty="0"/>
-              <a:t>Akzeptanzkriterien:</a:t>
-            </a:r>
-          </a:p>
-          <a:p>
-            <a:pPr lvl="2"/>
-            <a:r>
-              <a:rPr lang="de-DE" dirty="0"/>
-              <a:t>Der Kunde kann seine Name und Adresse eingeben.</a:t>
-            </a:r>
-          </a:p>
-          <a:p>
-            <a:pPr lvl="2"/>
-            <a:r>
-              <a:rPr lang="de-DE" dirty="0"/>
-              <a:t>Der Kunde kann seine Identität mit einem gültigem Ausweis verifizieren.</a:t>
-            </a:r>
-          </a:p>
-          <a:p>
-            <a:pPr lvl="2"/>
-            <a:r>
-              <a:rPr lang="de-DE" dirty="0"/>
-              <a:t>Der Kunde kann eine Referenzkonto mit dem neuen Depotkonto verbinden.</a:t>
-            </a:r>
-          </a:p>
-          <a:p>
-            <a:pPr lvl="2"/>
-            <a:r>
-              <a:rPr lang="de-DE" dirty="0"/>
-              <a:t>Wenn die Depotkontoeröffnung erfolgreich ist, werden die Kontonummer, der Saldo und die PIN dem Kunden gegeben.</a:t>
-            </a:r>
-          </a:p>
-        </p:txBody>
-      </p:sp>
+        </p:nvGraphicFramePr>
+        <p:xfrm>
+          <a:off x="668514" y="1849388"/>
+          <a:ext cx="8659958" cy="3027228"/>
+        </p:xfrm>
+        <a:graphic>
+          <a:graphicData uri="http://schemas.openxmlformats.org/drawingml/2006/table">
+            <a:tbl>
+              <a:tblPr firstRow="1" bandRow="1">
+                <a:effectLst/>
+                <a:tableStyleId>{5C22544A-7EE6-4342-B048-85BDC9FD1C3A}</a:tableStyleId>
+              </a:tblPr>
+              <a:tblGrid>
+                <a:gridCol w="728465">
+                  <a:extLst>
+                    <a:ext uri="{9D8B030D-6E8A-4147-A177-3AD203B41FA5}">
+                      <a16:colId xmlns:a16="http://schemas.microsoft.com/office/drawing/2014/main" val="2436141691"/>
+                    </a:ext>
+                  </a:extLst>
+                </a:gridCol>
+                <a:gridCol w="7931493">
+                  <a:extLst>
+                    <a:ext uri="{9D8B030D-6E8A-4147-A177-3AD203B41FA5}">
+                      <a16:colId xmlns:a16="http://schemas.microsoft.com/office/drawing/2014/main" val="1387012222"/>
+                    </a:ext>
+                  </a:extLst>
+                </a:gridCol>
+              </a:tblGrid>
+              <a:tr h="3027228">
+                <a:tc>
+                  <a:txBody>
+                    <a:bodyPr/>
+                    <a:lstStyle/>
+                    <a:p>
+                      <a:r>
+                        <a:rPr lang="de-DE" sz="1800" dirty="0">
+                          <a:solidFill>
+                            <a:srgbClr val="00B050"/>
+                          </a:solidFill>
+                        </a:rPr>
+                        <a:t>US2</a:t>
+                      </a:r>
+                      <a:endParaRPr lang="en-ID" dirty="0">
+                        <a:solidFill>
+                          <a:srgbClr val="00B050"/>
+                        </a:solidFill>
+                      </a:endParaRPr>
+                    </a:p>
+                  </a:txBody>
+                  <a:tcPr>
+                    <a:lnL w="12700" cmpd="sng">
+                      <a:noFill/>
+                    </a:lnL>
+                    <a:lnR w="12700" cmpd="sng">
+                      <a:noFill/>
+                    </a:lnR>
+                    <a:lnT w="12700" cmpd="sng">
+                      <a:noFill/>
+                    </a:lnT>
+                    <a:lnB w="38100" cmpd="sng">
+                      <a:noFill/>
+                    </a:lnB>
+                    <a:lnTlToBr w="12700" cmpd="sng">
+                      <a:noFill/>
+                      <a:prstDash val="solid"/>
+                    </a:lnTlToBr>
+                    <a:lnBlToTr w="12700" cmpd="sng">
+                      <a:noFill/>
+                      <a:prstDash val="solid"/>
+                    </a:lnBlToTr>
+                    <a:noFill/>
+                  </a:tcPr>
+                </a:tc>
+                <a:tc>
+                  <a:txBody>
+                    <a:bodyPr/>
+                    <a:lstStyle/>
+                    <a:p>
+                      <a:pPr marL="0" indent="0">
+                        <a:buFont typeface="+mj-lt"/>
+                        <a:buNone/>
+                      </a:pPr>
+                      <a:r>
+                        <a:rPr lang="de-DE" sz="1800" b="1" dirty="0">
+                          <a:solidFill>
+                            <a:schemeClr val="tx1"/>
+                          </a:solidFill>
+                        </a:rPr>
+                        <a:t>Als Kunde möchte ich einen Depotkonto eröffnen können, um mein Aktien hinterlegen zu können.</a:t>
+                      </a:r>
+                    </a:p>
+                    <a:p>
+                      <a:pPr marL="0" indent="0">
+                        <a:buFont typeface="+mj-lt"/>
+                        <a:buNone/>
+                      </a:pPr>
+                      <a:endParaRPr lang="de-DE" sz="1800" b="1" dirty="0">
+                        <a:solidFill>
+                          <a:schemeClr val="tx1"/>
+                        </a:solidFill>
+                      </a:endParaRPr>
+                    </a:p>
+                    <a:p>
+                      <a:pPr marL="0" indent="0">
+                        <a:buFont typeface="+mj-lt"/>
+                        <a:buNone/>
+                      </a:pPr>
+                      <a:r>
+                        <a:rPr lang="de-DE" sz="1800" b="0" u="sng" dirty="0">
+                          <a:solidFill>
+                            <a:schemeClr val="tx1"/>
+                          </a:solidFill>
+                        </a:rPr>
+                        <a:t>Akzeptanzkriterien:</a:t>
+                      </a:r>
+                    </a:p>
+                    <a:p>
+                      <a:pPr marL="342900" indent="-342900">
+                        <a:buFont typeface="Arial" panose="020B0604020202020204" pitchFamily="34" charset="0"/>
+                        <a:buChar char="•"/>
+                      </a:pPr>
+                      <a:r>
+                        <a:rPr lang="de-DE" sz="1800" b="0" dirty="0">
+                          <a:solidFill>
+                            <a:schemeClr val="tx1"/>
+                          </a:solidFill>
+                        </a:rPr>
+                        <a:t>Der Kunde kann seine Name und Adresse eingeben.</a:t>
+                      </a:r>
+                    </a:p>
+                    <a:p>
+                      <a:pPr marL="342900" indent="-342900">
+                        <a:buFont typeface="Arial" panose="020B0604020202020204" pitchFamily="34" charset="0"/>
+                        <a:buChar char="•"/>
+                      </a:pPr>
+                      <a:r>
+                        <a:rPr lang="de-DE" sz="1800" b="0" dirty="0">
+                          <a:solidFill>
+                            <a:schemeClr val="tx1"/>
+                          </a:solidFill>
+                        </a:rPr>
+                        <a:t>Der Kunde kann seine Identität mit einem gültigem Ausweis verifizieren.</a:t>
+                      </a:r>
+                    </a:p>
+                    <a:p>
+                      <a:pPr marL="342900" indent="-342900">
+                        <a:buFont typeface="Arial" panose="020B0604020202020204" pitchFamily="34" charset="0"/>
+                        <a:buChar char="•"/>
+                      </a:pPr>
+                      <a:r>
+                        <a:rPr lang="de-DE" sz="1800" b="0" dirty="0">
+                          <a:solidFill>
+                            <a:schemeClr val="tx1"/>
+                          </a:solidFill>
+                        </a:rPr>
+                        <a:t>Der Kunde kann eine Referenzkonto mit dem neuen Depotkonto verbinden.</a:t>
+                      </a:r>
+                    </a:p>
+                    <a:p>
+                      <a:pPr marL="342900" indent="-342900">
+                        <a:buFont typeface="Arial" panose="020B0604020202020204" pitchFamily="34" charset="0"/>
+                        <a:buChar char="•"/>
+                      </a:pPr>
+                      <a:r>
+                        <a:rPr lang="de-DE" sz="1800" b="0" dirty="0">
+                          <a:solidFill>
+                            <a:schemeClr val="tx1"/>
+                          </a:solidFill>
+                        </a:rPr>
+                        <a:t>Wenn die Depotkontoeröffnung erfolgreich ist, werden die Kontonummer, der Saldo und die PIN dem Kunden gegeben.</a:t>
+                      </a:r>
+                    </a:p>
+                  </a:txBody>
+                  <a:tcPr>
+                    <a:lnL w="12700" cmpd="sng">
+                      <a:noFill/>
+                    </a:lnL>
+                    <a:lnR w="12700" cmpd="sng">
+                      <a:noFill/>
+                    </a:lnR>
+                    <a:lnT w="12700" cmpd="sng">
+                      <a:noFill/>
+                    </a:lnT>
+                    <a:lnB w="38100" cmpd="sng">
+                      <a:noFill/>
+                    </a:lnB>
+                    <a:lnTlToBr w="12700" cmpd="sng">
+                      <a:noFill/>
+                      <a:prstDash val="solid"/>
+                    </a:lnTlToBr>
+                    <a:lnBlToTr w="12700" cmpd="sng">
+                      <a:noFill/>
+                      <a:prstDash val="solid"/>
+                    </a:lnBlToTr>
+                    <a:noFill/>
+                  </a:tcPr>
+                </a:tc>
+                <a:extLst>
+                  <a:ext uri="{0D108BD9-81ED-4DB2-BD59-A6C34878D82A}">
+                    <a16:rowId xmlns:a16="http://schemas.microsoft.com/office/drawing/2014/main" val="372212394"/>
+                  </a:ext>
+                </a:extLst>
+              </a:tr>
+            </a:tbl>
+          </a:graphicData>
+        </a:graphic>
+      </p:graphicFrame>
       <p:sp>
         <p:nvSpPr>
           <p:cNvPr id="4" name="Titel 3"/>
@@ -3023,7 +3368,12 @@
             <p:ph type="title"/>
           </p:nvPr>
         </p:nvSpPr>
-        <p:spPr/>
+        <p:spPr>
+          <a:xfrm>
+            <a:off x="668514" y="841276"/>
+            <a:ext cx="8822972" cy="1008112"/>
+          </a:xfrm>
+        </p:spPr>
         <p:txBody>
           <a:bodyPr/>
           <a:lstStyle/>
@@ -3032,7 +3382,14 @@
               <a:rPr lang="de-DE" dirty="0"/>
               <a:t>Epic 1: Konto eröffnen</a:t>
             </a:r>
-            <a:endParaRPr lang="de-DE" sz="1400" dirty="0">
+            <a:br>
+              <a:rPr lang="de-DE" dirty="0"/>
+            </a:br>
+            <a:r>
+              <a:rPr lang="de-DE" sz="1600" b="0" dirty="0"/>
+              <a:t>Das System muss dem Kunden die Möglichkeit geben, eine Konto bei der Bank eröffnen zu können.</a:t>
+            </a:r>
+            <a:endParaRPr lang="de-DE" sz="1400" b="0" dirty="0">
               <a:solidFill>
                 <a:srgbClr val="00B050"/>
               </a:solidFill>
@@ -3043,7 +3400,7 @@
     </p:spTree>
     <p:extLst>
       <p:ext uri="{BB962C8B-B14F-4D97-AF65-F5344CB8AC3E}">
-        <p14:creationId xmlns:p14="http://schemas.microsoft.com/office/powerpoint/2010/main" val="4199853890"/>
+        <p14:creationId xmlns:p14="http://schemas.microsoft.com/office/powerpoint/2010/main" val="2516921258"/>
       </p:ext>
     </p:extLst>
   </p:cSld>
@@ -3070,59 +3427,205 @@
           <a:chExt cx="0" cy="0"/>
         </a:xfrm>
       </p:grpSpPr>
-      <p:sp>
-        <p:nvSpPr>
-          <p:cNvPr id="5" name="Inhaltsplatzhalter 4"/>
-          <p:cNvSpPr>
-            <a:spLocks noGrp="1"/>
-          </p:cNvSpPr>
+      <p:graphicFrame>
+        <p:nvGraphicFramePr>
+          <p:cNvPr id="6" name="Table 6">
+            <a:extLst>
+              <a:ext uri="{FF2B5EF4-FFF2-40B4-BE49-F238E27FC236}">
+                <a16:creationId xmlns:a16="http://schemas.microsoft.com/office/drawing/2014/main" id="{47AC6000-F17D-96EB-AB36-F5338868A084}"/>
+              </a:ext>
+            </a:extLst>
+          </p:cNvPr>
+          <p:cNvGraphicFramePr>
+            <a:graphicFrameLocks noGrp="1"/>
+          </p:cNvGraphicFramePr>
           <p:nvPr>
             <p:ph idx="1"/>
+            <p:extLst>
+              <p:ext uri="{D42A27DB-BD31-4B8C-83A1-F6EECF244321}">
+                <p14:modId xmlns:p14="http://schemas.microsoft.com/office/powerpoint/2010/main" val="575146155"/>
+              </p:ext>
+            </p:extLst>
           </p:nvPr>
-        </p:nvSpPr>
-        <p:spPr/>
-        <p:txBody>
-          <a:bodyPr anchor="t"/>
-          <a:lstStyle/>
-          <a:p>
-            <a:pPr marL="457200" indent="-457200">
-              <a:buFont typeface="+mj-lt"/>
-              <a:buAutoNum type="arabicPeriod"/>
-            </a:pPr>
-            <a:r>
-              <a:rPr lang="de-DE" b="1" dirty="0"/>
-              <a:t>Als Kunde möchte ich die Liste der Posten in meinem Depot ansehen können, um die gesamte Werte meiner Aktien zu überwachen.</a:t>
-            </a:r>
-          </a:p>
-          <a:p>
-            <a:pPr marL="596164" lvl="2" indent="0">
-              <a:buNone/>
-            </a:pPr>
-            <a:r>
-              <a:rPr lang="de-DE" u="sng" dirty="0"/>
-              <a:t>Akzeptanzkriterien:</a:t>
-            </a:r>
-          </a:p>
-          <a:p>
-            <a:pPr lvl="2"/>
-            <a:r>
-              <a:rPr lang="de-DE" dirty="0"/>
-              <a:t>Der Kunde kann seine Kontonummer und PIN eingeben, um die Identität zu verifizieren, falls er noch nicht verifiziert ist.</a:t>
-            </a:r>
-          </a:p>
-          <a:p>
-            <a:pPr lvl="2"/>
-            <a:r>
-              <a:rPr lang="de-DE" dirty="0"/>
-              <a:t>Wenn der Kunde schon verifiziert ist, bekommt er die Liste der Posten in ihrem Depot und die gesamte Saldo des Depots angezeigt.</a:t>
-            </a:r>
-          </a:p>
-          <a:p>
-            <a:pPr lvl="2"/>
-            <a:endParaRPr lang="de-DE" dirty="0"/>
-          </a:p>
-        </p:txBody>
-      </p:sp>
+        </p:nvGraphicFramePr>
+        <p:xfrm>
+          <a:off x="668514" y="1852280"/>
+          <a:ext cx="8659958" cy="2286000"/>
+        </p:xfrm>
+        <a:graphic>
+          <a:graphicData uri="http://schemas.openxmlformats.org/drawingml/2006/table">
+            <a:tbl>
+              <a:tblPr firstRow="1" bandRow="1">
+                <a:effectLst/>
+                <a:tableStyleId>{5C22544A-7EE6-4342-B048-85BDC9FD1C3A}</a:tableStyleId>
+              </a:tblPr>
+              <a:tblGrid>
+                <a:gridCol w="728465">
+                  <a:extLst>
+                    <a:ext uri="{9D8B030D-6E8A-4147-A177-3AD203B41FA5}">
+                      <a16:colId xmlns:a16="http://schemas.microsoft.com/office/drawing/2014/main" val="2436141691"/>
+                    </a:ext>
+                  </a:extLst>
+                </a:gridCol>
+                <a:gridCol w="7931493">
+                  <a:extLst>
+                    <a:ext uri="{9D8B030D-6E8A-4147-A177-3AD203B41FA5}">
+                      <a16:colId xmlns:a16="http://schemas.microsoft.com/office/drawing/2014/main" val="1387012222"/>
+                    </a:ext>
+                  </a:extLst>
+                </a:gridCol>
+              </a:tblGrid>
+              <a:tr h="370840">
+                <a:tc>
+                  <a:txBody>
+                    <a:bodyPr/>
+                    <a:lstStyle/>
+                    <a:p>
+                      <a:r>
+                        <a:rPr lang="de-DE" sz="1800" dirty="0">
+                          <a:solidFill>
+                            <a:srgbClr val="00B050"/>
+                          </a:solidFill>
+                        </a:rPr>
+                        <a:t>US1</a:t>
+                      </a:r>
+                      <a:endParaRPr lang="en-ID" sz="1800" dirty="0">
+                        <a:solidFill>
+                          <a:srgbClr val="00B050"/>
+                        </a:solidFill>
+                      </a:endParaRPr>
+                    </a:p>
+                  </a:txBody>
+                  <a:tcPr>
+                    <a:lnL w="12700" cmpd="sng">
+                      <a:noFill/>
+                    </a:lnL>
+                    <a:lnR w="12700" cmpd="sng">
+                      <a:noFill/>
+                    </a:lnR>
+                    <a:lnT w="12700" cmpd="sng">
+                      <a:noFill/>
+                    </a:lnT>
+                    <a:lnB w="38100" cmpd="sng">
+                      <a:noFill/>
+                    </a:lnB>
+                    <a:lnTlToBr w="12700" cmpd="sng">
+                      <a:noFill/>
+                      <a:prstDash val="solid"/>
+                    </a:lnTlToBr>
+                    <a:lnBlToTr w="12700" cmpd="sng">
+                      <a:noFill/>
+                      <a:prstDash val="solid"/>
+                    </a:lnBlToTr>
+                    <a:noFill/>
+                  </a:tcPr>
+                </a:tc>
+                <a:tc>
+                  <a:txBody>
+                    <a:bodyPr/>
+                    <a:lstStyle/>
+                    <a:p>
+                      <a:pPr marL="0" indent="0">
+                        <a:buFont typeface="+mj-lt"/>
+                        <a:buNone/>
+                      </a:pPr>
+                      <a:r>
+                        <a:rPr lang="de-DE" sz="1800" b="1" dirty="0">
+                          <a:solidFill>
+                            <a:schemeClr val="tx1"/>
+                          </a:solidFill>
+                        </a:rPr>
+                        <a:t>Als Kunde möchte ich die Liste der Posten in meinem Depot ansehen können, um die gesamte Werte meiner Aktien zu überwachen.</a:t>
+                      </a:r>
+                    </a:p>
+                    <a:p>
+                      <a:pPr marL="0" indent="0">
+                        <a:buFont typeface="+mj-lt"/>
+                        <a:buNone/>
+                      </a:pPr>
+                      <a:endParaRPr lang="de-DE" sz="1800" b="1" dirty="0">
+                        <a:solidFill>
+                          <a:schemeClr val="tx1"/>
+                        </a:solidFill>
+                      </a:endParaRPr>
+                    </a:p>
+                    <a:p>
+                      <a:pPr marL="0" indent="0">
+                        <a:buFont typeface="+mj-lt"/>
+                        <a:buNone/>
+                      </a:pPr>
+                      <a:r>
+                        <a:rPr lang="de-DE" sz="1800" b="0" u="sng" dirty="0">
+                          <a:solidFill>
+                            <a:schemeClr val="tx1"/>
+                          </a:solidFill>
+                        </a:rPr>
+                        <a:t>Akzeptanzkriterien:</a:t>
+                      </a:r>
+                    </a:p>
+                    <a:p>
+                      <a:pPr marL="342900" indent="-342900">
+                        <a:buFont typeface="Arial" panose="020B0604020202020204" pitchFamily="34" charset="0"/>
+                        <a:buChar char="•"/>
+                      </a:pPr>
+                      <a:r>
+                        <a:rPr lang="de-DE" sz="1800" b="0" dirty="0">
+                          <a:solidFill>
+                            <a:schemeClr val="tx1"/>
+                          </a:solidFill>
+                        </a:rPr>
+                        <a:t>Der Kunde kann seine Kontonummer und PIN eingeben, um die Identität zu verifizieren, falls er noch nicht verifiziert ist.</a:t>
+                      </a:r>
+                    </a:p>
+                    <a:p>
+                      <a:pPr marL="342900" indent="-342900">
+                        <a:buFont typeface="Arial" panose="020B0604020202020204" pitchFamily="34" charset="0"/>
+                        <a:buChar char="•"/>
+                      </a:pPr>
+                      <a:r>
+                        <a:rPr lang="de-DE" sz="1800" b="0" dirty="0">
+                          <a:solidFill>
+                            <a:schemeClr val="tx1"/>
+                          </a:solidFill>
+                        </a:rPr>
+                        <a:t>Wenn der Kunde schon verifiziert ist, bekommt er die Liste der Posten in ihrem Depot und die gesamte Saldo des Depots angezeigt.</a:t>
+                      </a:r>
+                    </a:p>
+                  </a:txBody>
+                  <a:tcPr>
+                    <a:lnL w="12700" cmpd="sng">
+                      <a:noFill/>
+                    </a:lnL>
+                    <a:lnR w="12700" cmpd="sng">
+                      <a:noFill/>
+                    </a:lnR>
+                    <a:lnT w="12700" cmpd="sng">
+                      <a:noFill/>
+                    </a:lnT>
+                    <a:lnB w="38100" cmpd="sng">
+                      <a:noFill/>
+                    </a:lnB>
+                    <a:lnTlToBr w="12700" cmpd="sng">
+                      <a:noFill/>
+                      <a:prstDash val="solid"/>
+                    </a:lnTlToBr>
+                    <a:lnBlToTr w="12700" cmpd="sng">
+                      <a:noFill/>
+                      <a:prstDash val="solid"/>
+                    </a:lnBlToTr>
+                    <a:noFill/>
+                  </a:tcPr>
+                </a:tc>
+                <a:extLst>
+                  <a:ext uri="{0D108BD9-81ED-4DB2-BD59-A6C34878D82A}">
+                    <a16:rowId xmlns:a16="http://schemas.microsoft.com/office/drawing/2014/main" val="372212394"/>
+                  </a:ext>
+                </a:extLst>
+              </a:tr>
+            </a:tbl>
+          </a:graphicData>
+        </a:graphic>
+      </p:graphicFrame>
       <p:sp>
         <p:nvSpPr>
           <p:cNvPr id="4" name="Titel 3"/>
@@ -3133,7 +3636,12 @@
             <p:ph type="title"/>
           </p:nvPr>
         </p:nvSpPr>
-        <p:spPr/>
+        <p:spPr>
+          <a:xfrm>
+            <a:off x="668514" y="841276"/>
+            <a:ext cx="8822972" cy="1008112"/>
+          </a:xfrm>
+        </p:spPr>
         <p:txBody>
           <a:bodyPr/>
           <a:lstStyle/>
@@ -3142,7 +3650,14 @@
               <a:rPr lang="de-DE" dirty="0"/>
               <a:t>Epic 2: Posten ansehen</a:t>
             </a:r>
-            <a:endParaRPr lang="de-DE" sz="1400" dirty="0">
+            <a:br>
+              <a:rPr lang="de-DE" dirty="0"/>
+            </a:br>
+            <a:r>
+              <a:rPr lang="de-DE" sz="1600" b="0" dirty="0"/>
+              <a:t>Das System muss dem Kunden die Möglichkeit geben, die Posten in seinem Depot ansehen zu können.</a:t>
+            </a:r>
+            <a:endParaRPr lang="de-DE" sz="1400" b="0" dirty="0">
               <a:solidFill>
                 <a:srgbClr val="00B050"/>
               </a:solidFill>
@@ -3153,7 +3668,7 @@
     </p:spTree>
     <p:extLst>
       <p:ext uri="{BB962C8B-B14F-4D97-AF65-F5344CB8AC3E}">
-        <p14:creationId xmlns:p14="http://schemas.microsoft.com/office/powerpoint/2010/main" val="231201351"/>
+        <p14:creationId xmlns:p14="http://schemas.microsoft.com/office/powerpoint/2010/main" val="277067425"/>
       </p:ext>
     </p:extLst>
   </p:cSld>
@@ -3180,55 +3695,221 @@
           <a:chExt cx="0" cy="0"/>
         </a:xfrm>
       </p:grpSpPr>
-      <p:sp>
-        <p:nvSpPr>
-          <p:cNvPr id="5" name="Inhaltsplatzhalter 4"/>
-          <p:cNvSpPr>
-            <a:spLocks noGrp="1"/>
-          </p:cNvSpPr>
+      <p:graphicFrame>
+        <p:nvGraphicFramePr>
+          <p:cNvPr id="6" name="Table 6">
+            <a:extLst>
+              <a:ext uri="{FF2B5EF4-FFF2-40B4-BE49-F238E27FC236}">
+                <a16:creationId xmlns:a16="http://schemas.microsoft.com/office/drawing/2014/main" id="{47AC6000-F17D-96EB-AB36-F5338868A084}"/>
+              </a:ext>
+            </a:extLst>
+          </p:cNvPr>
+          <p:cNvGraphicFramePr>
+            <a:graphicFrameLocks noGrp="1"/>
+          </p:cNvGraphicFramePr>
           <p:nvPr>
             <p:ph idx="1"/>
+            <p:extLst>
+              <p:ext uri="{D42A27DB-BD31-4B8C-83A1-F6EECF244321}">
+                <p14:modId xmlns:p14="http://schemas.microsoft.com/office/powerpoint/2010/main" val="974732989"/>
+              </p:ext>
+            </p:extLst>
           </p:nvPr>
-        </p:nvSpPr>
-        <p:spPr/>
-        <p:txBody>
-          <a:bodyPr anchor="t"/>
-          <a:lstStyle/>
-          <a:p>
-            <a:pPr marL="457200" indent="-457200">
-              <a:buFont typeface="+mj-lt"/>
-              <a:buAutoNum type="arabicPeriod" startAt="2"/>
-            </a:pPr>
-            <a:r>
-              <a:rPr lang="de-DE" b="1" dirty="0"/>
-              <a:t>Als Kunde möchte ich die Details der einzelnen Posten in meinem Depots sehen können, um eine Entscheidung über den Verkauf zu treffen.</a:t>
-            </a:r>
-          </a:p>
-          <a:p>
-            <a:pPr marL="596164" lvl="2" indent="0">
-              <a:buNone/>
-            </a:pPr>
-            <a:r>
-              <a:rPr lang="de-DE" u="sng" dirty="0"/>
-              <a:t>Akzeptanzkriterien:</a:t>
-            </a:r>
-          </a:p>
-          <a:p>
-            <a:pPr lvl="2"/>
-            <a:r>
-              <a:rPr lang="de-DE" dirty="0"/>
-              <a:t>Der Kunde kann seine Kontonummer und PIN eingeben, um die Identität zu verifizieren, falls er noch nicht verifiziert ist.</a:t>
-            </a:r>
-          </a:p>
-          <a:p>
-            <a:pPr lvl="2"/>
-            <a:r>
-              <a:rPr lang="de-DE" dirty="0"/>
-              <a:t>Wenn der Kunde schon verifiziert ist, kann er der Verlauf die Wertpapierkennnummer, der Tageskurse, und andere Details von dem einzelnen Posten ansehen.</a:t>
-            </a:r>
-          </a:p>
-        </p:txBody>
-      </p:sp>
+        </p:nvGraphicFramePr>
+        <p:xfrm>
+          <a:off x="668514" y="1852280"/>
+          <a:ext cx="8659958" cy="2834640"/>
+        </p:xfrm>
+        <a:graphic>
+          <a:graphicData uri="http://schemas.openxmlformats.org/drawingml/2006/table">
+            <a:tbl>
+              <a:tblPr firstRow="1" bandRow="1">
+                <a:effectLst/>
+                <a:tableStyleId>{5C22544A-7EE6-4342-B048-85BDC9FD1C3A}</a:tableStyleId>
+              </a:tblPr>
+              <a:tblGrid>
+                <a:gridCol w="728465">
+                  <a:extLst>
+                    <a:ext uri="{9D8B030D-6E8A-4147-A177-3AD203B41FA5}">
+                      <a16:colId xmlns:a16="http://schemas.microsoft.com/office/drawing/2014/main" val="2436141691"/>
+                    </a:ext>
+                  </a:extLst>
+                </a:gridCol>
+                <a:gridCol w="7931493">
+                  <a:extLst>
+                    <a:ext uri="{9D8B030D-6E8A-4147-A177-3AD203B41FA5}">
+                      <a16:colId xmlns:a16="http://schemas.microsoft.com/office/drawing/2014/main" val="1387012222"/>
+                    </a:ext>
+                  </a:extLst>
+                </a:gridCol>
+              </a:tblGrid>
+              <a:tr h="370840">
+                <a:tc>
+                  <a:txBody>
+                    <a:bodyPr/>
+                    <a:lstStyle/>
+                    <a:p>
+                      <a:r>
+                        <a:rPr lang="de-DE" sz="1800" dirty="0">
+                          <a:solidFill>
+                            <a:srgbClr val="00B050"/>
+                          </a:solidFill>
+                        </a:rPr>
+                        <a:t>US2</a:t>
+                      </a:r>
+                      <a:endParaRPr lang="en-ID" sz="1800" dirty="0">
+                        <a:solidFill>
+                          <a:srgbClr val="00B050"/>
+                        </a:solidFill>
+                      </a:endParaRPr>
+                    </a:p>
+                  </a:txBody>
+                  <a:tcPr>
+                    <a:lnL w="12700" cmpd="sng">
+                      <a:noFill/>
+                    </a:lnL>
+                    <a:lnR w="12700" cmpd="sng">
+                      <a:noFill/>
+                    </a:lnR>
+                    <a:lnT w="12700" cmpd="sng">
+                      <a:noFill/>
+                    </a:lnT>
+                    <a:lnB w="38100" cmpd="sng">
+                      <a:noFill/>
+                    </a:lnB>
+                    <a:lnTlToBr w="12700" cmpd="sng">
+                      <a:noFill/>
+                      <a:prstDash val="solid"/>
+                    </a:lnTlToBr>
+                    <a:lnBlToTr w="12700" cmpd="sng">
+                      <a:noFill/>
+                      <a:prstDash val="solid"/>
+                    </a:lnBlToTr>
+                    <a:noFill/>
+                  </a:tcPr>
+                </a:tc>
+                <a:tc>
+                  <a:txBody>
+                    <a:bodyPr/>
+                    <a:lstStyle/>
+                    <a:p>
+                      <a:pPr marL="0" indent="0">
+                        <a:buFont typeface="+mj-lt"/>
+                        <a:buNone/>
+                      </a:pPr>
+                      <a:r>
+                        <a:rPr lang="de-DE" sz="1800" b="1" dirty="0">
+                          <a:solidFill>
+                            <a:schemeClr val="tx1"/>
+                          </a:solidFill>
+                        </a:rPr>
+                        <a:t>Als Kunde möchte ich die Details der einzelnen Posten in meinem Depots sehen können, um eine Entscheidung über den Verkauf zu treffen.</a:t>
+                      </a:r>
+                    </a:p>
+                    <a:p>
+                      <a:pPr marL="0" indent="0">
+                        <a:buFont typeface="+mj-lt"/>
+                        <a:buNone/>
+                      </a:pPr>
+                      <a:endParaRPr lang="de-DE" sz="1800" b="1" dirty="0">
+                        <a:solidFill>
+                          <a:schemeClr val="tx1"/>
+                        </a:solidFill>
+                      </a:endParaRPr>
+                    </a:p>
+                    <a:p>
+                      <a:pPr marL="0" indent="0">
+                        <a:buFont typeface="+mj-lt"/>
+                        <a:buNone/>
+                      </a:pPr>
+                      <a:r>
+                        <a:rPr lang="de-DE" sz="1800" b="0" u="sng" dirty="0">
+                          <a:solidFill>
+                            <a:schemeClr val="tx1"/>
+                          </a:solidFill>
+                        </a:rPr>
+                        <a:t>Akzeptanzkriterien:</a:t>
+                      </a:r>
+                    </a:p>
+                    <a:p>
+                      <a:pPr marL="342900" indent="-342900">
+                        <a:buFont typeface="Arial" panose="020B0604020202020204" pitchFamily="34" charset="0"/>
+                        <a:buChar char="•"/>
+                      </a:pPr>
+                      <a:r>
+                        <a:rPr lang="de-DE" sz="1800" b="0" dirty="0">
+                          <a:solidFill>
+                            <a:schemeClr val="tx1"/>
+                          </a:solidFill>
+                        </a:rPr>
+                        <a:t>Der Kunde kann seine Kontonummer und PIN eingeben, um die Identität zu verifizieren, falls er noch nicht verifiziert ist.</a:t>
+                      </a:r>
+                    </a:p>
+                    <a:p>
+                      <a:pPr marL="342900" indent="-342900">
+                        <a:buFont typeface="Arial" panose="020B0604020202020204" pitchFamily="34" charset="0"/>
+                        <a:buChar char="•"/>
+                      </a:pPr>
+                      <a:r>
+                        <a:rPr lang="de-DE" sz="1800" b="0" dirty="0">
+                          <a:solidFill>
+                            <a:schemeClr val="tx1"/>
+                          </a:solidFill>
+                        </a:rPr>
+                        <a:t>Wenn der Kunde schon verifiziert ist, kann er die </a:t>
+                      </a:r>
+                      <a:r>
+                        <a:rPr lang="de-DE" sz="1800" b="0" dirty="0" err="1">
+                          <a:solidFill>
+                            <a:schemeClr val="tx1"/>
+                          </a:solidFill>
+                        </a:rPr>
+                        <a:t>Wertpapierkennnumer</a:t>
+                      </a:r>
+                      <a:r>
+                        <a:rPr lang="de-DE" sz="1800" b="0" dirty="0">
+                          <a:solidFill>
+                            <a:schemeClr val="tx1"/>
+                          </a:solidFill>
+                        </a:rPr>
+                        <a:t>, der Verlauf der Tageskurse, und andere Details von dem einzelnen Posten ansehen.</a:t>
+                      </a:r>
+                    </a:p>
+                  </a:txBody>
+                  <a:tcPr>
+                    <a:lnL w="12700" cmpd="sng">
+                      <a:noFill/>
+                    </a:lnL>
+                    <a:lnR w="12700" cmpd="sng">
+                      <a:noFill/>
+                    </a:lnR>
+                    <a:lnT w="12700" cmpd="sng">
+                      <a:noFill/>
+                    </a:lnT>
+                    <a:lnB w="38100" cmpd="sng">
+                      <a:noFill/>
+                    </a:lnB>
+                    <a:lnTlToBr w="12700" cmpd="sng">
+                      <a:noFill/>
+                      <a:prstDash val="solid"/>
+                    </a:lnTlToBr>
+                    <a:lnBlToTr w="12700" cmpd="sng">
+                      <a:noFill/>
+                      <a:prstDash val="solid"/>
+                    </a:lnBlToTr>
+                    <a:noFill/>
+                  </a:tcPr>
+                </a:tc>
+                <a:extLst>
+                  <a:ext uri="{0D108BD9-81ED-4DB2-BD59-A6C34878D82A}">
+                    <a16:rowId xmlns:a16="http://schemas.microsoft.com/office/drawing/2014/main" val="372212394"/>
+                  </a:ext>
+                </a:extLst>
+              </a:tr>
+            </a:tbl>
+          </a:graphicData>
+        </a:graphic>
+      </p:graphicFrame>
       <p:sp>
         <p:nvSpPr>
           <p:cNvPr id="4" name="Titel 3"/>
@@ -3239,7 +3920,12 @@
             <p:ph type="title"/>
           </p:nvPr>
         </p:nvSpPr>
-        <p:spPr/>
+        <p:spPr>
+          <a:xfrm>
+            <a:off x="668514" y="841276"/>
+            <a:ext cx="8822972" cy="1008112"/>
+          </a:xfrm>
+        </p:spPr>
         <p:txBody>
           <a:bodyPr/>
           <a:lstStyle/>
@@ -3248,7 +3934,14 @@
               <a:rPr lang="de-DE" dirty="0"/>
               <a:t>Epic 2: Posten ansehen</a:t>
             </a:r>
-            <a:endParaRPr lang="de-DE" sz="1400" dirty="0">
+            <a:br>
+              <a:rPr lang="de-DE" dirty="0"/>
+            </a:br>
+            <a:r>
+              <a:rPr lang="de-DE" sz="1600" b="0" dirty="0"/>
+              <a:t>Das System muss dem Kunden die Möglichkeit geben, die Posten in seinem Depot ansehen zu können.</a:t>
+            </a:r>
+            <a:endParaRPr lang="de-DE" sz="1400" b="0" dirty="0">
               <a:solidFill>
                 <a:srgbClr val="00B050"/>
               </a:solidFill>
@@ -3259,7 +3952,7 @@
     </p:spTree>
     <p:extLst>
       <p:ext uri="{BB962C8B-B14F-4D97-AF65-F5344CB8AC3E}">
-        <p14:creationId xmlns:p14="http://schemas.microsoft.com/office/powerpoint/2010/main" val="2759166135"/>
+        <p14:creationId xmlns:p14="http://schemas.microsoft.com/office/powerpoint/2010/main" val="1364590552"/>
       </p:ext>
     </p:extLst>
   </p:cSld>

</xml_diff>

<commit_message>
final presentation after feedback
</commit_message>
<xml_diff>
--- a/Vorlage_Praesentation_2022_Subgroup_2_4_OOA.pptx
+++ b/Vorlage_Praesentation_2022_Subgroup_2_4_OOA.pptx
@@ -160,13 +160,168 @@
 <file path=ppt/revisionInfo.xml><?xml version="1.0" encoding="utf-8"?>
 <p1510:revInfo xmlns:a="http://schemas.openxmlformats.org/drawingml/2006/main" xmlns:r="http://schemas.openxmlformats.org/officeDocument/2006/relationships" xmlns:p1510="http://schemas.microsoft.com/office/powerpoint/2015/10/main">
   <p1510:revLst>
-    <p1510:client id="{9A5423AC-A219-4E59-9E7F-D04EF45BABF4}" v="2" dt="2022-12-11T16:16:33.358"/>
+    <p1510:client id="{C0C4BD89-A017-4324-8157-F2A0E82DB339}" v="2" dt="2022-12-13T18:23:17.380"/>
   </p1510:revLst>
 </p1510:revInfo>
 </file>
 
 <file path=ppt/changesInfos/changesInfo1.xml><?xml version="1.0" encoding="utf-8"?>
 <pc:chgInfo xmlns:a="http://schemas.openxmlformats.org/drawingml/2006/main" xmlns:r="http://schemas.openxmlformats.org/officeDocument/2006/relationships" xmlns:ac="http://schemas.microsoft.com/office/drawing/2013/main/command" xmlns:pc="http://schemas.microsoft.com/office/powerpoint/2013/main/command">
+  <pc:docChgLst>
+    <pc:chgData name="Silvia Wen" userId="fa3c34b288dc686c" providerId="LiveId" clId="{9A5423AC-A219-4E59-9E7F-D04EF45BABF4}"/>
+    <pc:docChg chg="custSel modSld">
+      <pc:chgData name="Silvia Wen" userId="fa3c34b288dc686c" providerId="LiveId" clId="{9A5423AC-A219-4E59-9E7F-D04EF45BABF4}" dt="2022-12-11T16:17:23.124" v="17" actId="113"/>
+      <pc:docMkLst>
+        <pc:docMk/>
+      </pc:docMkLst>
+      <pc:sldChg chg="addSp delSp modSp mod">
+        <pc:chgData name="Silvia Wen" userId="fa3c34b288dc686c" providerId="LiveId" clId="{9A5423AC-A219-4E59-9E7F-D04EF45BABF4}" dt="2022-12-11T16:01:20.637" v="10" actId="1076"/>
+        <pc:sldMkLst>
+          <pc:docMk/>
+          <pc:sldMk cId="138220384" sldId="257"/>
+        </pc:sldMkLst>
+        <pc:picChg chg="del">
+          <ac:chgData name="Silvia Wen" userId="fa3c34b288dc686c" providerId="LiveId" clId="{9A5423AC-A219-4E59-9E7F-D04EF45BABF4}" dt="2022-12-11T15:58:30.593" v="5" actId="478"/>
+          <ac:picMkLst>
+            <pc:docMk/>
+            <pc:sldMk cId="138220384" sldId="257"/>
+            <ac:picMk id="3" creationId="{46ABA154-3415-E55B-9279-A591E3A1A454}"/>
+          </ac:picMkLst>
+        </pc:picChg>
+        <pc:picChg chg="add mod">
+          <ac:chgData name="Silvia Wen" userId="fa3c34b288dc686c" providerId="LiveId" clId="{9A5423AC-A219-4E59-9E7F-D04EF45BABF4}" dt="2022-12-11T16:01:20.637" v="10" actId="1076"/>
+          <ac:picMkLst>
+            <pc:docMk/>
+            <pc:sldMk cId="138220384" sldId="257"/>
+            <ac:picMk id="3" creationId="{65A013B5-7489-7E17-611E-AB2DAEC9FF84}"/>
+          </ac:picMkLst>
+        </pc:picChg>
+      </pc:sldChg>
+      <pc:sldChg chg="addSp delSp modSp mod">
+        <pc:chgData name="Silvia Wen" userId="fa3c34b288dc686c" providerId="LiveId" clId="{9A5423AC-A219-4E59-9E7F-D04EF45BABF4}" dt="2022-12-11T16:16:36.257" v="13" actId="1076"/>
+        <pc:sldMkLst>
+          <pc:docMk/>
+          <pc:sldMk cId="3064782011" sldId="273"/>
+        </pc:sldMkLst>
+        <pc:picChg chg="del">
+          <ac:chgData name="Silvia Wen" userId="fa3c34b288dc686c" providerId="LiveId" clId="{9A5423AC-A219-4E59-9E7F-D04EF45BABF4}" dt="2022-12-11T16:00:38.122" v="6" actId="478"/>
+          <ac:picMkLst>
+            <pc:docMk/>
+            <pc:sldMk cId="3064782011" sldId="273"/>
+            <ac:picMk id="3" creationId="{C7C179A8-7397-BBA2-3D2F-D0C7086CB5DD}"/>
+          </ac:picMkLst>
+        </pc:picChg>
+        <pc:picChg chg="add mod">
+          <ac:chgData name="Silvia Wen" userId="fa3c34b288dc686c" providerId="LiveId" clId="{9A5423AC-A219-4E59-9E7F-D04EF45BABF4}" dt="2022-12-11T16:16:36.257" v="13" actId="1076"/>
+          <ac:picMkLst>
+            <pc:docMk/>
+            <pc:sldMk cId="3064782011" sldId="273"/>
+            <ac:picMk id="6" creationId="{49759A96-61D6-79A9-136A-A721A0B6FB53}"/>
+          </ac:picMkLst>
+        </pc:picChg>
+      </pc:sldChg>
+      <pc:sldChg chg="modSp mod">
+        <pc:chgData name="Silvia Wen" userId="fa3c34b288dc686c" providerId="LiveId" clId="{9A5423AC-A219-4E59-9E7F-D04EF45BABF4}" dt="2022-12-11T15:57:37.612" v="1" actId="400"/>
+        <pc:sldMkLst>
+          <pc:docMk/>
+          <pc:sldMk cId="826796080" sldId="280"/>
+        </pc:sldMkLst>
+        <pc:spChg chg="mod">
+          <ac:chgData name="Silvia Wen" userId="fa3c34b288dc686c" providerId="LiveId" clId="{9A5423AC-A219-4E59-9E7F-D04EF45BABF4}" dt="2022-12-11T15:57:37.612" v="1" actId="400"/>
+          <ac:spMkLst>
+            <pc:docMk/>
+            <pc:sldMk cId="826796080" sldId="280"/>
+            <ac:spMk id="5" creationId="{00000000-0000-0000-0000-000000000000}"/>
+          </ac:spMkLst>
+        </pc:spChg>
+      </pc:sldChg>
+      <pc:sldChg chg="modSp mod">
+        <pc:chgData name="Silvia Wen" userId="fa3c34b288dc686c" providerId="LiveId" clId="{9A5423AC-A219-4E59-9E7F-D04EF45BABF4}" dt="2022-12-11T15:57:57.874" v="4" actId="400"/>
+        <pc:sldMkLst>
+          <pc:docMk/>
+          <pc:sldMk cId="784046229" sldId="281"/>
+        </pc:sldMkLst>
+        <pc:spChg chg="mod">
+          <ac:chgData name="Silvia Wen" userId="fa3c34b288dc686c" providerId="LiveId" clId="{9A5423AC-A219-4E59-9E7F-D04EF45BABF4}" dt="2022-12-11T15:57:57.874" v="4" actId="400"/>
+          <ac:spMkLst>
+            <pc:docMk/>
+            <pc:sldMk cId="784046229" sldId="281"/>
+            <ac:spMk id="5" creationId="{00000000-0000-0000-0000-000000000000}"/>
+          </ac:spMkLst>
+        </pc:spChg>
+      </pc:sldChg>
+      <pc:sldChg chg="modSp mod">
+        <pc:chgData name="Silvia Wen" userId="fa3c34b288dc686c" providerId="LiveId" clId="{9A5423AC-A219-4E59-9E7F-D04EF45BABF4}" dt="2022-12-11T16:17:23.124" v="17" actId="113"/>
+        <pc:sldMkLst>
+          <pc:docMk/>
+          <pc:sldMk cId="1449993590" sldId="282"/>
+        </pc:sldMkLst>
+        <pc:spChg chg="mod">
+          <ac:chgData name="Silvia Wen" userId="fa3c34b288dc686c" providerId="LiveId" clId="{9A5423AC-A219-4E59-9E7F-D04EF45BABF4}" dt="2022-12-11T16:17:23.124" v="17" actId="113"/>
+          <ac:spMkLst>
+            <pc:docMk/>
+            <pc:sldMk cId="1449993590" sldId="282"/>
+            <ac:spMk id="5" creationId="{00000000-0000-0000-0000-000000000000}"/>
+          </ac:spMkLst>
+        </pc:spChg>
+      </pc:sldChg>
+    </pc:docChg>
+  </pc:docChgLst>
+  <pc:docChgLst>
+    <pc:chgData name="Silvia Wen" userId="fa3c34b288dc686c" providerId="LiveId" clId="{C0C4BD89-A017-4324-8157-F2A0E82DB339}"/>
+    <pc:docChg chg="custSel modSld">
+      <pc:chgData name="Silvia Wen" userId="fa3c34b288dc686c" providerId="LiveId" clId="{C0C4BD89-A017-4324-8157-F2A0E82DB339}" dt="2022-12-13T18:23:20.527" v="5" actId="1076"/>
+      <pc:docMkLst>
+        <pc:docMk/>
+      </pc:docMkLst>
+      <pc:sldChg chg="addSp delSp modSp mod">
+        <pc:chgData name="Silvia Wen" userId="fa3c34b288dc686c" providerId="LiveId" clId="{C0C4BD89-A017-4324-8157-F2A0E82DB339}" dt="2022-12-13T18:23:04.983" v="2" actId="1076"/>
+        <pc:sldMkLst>
+          <pc:docMk/>
+          <pc:sldMk cId="138220384" sldId="257"/>
+        </pc:sldMkLst>
+        <pc:picChg chg="del">
+          <ac:chgData name="Silvia Wen" userId="fa3c34b288dc686c" providerId="LiveId" clId="{C0C4BD89-A017-4324-8157-F2A0E82DB339}" dt="2022-12-13T18:23:03.527" v="1" actId="478"/>
+          <ac:picMkLst>
+            <pc:docMk/>
+            <pc:sldMk cId="138220384" sldId="257"/>
+            <ac:picMk id="3" creationId="{65A013B5-7489-7E17-611E-AB2DAEC9FF84}"/>
+          </ac:picMkLst>
+        </pc:picChg>
+        <pc:picChg chg="add mod">
+          <ac:chgData name="Silvia Wen" userId="fa3c34b288dc686c" providerId="LiveId" clId="{C0C4BD89-A017-4324-8157-F2A0E82DB339}" dt="2022-12-13T18:23:04.983" v="2" actId="1076"/>
+          <ac:picMkLst>
+            <pc:docMk/>
+            <pc:sldMk cId="138220384" sldId="257"/>
+            <ac:picMk id="6" creationId="{CC85F97A-323F-E40C-12AF-9812C7FA7707}"/>
+          </ac:picMkLst>
+        </pc:picChg>
+      </pc:sldChg>
+      <pc:sldChg chg="addSp delSp modSp mod">
+        <pc:chgData name="Silvia Wen" userId="fa3c34b288dc686c" providerId="LiveId" clId="{C0C4BD89-A017-4324-8157-F2A0E82DB339}" dt="2022-12-13T18:23:20.527" v="5" actId="1076"/>
+        <pc:sldMkLst>
+          <pc:docMk/>
+          <pc:sldMk cId="3064782011" sldId="273"/>
+        </pc:sldMkLst>
+        <pc:picChg chg="add mod">
+          <ac:chgData name="Silvia Wen" userId="fa3c34b288dc686c" providerId="LiveId" clId="{C0C4BD89-A017-4324-8157-F2A0E82DB339}" dt="2022-12-13T18:23:20.527" v="5" actId="1076"/>
+          <ac:picMkLst>
+            <pc:docMk/>
+            <pc:sldMk cId="3064782011" sldId="273"/>
+            <ac:picMk id="3" creationId="{9B71FEF6-8B5C-18DE-0196-D58BD448D785}"/>
+          </ac:picMkLst>
+        </pc:picChg>
+        <pc:picChg chg="del">
+          <ac:chgData name="Silvia Wen" userId="fa3c34b288dc686c" providerId="LiveId" clId="{C0C4BD89-A017-4324-8157-F2A0E82DB339}" dt="2022-12-13T18:23:10.959" v="3" actId="478"/>
+          <ac:picMkLst>
+            <pc:docMk/>
+            <pc:sldMk cId="3064782011" sldId="273"/>
+            <ac:picMk id="6" creationId="{49759A96-61D6-79A9-136A-A721A0B6FB53}"/>
+          </ac:picMkLst>
+        </pc:picChg>
+      </pc:sldChg>
+    </pc:docChg>
+  </pc:docChgLst>
   <pc:docChgLst>
     <pc:chgData name="Silvia Wen" userId="fa3c34b288dc686c" providerId="LiveId" clId="{B0CAD78C-A8C2-4822-8F0B-73EBA05ED240}"/>
     <pc:docChg chg="undo custSel addSld delSld modSld sldOrd">
@@ -295,106 +450,6 @@
       </pc:sldChg>
     </pc:docChg>
   </pc:docChgLst>
-  <pc:docChgLst>
-    <pc:chgData name="Silvia Wen" userId="fa3c34b288dc686c" providerId="LiveId" clId="{9A5423AC-A219-4E59-9E7F-D04EF45BABF4}"/>
-    <pc:docChg chg="custSel modSld">
-      <pc:chgData name="Silvia Wen" userId="fa3c34b288dc686c" providerId="LiveId" clId="{9A5423AC-A219-4E59-9E7F-D04EF45BABF4}" dt="2022-12-11T16:17:23.124" v="17" actId="113"/>
-      <pc:docMkLst>
-        <pc:docMk/>
-      </pc:docMkLst>
-      <pc:sldChg chg="addSp delSp modSp mod">
-        <pc:chgData name="Silvia Wen" userId="fa3c34b288dc686c" providerId="LiveId" clId="{9A5423AC-A219-4E59-9E7F-D04EF45BABF4}" dt="2022-12-11T16:01:20.637" v="10" actId="1076"/>
-        <pc:sldMkLst>
-          <pc:docMk/>
-          <pc:sldMk cId="138220384" sldId="257"/>
-        </pc:sldMkLst>
-        <pc:picChg chg="del">
-          <ac:chgData name="Silvia Wen" userId="fa3c34b288dc686c" providerId="LiveId" clId="{9A5423AC-A219-4E59-9E7F-D04EF45BABF4}" dt="2022-12-11T15:58:30.593" v="5" actId="478"/>
-          <ac:picMkLst>
-            <pc:docMk/>
-            <pc:sldMk cId="138220384" sldId="257"/>
-            <ac:picMk id="3" creationId="{46ABA154-3415-E55B-9279-A591E3A1A454}"/>
-          </ac:picMkLst>
-        </pc:picChg>
-        <pc:picChg chg="add mod">
-          <ac:chgData name="Silvia Wen" userId="fa3c34b288dc686c" providerId="LiveId" clId="{9A5423AC-A219-4E59-9E7F-D04EF45BABF4}" dt="2022-12-11T16:01:20.637" v="10" actId="1076"/>
-          <ac:picMkLst>
-            <pc:docMk/>
-            <pc:sldMk cId="138220384" sldId="257"/>
-            <ac:picMk id="3" creationId="{65A013B5-7489-7E17-611E-AB2DAEC9FF84}"/>
-          </ac:picMkLst>
-        </pc:picChg>
-      </pc:sldChg>
-      <pc:sldChg chg="addSp delSp modSp mod">
-        <pc:chgData name="Silvia Wen" userId="fa3c34b288dc686c" providerId="LiveId" clId="{9A5423AC-A219-4E59-9E7F-D04EF45BABF4}" dt="2022-12-11T16:16:36.257" v="13" actId="1076"/>
-        <pc:sldMkLst>
-          <pc:docMk/>
-          <pc:sldMk cId="3064782011" sldId="273"/>
-        </pc:sldMkLst>
-        <pc:picChg chg="del">
-          <ac:chgData name="Silvia Wen" userId="fa3c34b288dc686c" providerId="LiveId" clId="{9A5423AC-A219-4E59-9E7F-D04EF45BABF4}" dt="2022-12-11T16:00:38.122" v="6" actId="478"/>
-          <ac:picMkLst>
-            <pc:docMk/>
-            <pc:sldMk cId="3064782011" sldId="273"/>
-            <ac:picMk id="3" creationId="{C7C179A8-7397-BBA2-3D2F-D0C7086CB5DD}"/>
-          </ac:picMkLst>
-        </pc:picChg>
-        <pc:picChg chg="add mod">
-          <ac:chgData name="Silvia Wen" userId="fa3c34b288dc686c" providerId="LiveId" clId="{9A5423AC-A219-4E59-9E7F-D04EF45BABF4}" dt="2022-12-11T16:16:36.257" v="13" actId="1076"/>
-          <ac:picMkLst>
-            <pc:docMk/>
-            <pc:sldMk cId="3064782011" sldId="273"/>
-            <ac:picMk id="6" creationId="{49759A96-61D6-79A9-136A-A721A0B6FB53}"/>
-          </ac:picMkLst>
-        </pc:picChg>
-      </pc:sldChg>
-      <pc:sldChg chg="modSp mod">
-        <pc:chgData name="Silvia Wen" userId="fa3c34b288dc686c" providerId="LiveId" clId="{9A5423AC-A219-4E59-9E7F-D04EF45BABF4}" dt="2022-12-11T15:57:37.612" v="1" actId="400"/>
-        <pc:sldMkLst>
-          <pc:docMk/>
-          <pc:sldMk cId="826796080" sldId="280"/>
-        </pc:sldMkLst>
-        <pc:spChg chg="mod">
-          <ac:chgData name="Silvia Wen" userId="fa3c34b288dc686c" providerId="LiveId" clId="{9A5423AC-A219-4E59-9E7F-D04EF45BABF4}" dt="2022-12-11T15:57:37.612" v="1" actId="400"/>
-          <ac:spMkLst>
-            <pc:docMk/>
-            <pc:sldMk cId="826796080" sldId="280"/>
-            <ac:spMk id="5" creationId="{00000000-0000-0000-0000-000000000000}"/>
-          </ac:spMkLst>
-        </pc:spChg>
-      </pc:sldChg>
-      <pc:sldChg chg="modSp mod">
-        <pc:chgData name="Silvia Wen" userId="fa3c34b288dc686c" providerId="LiveId" clId="{9A5423AC-A219-4E59-9E7F-D04EF45BABF4}" dt="2022-12-11T15:57:57.874" v="4" actId="400"/>
-        <pc:sldMkLst>
-          <pc:docMk/>
-          <pc:sldMk cId="784046229" sldId="281"/>
-        </pc:sldMkLst>
-        <pc:spChg chg="mod">
-          <ac:chgData name="Silvia Wen" userId="fa3c34b288dc686c" providerId="LiveId" clId="{9A5423AC-A219-4E59-9E7F-D04EF45BABF4}" dt="2022-12-11T15:57:57.874" v="4" actId="400"/>
-          <ac:spMkLst>
-            <pc:docMk/>
-            <pc:sldMk cId="784046229" sldId="281"/>
-            <ac:spMk id="5" creationId="{00000000-0000-0000-0000-000000000000}"/>
-          </ac:spMkLst>
-        </pc:spChg>
-      </pc:sldChg>
-      <pc:sldChg chg="modSp mod">
-        <pc:chgData name="Silvia Wen" userId="fa3c34b288dc686c" providerId="LiveId" clId="{9A5423AC-A219-4E59-9E7F-D04EF45BABF4}" dt="2022-12-11T16:17:23.124" v="17" actId="113"/>
-        <pc:sldMkLst>
-          <pc:docMk/>
-          <pc:sldMk cId="1449993590" sldId="282"/>
-        </pc:sldMkLst>
-        <pc:spChg chg="mod">
-          <ac:chgData name="Silvia Wen" userId="fa3c34b288dc686c" providerId="LiveId" clId="{9A5423AC-A219-4E59-9E7F-D04EF45BABF4}" dt="2022-12-11T16:17:23.124" v="17" actId="113"/>
-          <ac:spMkLst>
-            <pc:docMk/>
-            <pc:sldMk cId="1449993590" sldId="282"/>
-            <ac:spMk id="5" creationId="{00000000-0000-0000-0000-000000000000}"/>
-          </ac:spMkLst>
-        </pc:spChg>
-      </pc:sldChg>
-    </pc:docChg>
-  </pc:docChgLst>
 </pc:chgInfo>
 </file>
 
@@ -486,7 +541,7 @@
                 <a:latin typeface="Arial" panose="020B0604020202020204" pitchFamily="34" charset="0"/>
                 <a:cs typeface="Arial" panose="020B0604020202020204" pitchFamily="34" charset="0"/>
               </a:rPr>
-              <a:t>12.12.2022</a:t>
+              <a:t>13.12.2022</a:t>
             </a:fld>
             <a:endParaRPr lang="de-DE">
               <a:latin typeface="Arial" panose="020B0604020202020204" pitchFamily="34" charset="0"/>
@@ -561,7 +616,7 @@
                 <a:latin typeface="Arial" panose="020B0604020202020204" pitchFamily="34" charset="0"/>
                 <a:cs typeface="Arial" panose="020B0604020202020204" pitchFamily="34" charset="0"/>
               </a:rPr>
-              <a:t>‹#›</a:t>
+              <a:t>‹Nr.›</a:t>
             </a:fld>
             <a:endParaRPr lang="de-DE">
               <a:latin typeface="Arial" panose="020B0604020202020204" pitchFamily="34" charset="0"/>
@@ -670,7 +725,7 @@
             <a:fld id="{5801EACB-8D12-49F2-9088-5A635C50DDBD}" type="datetimeFigureOut">
               <a:rPr lang="de-DE" smtClean="0"/>
               <a:pPr/>
-              <a:t>12.12.2022</a:t>
+              <a:t>13.12.2022</a:t>
             </a:fld>
             <a:endParaRPr lang="de-DE"/>
           </a:p>
@@ -835,7 +890,7 @@
             <a:fld id="{272E3E51-A3F3-4FD4-9C75-1C612CCCCA5A}" type="slidenum">
               <a:rPr lang="de-DE" smtClean="0"/>
               <a:pPr/>
-              <a:t>‹#›</a:t>
+              <a:t>‹Nr.›</a:t>
             </a:fld>
             <a:endParaRPr lang="de-DE"/>
           </a:p>
@@ -1188,7 +1243,7 @@
             <a:fld id="{911D8C60-1F2D-4436-BF53-22882F494404}" type="datetimeFigureOut">
               <a:rPr lang="de-DE" smtClean="0"/>
               <a:pPr/>
-              <a:t>12.12.2022</a:t>
+              <a:t>13.12.2022</a:t>
             </a:fld>
             <a:endParaRPr lang="de-DE" dirty="0"/>
           </a:p>
@@ -1255,7 +1310,7 @@
             <a:fld id="{83B23FF1-3F66-4904-91CE-1AE4A5050627}" type="slidenum">
               <a:rPr lang="de-DE" smtClean="0"/>
               <a:pPr/>
-              <a:t>‹#›</a:t>
+              <a:t>‹Nr.›</a:t>
             </a:fld>
             <a:endParaRPr lang="de-DE" dirty="0"/>
           </a:p>
@@ -1797,7 +1852,7 @@
                   <a:spcPct val="50000"/>
                 </a:spcBef>
               </a:pPr>
-              <a:t>‹#›</a:t>
+              <a:t>‹Nr.›</a:t>
             </a:fld>
             <a:endParaRPr lang="de-DE" altLang="de-DE" sz="1111" dirty="0">
               <a:solidFill>
@@ -2766,10 +2821,10 @@
       </p:sp>
       <p:pic>
         <p:nvPicPr>
-          <p:cNvPr id="6" name="Grafik 5">
+          <p:cNvPr id="3" name="Grafik 2">
             <a:extLst>
               <a:ext uri="{FF2B5EF4-FFF2-40B4-BE49-F238E27FC236}">
-                <a16:creationId xmlns:a16="http://schemas.microsoft.com/office/drawing/2014/main" id="{49759A96-61D6-79A9-136A-A721A0B6FB53}"/>
+                <a16:creationId xmlns:a16="http://schemas.microsoft.com/office/drawing/2014/main" id="{9B71FEF6-8B5C-18DE-0196-D58BD448D785}"/>
               </a:ext>
             </a:extLst>
           </p:cNvPr>
@@ -2792,7 +2847,7 @@
         </p:blipFill>
         <p:spPr>
           <a:xfrm>
-            <a:off x="1691899" y="1176546"/>
+            <a:off x="1676908" y="1176546"/>
             <a:ext cx="6485166" cy="4090751"/>
           </a:xfrm>
           <a:prstGeom prst="rect">
@@ -6190,10 +6245,10 @@
       </p:sp>
       <p:pic>
         <p:nvPicPr>
-          <p:cNvPr id="3" name="Grafik 2">
+          <p:cNvPr id="6" name="Grafik 5">
             <a:extLst>
               <a:ext uri="{FF2B5EF4-FFF2-40B4-BE49-F238E27FC236}">
-                <a16:creationId xmlns:a16="http://schemas.microsoft.com/office/drawing/2014/main" id="{65A013B5-7489-7E17-611E-AB2DAEC9FF84}"/>
+                <a16:creationId xmlns:a16="http://schemas.microsoft.com/office/drawing/2014/main" id="{CC85F97A-323F-E40C-12AF-9812C7FA7707}"/>
               </a:ext>
             </a:extLst>
           </p:cNvPr>
@@ -6216,8 +6271,8 @@
         </p:blipFill>
         <p:spPr>
           <a:xfrm>
-            <a:off x="346129" y="1561356"/>
-            <a:ext cx="9176705" cy="2952328"/>
+            <a:off x="622806" y="1633364"/>
+            <a:ext cx="8593369" cy="2764398"/>
           </a:xfrm>
           <a:prstGeom prst="rect">
             <a:avLst/>

</xml_diff>